<commit_message>
cloud solution diagram added
</commit_message>
<xml_diff>
--- a/docs/drawings.pptx
+++ b/docs/drawings.pptx
@@ -9,6 +9,8 @@
     <p:sldId id="264" r:id="rId3"/>
     <p:sldId id="265" r:id="rId4"/>
     <p:sldId id="266" r:id="rId5"/>
+    <p:sldId id="268" r:id="rId6"/>
+    <p:sldId id="267" r:id="rId7"/>
   </p:sldIdLst>
   <p:sldSz cx="12192000" cy="6858000"/>
   <p:notesSz cx="7315200" cy="9601200"/>
@@ -10033,6 +10035,2723 @@
 </p:sld>
 </file>
 
+<file path=ppt/slides/slide5.xml><?xml version="1.0" encoding="utf-8"?>
+<p:sld xmlns:a="http://schemas.openxmlformats.org/drawingml/2006/main" xmlns:r="http://schemas.openxmlformats.org/officeDocument/2006/relationships" xmlns:p="http://schemas.openxmlformats.org/presentationml/2006/main">
+  <p:cSld>
+    <p:spTree>
+      <p:nvGrpSpPr>
+        <p:cNvPr id="1" name=""/>
+        <p:cNvGrpSpPr/>
+        <p:nvPr/>
+      </p:nvGrpSpPr>
+      <p:grpSpPr>
+        <a:xfrm>
+          <a:off x="0" y="0"/>
+          <a:ext cx="0" cy="0"/>
+          <a:chOff x="0" y="0"/>
+          <a:chExt cx="0" cy="0"/>
+        </a:xfrm>
+      </p:grpSpPr>
+      <p:sp>
+        <p:nvSpPr>
+          <p:cNvPr id="29" name="Rectangle 28">
+            <a:extLst>
+              <a:ext uri="{FF2B5EF4-FFF2-40B4-BE49-F238E27FC236}">
+                <a16:creationId xmlns:a16="http://schemas.microsoft.com/office/drawing/2014/main" id="{7C60881A-3147-4024-8B19-E7C746A159A4}"/>
+              </a:ext>
+            </a:extLst>
+          </p:cNvPr>
+          <p:cNvSpPr/>
+          <p:nvPr/>
+        </p:nvSpPr>
+        <p:spPr>
+          <a:xfrm>
+            <a:off x="4647165" y="1407694"/>
+            <a:ext cx="1636818" cy="918909"/>
+          </a:xfrm>
+          <a:prstGeom prst="rect">
+            <a:avLst/>
+          </a:prstGeom>
+          <a:ln>
+            <a:solidFill>
+              <a:srgbClr val="FF0000"/>
+            </a:solidFill>
+            <a:prstDash val="sysDash"/>
+          </a:ln>
+        </p:spPr>
+        <p:style>
+          <a:lnRef idx="2">
+            <a:schemeClr val="accent1"/>
+          </a:lnRef>
+          <a:fillRef idx="1">
+            <a:schemeClr val="lt1"/>
+          </a:fillRef>
+          <a:effectRef idx="0">
+            <a:schemeClr val="accent1"/>
+          </a:effectRef>
+          <a:fontRef idx="minor">
+            <a:schemeClr val="dk1"/>
+          </a:fontRef>
+        </p:style>
+        <p:txBody>
+          <a:bodyPr rtlCol="0" anchor="ctr"/>
+          <a:lstStyle/>
+          <a:p>
+            <a:pPr algn="ctr"/>
+            <a:endParaRPr lang="en-US" dirty="0"/>
+          </a:p>
+        </p:txBody>
+      </p:sp>
+      <p:sp>
+        <p:nvSpPr>
+          <p:cNvPr id="13" name="Rectangle 12">
+            <a:extLst>
+              <a:ext uri="{FF2B5EF4-FFF2-40B4-BE49-F238E27FC236}">
+                <a16:creationId xmlns:a16="http://schemas.microsoft.com/office/drawing/2014/main" id="{E532D6D0-D8D8-4497-82A5-3552DB4D9497}"/>
+              </a:ext>
+            </a:extLst>
+          </p:cNvPr>
+          <p:cNvSpPr/>
+          <p:nvPr/>
+        </p:nvSpPr>
+        <p:spPr>
+          <a:xfrm>
+            <a:off x="1522031" y="3157995"/>
+            <a:ext cx="7952838" cy="1835110"/>
+          </a:xfrm>
+          <a:prstGeom prst="rect">
+            <a:avLst/>
+          </a:prstGeom>
+          <a:ln>
+            <a:solidFill>
+              <a:srgbClr val="00B050"/>
+            </a:solidFill>
+            <a:prstDash val="sysDash"/>
+          </a:ln>
+        </p:spPr>
+        <p:style>
+          <a:lnRef idx="2">
+            <a:schemeClr val="accent1"/>
+          </a:lnRef>
+          <a:fillRef idx="1">
+            <a:schemeClr val="lt1"/>
+          </a:fillRef>
+          <a:effectRef idx="0">
+            <a:schemeClr val="accent1"/>
+          </a:effectRef>
+          <a:fontRef idx="minor">
+            <a:schemeClr val="dk1"/>
+          </a:fontRef>
+        </p:style>
+        <p:txBody>
+          <a:bodyPr rtlCol="0" anchor="ctr"/>
+          <a:lstStyle/>
+          <a:p>
+            <a:pPr algn="ctr"/>
+            <a:endParaRPr lang="en-US" dirty="0"/>
+          </a:p>
+        </p:txBody>
+      </p:sp>
+      <p:grpSp>
+        <p:nvGrpSpPr>
+          <p:cNvPr id="21" name="Group 20">
+            <a:extLst>
+              <a:ext uri="{FF2B5EF4-FFF2-40B4-BE49-F238E27FC236}">
+                <a16:creationId xmlns:a16="http://schemas.microsoft.com/office/drawing/2014/main" id="{8AFC29AB-BAF8-4DF9-A1B2-0E1B11F74D9E}"/>
+              </a:ext>
+            </a:extLst>
+          </p:cNvPr>
+          <p:cNvGrpSpPr/>
+          <p:nvPr/>
+        </p:nvGrpSpPr>
+        <p:grpSpPr>
+          <a:xfrm>
+            <a:off x="4732785" y="1541643"/>
+            <a:ext cx="1475084" cy="740601"/>
+            <a:chOff x="4304628" y="841206"/>
+            <a:chExt cx="1475084" cy="740601"/>
+          </a:xfrm>
+        </p:grpSpPr>
+        <p:pic>
+          <p:nvPicPr>
+            <p:cNvPr id="1030" name="Picture 6" descr="See the source image">
+              <a:extLst>
+                <a:ext uri="{FF2B5EF4-FFF2-40B4-BE49-F238E27FC236}">
+                  <a16:creationId xmlns:a16="http://schemas.microsoft.com/office/drawing/2014/main" id="{2A09822F-2DC0-4F1B-BB9E-84F8191D47CC}"/>
+                </a:ext>
+              </a:extLst>
+            </p:cNvPr>
+            <p:cNvPicPr>
+              <a:picLocks noChangeAspect="1" noChangeArrowheads="1"/>
+            </p:cNvPicPr>
+            <p:nvPr/>
+          </p:nvPicPr>
+          <p:blipFill rotWithShape="1">
+            <a:blip r:embed="rId2">
+              <a:extLst>
+                <a:ext uri="{28A0092B-C50C-407E-A947-70E740481C1C}">
+                  <a14:useLocalDpi xmlns:a14="http://schemas.microsoft.com/office/drawing/2010/main" val="0"/>
+                </a:ext>
+              </a:extLst>
+            </a:blip>
+            <a:srcRect l="17920" t="6762" r="18882" b="6381"/>
+            <a:stretch/>
+          </p:blipFill>
+          <p:spPr bwMode="auto">
+            <a:xfrm>
+              <a:off x="4720010" y="841206"/>
+              <a:ext cx="552079" cy="479216"/>
+            </a:xfrm>
+            <a:prstGeom prst="rect">
+              <a:avLst/>
+            </a:prstGeom>
+            <a:noFill/>
+            <a:extLst>
+              <a:ext uri="{909E8E84-426E-40DD-AFC4-6F175D3DCCD1}">
+                <a14:hiddenFill xmlns:a14="http://schemas.microsoft.com/office/drawing/2010/main">
+                  <a:solidFill>
+                    <a:srgbClr val="FFFFFF"/>
+                  </a:solidFill>
+                </a14:hiddenFill>
+              </a:ext>
+            </a:extLst>
+          </p:spPr>
+        </p:pic>
+        <p:sp>
+          <p:nvSpPr>
+            <p:cNvPr id="4" name="TextBox 3">
+              <a:extLst>
+                <a:ext uri="{FF2B5EF4-FFF2-40B4-BE49-F238E27FC236}">
+                  <a16:creationId xmlns:a16="http://schemas.microsoft.com/office/drawing/2014/main" id="{C18C1812-13AD-48CC-B0D3-9431E0898AF4}"/>
+                </a:ext>
+              </a:extLst>
+            </p:cNvPr>
+            <p:cNvSpPr txBox="1"/>
+            <p:nvPr/>
+          </p:nvSpPr>
+          <p:spPr>
+            <a:xfrm>
+              <a:off x="4304628" y="1335586"/>
+              <a:ext cx="1475084" cy="246221"/>
+            </a:xfrm>
+            <a:prstGeom prst="rect">
+              <a:avLst/>
+            </a:prstGeom>
+            <a:noFill/>
+          </p:spPr>
+          <p:txBody>
+            <a:bodyPr wrap="none" rtlCol="0">
+              <a:spAutoFit/>
+            </a:bodyPr>
+            <a:lstStyle/>
+            <a:p>
+              <a:r>
+                <a:rPr lang="en-US" sz="1000" dirty="0"/>
+                <a:t>Azure Container Registry</a:t>
+              </a:r>
+            </a:p>
+          </p:txBody>
+        </p:sp>
+      </p:grpSp>
+      <p:grpSp>
+        <p:nvGrpSpPr>
+          <p:cNvPr id="19" name="Group 18">
+            <a:extLst>
+              <a:ext uri="{FF2B5EF4-FFF2-40B4-BE49-F238E27FC236}">
+                <a16:creationId xmlns:a16="http://schemas.microsoft.com/office/drawing/2014/main" id="{98ACBFC6-029D-47F1-A1D0-1ED06685DC36}"/>
+              </a:ext>
+            </a:extLst>
+          </p:cNvPr>
+          <p:cNvGrpSpPr/>
+          <p:nvPr/>
+        </p:nvGrpSpPr>
+        <p:grpSpPr>
+          <a:xfrm>
+            <a:off x="5837865" y="3355925"/>
+            <a:ext cx="1314784" cy="805788"/>
+            <a:chOff x="6235002" y="769945"/>
+            <a:chExt cx="1314784" cy="805788"/>
+          </a:xfrm>
+        </p:grpSpPr>
+        <p:pic>
+          <p:nvPicPr>
+            <p:cNvPr id="6" name="Picture 5">
+              <a:extLst>
+                <a:ext uri="{FF2B5EF4-FFF2-40B4-BE49-F238E27FC236}">
+                  <a16:creationId xmlns:a16="http://schemas.microsoft.com/office/drawing/2014/main" id="{1DE2DFB2-1CA0-409B-8C30-6233579847E5}"/>
+                </a:ext>
+              </a:extLst>
+            </p:cNvPr>
+            <p:cNvPicPr>
+              <a:picLocks noChangeAspect="1"/>
+            </p:cNvPicPr>
+            <p:nvPr/>
+          </p:nvPicPr>
+          <p:blipFill>
+            <a:blip r:embed="rId3">
+              <a:clrChange>
+                <a:clrFrom>
+                  <a:srgbClr val="FFFFFF"/>
+                </a:clrFrom>
+                <a:clrTo>
+                  <a:srgbClr val="FFFFFF">
+                    <a:alpha val="0"/>
+                  </a:srgbClr>
+                </a:clrTo>
+              </a:clrChange>
+            </a:blip>
+            <a:stretch>
+              <a:fillRect/>
+            </a:stretch>
+          </p:blipFill>
+          <p:spPr>
+            <a:xfrm>
+              <a:off x="6545093" y="769945"/>
+              <a:ext cx="659280" cy="612189"/>
+            </a:xfrm>
+            <a:prstGeom prst="rect">
+              <a:avLst/>
+            </a:prstGeom>
+          </p:spPr>
+        </p:pic>
+        <p:sp>
+          <p:nvSpPr>
+            <p:cNvPr id="7" name="TextBox 6">
+              <a:extLst>
+                <a:ext uri="{FF2B5EF4-FFF2-40B4-BE49-F238E27FC236}">
+                  <a16:creationId xmlns:a16="http://schemas.microsoft.com/office/drawing/2014/main" id="{D5527EA6-243A-406D-BFD9-0A9E374D205A}"/>
+                </a:ext>
+              </a:extLst>
+            </p:cNvPr>
+            <p:cNvSpPr txBox="1"/>
+            <p:nvPr/>
+          </p:nvSpPr>
+          <p:spPr>
+            <a:xfrm>
+              <a:off x="6235002" y="1329512"/>
+              <a:ext cx="1314784" cy="246221"/>
+            </a:xfrm>
+            <a:prstGeom prst="rect">
+              <a:avLst/>
+            </a:prstGeom>
+            <a:noFill/>
+          </p:spPr>
+          <p:txBody>
+            <a:bodyPr wrap="none" rtlCol="0">
+              <a:spAutoFit/>
+            </a:bodyPr>
+            <a:lstStyle/>
+            <a:p>
+              <a:r>
+                <a:rPr lang="en-US" sz="1000" dirty="0"/>
+                <a:t>Azure Container Apps</a:t>
+              </a:r>
+            </a:p>
+          </p:txBody>
+        </p:sp>
+      </p:grpSp>
+      <p:grpSp>
+        <p:nvGrpSpPr>
+          <p:cNvPr id="15" name="Group 14">
+            <a:extLst>
+              <a:ext uri="{FF2B5EF4-FFF2-40B4-BE49-F238E27FC236}">
+                <a16:creationId xmlns:a16="http://schemas.microsoft.com/office/drawing/2014/main" id="{9A510F61-56ED-42E0-87A5-B090FDBB45C2}"/>
+              </a:ext>
+            </a:extLst>
+          </p:cNvPr>
+          <p:cNvGrpSpPr/>
+          <p:nvPr/>
+        </p:nvGrpSpPr>
+        <p:grpSpPr>
+          <a:xfrm>
+            <a:off x="1742489" y="3429000"/>
+            <a:ext cx="920445" cy="757927"/>
+            <a:chOff x="8056429" y="808366"/>
+            <a:chExt cx="920445" cy="757927"/>
+          </a:xfrm>
+        </p:grpSpPr>
+        <p:pic>
+          <p:nvPicPr>
+            <p:cNvPr id="1032" name="Picture 8" descr="See the source image">
+              <a:extLst>
+                <a:ext uri="{FF2B5EF4-FFF2-40B4-BE49-F238E27FC236}">
+                  <a16:creationId xmlns:a16="http://schemas.microsoft.com/office/drawing/2014/main" id="{CEA7BEC5-A5F6-4C1C-AEF8-2C1D2F04CC97}"/>
+                </a:ext>
+              </a:extLst>
+            </p:cNvPr>
+            <p:cNvPicPr>
+              <a:picLocks noChangeAspect="1" noChangeArrowheads="1"/>
+            </p:cNvPicPr>
+            <p:nvPr/>
+          </p:nvPicPr>
+          <p:blipFill>
+            <a:blip r:embed="rId4">
+              <a:clrChange>
+                <a:clrFrom>
+                  <a:srgbClr val="FDFDFD"/>
+                </a:clrFrom>
+                <a:clrTo>
+                  <a:srgbClr val="FDFDFD">
+                    <a:alpha val="0"/>
+                  </a:srgbClr>
+                </a:clrTo>
+              </a:clrChange>
+              <a:extLst>
+                <a:ext uri="{28A0092B-C50C-407E-A947-70E740481C1C}">
+                  <a14:useLocalDpi xmlns:a14="http://schemas.microsoft.com/office/drawing/2010/main" val="0"/>
+                </a:ext>
+              </a:extLst>
+            </a:blip>
+            <a:srcRect/>
+            <a:stretch>
+              <a:fillRect/>
+            </a:stretch>
+          </p:blipFill>
+          <p:spPr bwMode="auto">
+            <a:xfrm>
+              <a:off x="8264355" y="808366"/>
+              <a:ext cx="508704" cy="470478"/>
+            </a:xfrm>
+            <a:prstGeom prst="rect">
+              <a:avLst/>
+            </a:prstGeom>
+            <a:noFill/>
+            <a:extLst>
+              <a:ext uri="{909E8E84-426E-40DD-AFC4-6F175D3DCCD1}">
+                <a14:hiddenFill xmlns:a14="http://schemas.microsoft.com/office/drawing/2010/main">
+                  <a:solidFill>
+                    <a:srgbClr val="FFFFFF"/>
+                  </a:solidFill>
+                </a14:hiddenFill>
+              </a:ext>
+            </a:extLst>
+          </p:spPr>
+        </p:pic>
+        <p:sp>
+          <p:nvSpPr>
+            <p:cNvPr id="10" name="TextBox 9">
+              <a:extLst>
+                <a:ext uri="{FF2B5EF4-FFF2-40B4-BE49-F238E27FC236}">
+                  <a16:creationId xmlns:a16="http://schemas.microsoft.com/office/drawing/2014/main" id="{5F01C87A-1A6C-464E-9B93-C047BB13FAA6}"/>
+                </a:ext>
+              </a:extLst>
+            </p:cNvPr>
+            <p:cNvSpPr txBox="1"/>
+            <p:nvPr/>
+          </p:nvSpPr>
+          <p:spPr>
+            <a:xfrm>
+              <a:off x="8056429" y="1320072"/>
+              <a:ext cx="920445" cy="246221"/>
+            </a:xfrm>
+            <a:prstGeom prst="rect">
+              <a:avLst/>
+            </a:prstGeom>
+            <a:noFill/>
+          </p:spPr>
+          <p:txBody>
+            <a:bodyPr wrap="none" rtlCol="0">
+              <a:spAutoFit/>
+            </a:bodyPr>
+            <a:lstStyle/>
+            <a:p>
+              <a:r>
+                <a:rPr lang="en-US" sz="1000" dirty="0"/>
+                <a:t>Azure IoT Hub</a:t>
+              </a:r>
+            </a:p>
+          </p:txBody>
+        </p:sp>
+      </p:grpSp>
+      <p:grpSp>
+        <p:nvGrpSpPr>
+          <p:cNvPr id="25" name="Group 24">
+            <a:extLst>
+              <a:ext uri="{FF2B5EF4-FFF2-40B4-BE49-F238E27FC236}">
+                <a16:creationId xmlns:a16="http://schemas.microsoft.com/office/drawing/2014/main" id="{40674AD4-3B93-4CE7-8588-F15AB4A4D551}"/>
+              </a:ext>
+            </a:extLst>
+          </p:cNvPr>
+          <p:cNvGrpSpPr/>
+          <p:nvPr/>
+        </p:nvGrpSpPr>
+        <p:grpSpPr>
+          <a:xfrm>
+            <a:off x="8151208" y="4276422"/>
+            <a:ext cx="1191352" cy="671562"/>
+            <a:chOff x="9368201" y="863086"/>
+            <a:chExt cx="1191352" cy="671562"/>
+          </a:xfrm>
+        </p:grpSpPr>
+        <p:pic>
+          <p:nvPicPr>
+            <p:cNvPr id="1036" name="Picture 12" descr="See the source image">
+              <a:extLst>
+                <a:ext uri="{FF2B5EF4-FFF2-40B4-BE49-F238E27FC236}">
+                  <a16:creationId xmlns:a16="http://schemas.microsoft.com/office/drawing/2014/main" id="{2A90732C-F539-41DC-BBBE-8EE70183D17C}"/>
+                </a:ext>
+              </a:extLst>
+            </p:cNvPr>
+            <p:cNvPicPr>
+              <a:picLocks noChangeAspect="1" noChangeArrowheads="1"/>
+            </p:cNvPicPr>
+            <p:nvPr/>
+          </p:nvPicPr>
+          <p:blipFill>
+            <a:blip r:embed="rId5">
+              <a:extLst>
+                <a:ext uri="{28A0092B-C50C-407E-A947-70E740481C1C}">
+                  <a14:useLocalDpi xmlns:a14="http://schemas.microsoft.com/office/drawing/2010/main" val="0"/>
+                </a:ext>
+              </a:extLst>
+            </a:blip>
+            <a:srcRect/>
+            <a:stretch>
+              <a:fillRect/>
+            </a:stretch>
+          </p:blipFill>
+          <p:spPr bwMode="auto">
+            <a:xfrm>
+              <a:off x="9732893" y="863086"/>
+              <a:ext cx="430015" cy="430015"/>
+            </a:xfrm>
+            <a:prstGeom prst="rect">
+              <a:avLst/>
+            </a:prstGeom>
+            <a:noFill/>
+            <a:extLst>
+              <a:ext uri="{909E8E84-426E-40DD-AFC4-6F175D3DCCD1}">
+                <a14:hiddenFill xmlns:a14="http://schemas.microsoft.com/office/drawing/2010/main">
+                  <a:solidFill>
+                    <a:srgbClr val="FFFFFF"/>
+                  </a:solidFill>
+                </a14:hiddenFill>
+              </a:ext>
+            </a:extLst>
+          </p:spPr>
+        </p:pic>
+        <p:sp>
+          <p:nvSpPr>
+            <p:cNvPr id="11" name="TextBox 10">
+              <a:extLst>
+                <a:ext uri="{FF2B5EF4-FFF2-40B4-BE49-F238E27FC236}">
+                  <a16:creationId xmlns:a16="http://schemas.microsoft.com/office/drawing/2014/main" id="{4DC526A7-C1F0-4B75-8C88-78E682792851}"/>
+                </a:ext>
+              </a:extLst>
+            </p:cNvPr>
+            <p:cNvSpPr txBox="1"/>
+            <p:nvPr/>
+          </p:nvSpPr>
+          <p:spPr>
+            <a:xfrm>
+              <a:off x="9368201" y="1288427"/>
+              <a:ext cx="1191352" cy="246221"/>
+            </a:xfrm>
+            <a:prstGeom prst="rect">
+              <a:avLst/>
+            </a:prstGeom>
+            <a:noFill/>
+          </p:spPr>
+          <p:txBody>
+            <a:bodyPr wrap="none" rtlCol="0">
+              <a:spAutoFit/>
+            </a:bodyPr>
+            <a:lstStyle>
+              <a:defPPr>
+                <a:defRPr lang="en-US"/>
+              </a:defPPr>
+              <a:lvl1pPr>
+                <a:defRPr sz="1000"/>
+              </a:lvl1pPr>
+            </a:lstStyle>
+            <a:p>
+              <a:r>
+                <a:rPr lang="en-US" dirty="0"/>
+                <a:t>Azure Log Analytics</a:t>
+              </a:r>
+            </a:p>
+          </p:txBody>
+        </p:sp>
+      </p:grpSp>
+      <p:grpSp>
+        <p:nvGrpSpPr>
+          <p:cNvPr id="17" name="Group 16">
+            <a:extLst>
+              <a:ext uri="{FF2B5EF4-FFF2-40B4-BE49-F238E27FC236}">
+                <a16:creationId xmlns:a16="http://schemas.microsoft.com/office/drawing/2014/main" id="{B0FE710E-9F19-40C0-AC5C-1CD451BC91F3}"/>
+              </a:ext>
+            </a:extLst>
+          </p:cNvPr>
+          <p:cNvGrpSpPr/>
+          <p:nvPr/>
+        </p:nvGrpSpPr>
+        <p:grpSpPr>
+          <a:xfrm>
+            <a:off x="3750085" y="3728367"/>
+            <a:ext cx="1059906" cy="805254"/>
+            <a:chOff x="10587444" y="764507"/>
+            <a:chExt cx="1059906" cy="805254"/>
+          </a:xfrm>
+        </p:grpSpPr>
+        <p:pic>
+          <p:nvPicPr>
+            <p:cNvPr id="1034" name="Picture 10" descr="See related image detail">
+              <a:extLst>
+                <a:ext uri="{FF2B5EF4-FFF2-40B4-BE49-F238E27FC236}">
+                  <a16:creationId xmlns:a16="http://schemas.microsoft.com/office/drawing/2014/main" id="{BB75325C-BE80-4716-B3AB-888FDA93A36B}"/>
+                </a:ext>
+              </a:extLst>
+            </p:cNvPr>
+            <p:cNvPicPr>
+              <a:picLocks noChangeAspect="1" noChangeArrowheads="1"/>
+            </p:cNvPicPr>
+            <p:nvPr/>
+          </p:nvPicPr>
+          <p:blipFill>
+            <a:blip r:embed="rId6">
+              <a:clrChange>
+                <a:clrFrom>
+                  <a:srgbClr val="FDFDFD"/>
+                </a:clrFrom>
+                <a:clrTo>
+                  <a:srgbClr val="FDFDFD">
+                    <a:alpha val="0"/>
+                  </a:srgbClr>
+                </a:clrTo>
+              </a:clrChange>
+              <a:extLst>
+                <a:ext uri="{28A0092B-C50C-407E-A947-70E740481C1C}">
+                  <a14:useLocalDpi xmlns:a14="http://schemas.microsoft.com/office/drawing/2010/main" val="0"/>
+                </a:ext>
+              </a:extLst>
+            </a:blip>
+            <a:srcRect/>
+            <a:stretch>
+              <a:fillRect/>
+            </a:stretch>
+          </p:blipFill>
+          <p:spPr bwMode="auto">
+            <a:xfrm>
+              <a:off x="10824907" y="764507"/>
+              <a:ext cx="584980" cy="584980"/>
+            </a:xfrm>
+            <a:prstGeom prst="rect">
+              <a:avLst/>
+            </a:prstGeom>
+            <a:noFill/>
+            <a:extLst>
+              <a:ext uri="{909E8E84-426E-40DD-AFC4-6F175D3DCCD1}">
+                <a14:hiddenFill xmlns:a14="http://schemas.microsoft.com/office/drawing/2010/main">
+                  <a:solidFill>
+                    <a:srgbClr val="FFFFFF"/>
+                  </a:solidFill>
+                </a14:hiddenFill>
+              </a:ext>
+            </a:extLst>
+          </p:spPr>
+        </p:pic>
+        <p:sp>
+          <p:nvSpPr>
+            <p:cNvPr id="12" name="TextBox 11">
+              <a:extLst>
+                <a:ext uri="{FF2B5EF4-FFF2-40B4-BE49-F238E27FC236}">
+                  <a16:creationId xmlns:a16="http://schemas.microsoft.com/office/drawing/2014/main" id="{42ACD0CC-6F04-4067-8439-7BB4106B3467}"/>
+                </a:ext>
+              </a:extLst>
+            </p:cNvPr>
+            <p:cNvSpPr txBox="1"/>
+            <p:nvPr/>
+          </p:nvSpPr>
+          <p:spPr>
+            <a:xfrm>
+              <a:off x="10587444" y="1323540"/>
+              <a:ext cx="1059906" cy="246221"/>
+            </a:xfrm>
+            <a:prstGeom prst="rect">
+              <a:avLst/>
+            </a:prstGeom>
+            <a:noFill/>
+          </p:spPr>
+          <p:txBody>
+            <a:bodyPr wrap="none" rtlCol="0">
+              <a:spAutoFit/>
+            </a:bodyPr>
+            <a:lstStyle/>
+            <a:p>
+              <a:r>
+                <a:rPr lang="en-US" sz="1000" dirty="0"/>
+                <a:t>Azure Event Grid</a:t>
+              </a:r>
+            </a:p>
+          </p:txBody>
+        </p:sp>
+      </p:grpSp>
+      <p:grpSp>
+        <p:nvGrpSpPr>
+          <p:cNvPr id="23" name="Group 22">
+            <a:extLst>
+              <a:ext uri="{FF2B5EF4-FFF2-40B4-BE49-F238E27FC236}">
+                <a16:creationId xmlns:a16="http://schemas.microsoft.com/office/drawing/2014/main" id="{E4D241D0-F5D6-4665-9CD5-6C50C04D2831}"/>
+              </a:ext>
+            </a:extLst>
+          </p:cNvPr>
+          <p:cNvGrpSpPr/>
+          <p:nvPr/>
+        </p:nvGrpSpPr>
+        <p:grpSpPr>
+          <a:xfrm>
+            <a:off x="8276476" y="3425192"/>
+            <a:ext cx="976549" cy="736521"/>
+            <a:chOff x="3100254" y="834058"/>
+            <a:chExt cx="976549" cy="736521"/>
+          </a:xfrm>
+        </p:grpSpPr>
+        <p:pic>
+          <p:nvPicPr>
+            <p:cNvPr id="1028" name="Picture 4" descr="See related image detail">
+              <a:extLst>
+                <a:ext uri="{FF2B5EF4-FFF2-40B4-BE49-F238E27FC236}">
+                  <a16:creationId xmlns:a16="http://schemas.microsoft.com/office/drawing/2014/main" id="{650EC945-E073-4979-BA21-343CE6D70BB9}"/>
+                </a:ext>
+              </a:extLst>
+            </p:cNvPr>
+            <p:cNvPicPr>
+              <a:picLocks noChangeAspect="1" noChangeArrowheads="1"/>
+            </p:cNvPicPr>
+            <p:nvPr/>
+          </p:nvPicPr>
+          <p:blipFill>
+            <a:blip r:embed="rId7">
+              <a:clrChange>
+                <a:clrFrom>
+                  <a:srgbClr val="FDFDFD"/>
+                </a:clrFrom>
+                <a:clrTo>
+                  <a:srgbClr val="FDFDFD">
+                    <a:alpha val="0"/>
+                  </a:srgbClr>
+                </a:clrTo>
+              </a:clrChange>
+              <a:extLst>
+                <a:ext uri="{28A0092B-C50C-407E-A947-70E740481C1C}">
+                  <a14:useLocalDpi xmlns:a14="http://schemas.microsoft.com/office/drawing/2010/main" val="0"/>
+                </a:ext>
+              </a:extLst>
+            </a:blip>
+            <a:srcRect/>
+            <a:stretch>
+              <a:fillRect/>
+            </a:stretch>
+          </p:blipFill>
+          <p:spPr bwMode="auto">
+            <a:xfrm>
+              <a:off x="3373522" y="834058"/>
+              <a:ext cx="430015" cy="472114"/>
+            </a:xfrm>
+            <a:prstGeom prst="rect">
+              <a:avLst/>
+            </a:prstGeom>
+            <a:noFill/>
+            <a:extLst>
+              <a:ext uri="{909E8E84-426E-40DD-AFC4-6F175D3DCCD1}">
+                <a14:hiddenFill xmlns:a14="http://schemas.microsoft.com/office/drawing/2010/main">
+                  <a:solidFill>
+                    <a:srgbClr val="FFFFFF"/>
+                  </a:solidFill>
+                </a14:hiddenFill>
+              </a:ext>
+            </a:extLst>
+          </p:spPr>
+        </p:pic>
+        <p:sp>
+          <p:nvSpPr>
+            <p:cNvPr id="14" name="TextBox 13">
+              <a:extLst>
+                <a:ext uri="{FF2B5EF4-FFF2-40B4-BE49-F238E27FC236}">
+                  <a16:creationId xmlns:a16="http://schemas.microsoft.com/office/drawing/2014/main" id="{226FE8E9-8258-4E11-90B2-20FF286B149A}"/>
+                </a:ext>
+              </a:extLst>
+            </p:cNvPr>
+            <p:cNvSpPr txBox="1"/>
+            <p:nvPr/>
+          </p:nvSpPr>
+          <p:spPr>
+            <a:xfrm>
+              <a:off x="3100254" y="1324358"/>
+              <a:ext cx="976549" cy="246221"/>
+            </a:xfrm>
+            <a:prstGeom prst="rect">
+              <a:avLst/>
+            </a:prstGeom>
+            <a:noFill/>
+          </p:spPr>
+          <p:txBody>
+            <a:bodyPr wrap="none" rtlCol="0">
+              <a:spAutoFit/>
+            </a:bodyPr>
+            <a:lstStyle/>
+            <a:p>
+              <a:r>
+                <a:rPr lang="en-US" sz="1000" dirty="0"/>
+                <a:t>Azure </a:t>
+              </a:r>
+              <a:r>
+                <a:rPr lang="en-US" sz="1000" dirty="0" err="1"/>
+                <a:t>KeyVault</a:t>
+              </a:r>
+              <a:endParaRPr lang="en-US" sz="1000" dirty="0"/>
+            </a:p>
+          </p:txBody>
+        </p:sp>
+      </p:grpSp>
+      <p:cxnSp>
+        <p:nvCxnSpPr>
+          <p:cNvPr id="27" name="Straight Arrow Connector 26">
+            <a:extLst>
+              <a:ext uri="{FF2B5EF4-FFF2-40B4-BE49-F238E27FC236}">
+                <a16:creationId xmlns:a16="http://schemas.microsoft.com/office/drawing/2014/main" id="{12ED6B8A-00D3-415B-B3FC-88FC4EA40FE5}"/>
+              </a:ext>
+            </a:extLst>
+          </p:cNvPr>
+          <p:cNvCxnSpPr>
+            <a:stCxn id="6" idx="3"/>
+            <a:endCxn id="1028" idx="1"/>
+          </p:cNvCxnSpPr>
+          <p:nvPr/>
+        </p:nvCxnSpPr>
+        <p:spPr>
+          <a:xfrm flipV="1">
+            <a:off x="6807236" y="3661249"/>
+            <a:ext cx="1742508" cy="771"/>
+          </a:xfrm>
+          <a:prstGeom prst="straightConnector1">
+            <a:avLst/>
+          </a:prstGeom>
+          <a:ln>
+            <a:headEnd type="triangle"/>
+            <a:tailEnd type="triangle"/>
+          </a:ln>
+        </p:spPr>
+        <p:style>
+          <a:lnRef idx="1">
+            <a:schemeClr val="accent1"/>
+          </a:lnRef>
+          <a:fillRef idx="0">
+            <a:schemeClr val="accent1"/>
+          </a:fillRef>
+          <a:effectRef idx="0">
+            <a:schemeClr val="accent1"/>
+          </a:effectRef>
+          <a:fontRef idx="minor">
+            <a:schemeClr val="tx1"/>
+          </a:fontRef>
+        </p:style>
+      </p:cxnSp>
+      <p:sp>
+        <p:nvSpPr>
+          <p:cNvPr id="52" name="TextBox 51">
+            <a:extLst>
+              <a:ext uri="{FF2B5EF4-FFF2-40B4-BE49-F238E27FC236}">
+                <a16:creationId xmlns:a16="http://schemas.microsoft.com/office/drawing/2014/main" id="{67EED9E1-480A-4671-854A-21865EDA3022}"/>
+              </a:ext>
+            </a:extLst>
+          </p:cNvPr>
+          <p:cNvSpPr txBox="1"/>
+          <p:nvPr/>
+        </p:nvSpPr>
+        <p:spPr>
+          <a:xfrm>
+            <a:off x="7151007" y="4461445"/>
+            <a:ext cx="1224769" cy="246221"/>
+          </a:xfrm>
+          <a:prstGeom prst="rect">
+            <a:avLst/>
+          </a:prstGeom>
+          <a:noFill/>
+        </p:spPr>
+        <p:txBody>
+          <a:bodyPr wrap="square">
+            <a:spAutoFit/>
+          </a:bodyPr>
+          <a:lstStyle/>
+          <a:p>
+            <a:r>
+              <a:rPr lang="en-US" sz="1000" dirty="0"/>
+              <a:t>AUDIT TRAIL</a:t>
+            </a:r>
+          </a:p>
+        </p:txBody>
+      </p:sp>
+      <p:sp>
+        <p:nvSpPr>
+          <p:cNvPr id="51" name="TextBox 50">
+            <a:extLst>
+              <a:ext uri="{FF2B5EF4-FFF2-40B4-BE49-F238E27FC236}">
+                <a16:creationId xmlns:a16="http://schemas.microsoft.com/office/drawing/2014/main" id="{196903A7-7DD1-4371-B726-E349FB0FACC7}"/>
+              </a:ext>
+            </a:extLst>
+          </p:cNvPr>
+          <p:cNvSpPr txBox="1"/>
+          <p:nvPr/>
+        </p:nvSpPr>
+        <p:spPr>
+          <a:xfrm>
+            <a:off x="6929471" y="3439697"/>
+            <a:ext cx="1224769" cy="246221"/>
+          </a:xfrm>
+          <a:prstGeom prst="rect">
+            <a:avLst/>
+          </a:prstGeom>
+          <a:noFill/>
+        </p:spPr>
+        <p:txBody>
+          <a:bodyPr wrap="square">
+            <a:spAutoFit/>
+          </a:bodyPr>
+          <a:lstStyle>
+            <a:defPPr>
+              <a:defRPr lang="en-US"/>
+            </a:defPPr>
+            <a:lvl1pPr>
+              <a:defRPr sz="1000"/>
+            </a:lvl1pPr>
+          </a:lstStyle>
+          <a:p>
+            <a:pPr algn="ctr"/>
+            <a:r>
+              <a:rPr lang="en-US" dirty="0"/>
+              <a:t>SECRETS</a:t>
+            </a:r>
+          </a:p>
+        </p:txBody>
+      </p:sp>
+      <p:cxnSp>
+        <p:nvCxnSpPr>
+          <p:cNvPr id="71" name="Connector: Elbow 70">
+            <a:extLst>
+              <a:ext uri="{FF2B5EF4-FFF2-40B4-BE49-F238E27FC236}">
+                <a16:creationId xmlns:a16="http://schemas.microsoft.com/office/drawing/2014/main" id="{36B34FA8-545A-4AD4-AD4D-FC55CABA9898}"/>
+              </a:ext>
+            </a:extLst>
+          </p:cNvPr>
+          <p:cNvCxnSpPr>
+            <a:cxnSpLocks/>
+            <a:endCxn id="1034" idx="1"/>
+          </p:cNvCxnSpPr>
+          <p:nvPr/>
+        </p:nvCxnSpPr>
+        <p:spPr>
+          <a:xfrm>
+            <a:off x="2520890" y="3774636"/>
+            <a:ext cx="1466658" cy="246221"/>
+          </a:xfrm>
+          <a:prstGeom prst="bentConnector3">
+            <a:avLst>
+              <a:gd name="adj1" fmla="val 50000"/>
+            </a:avLst>
+          </a:prstGeom>
+          <a:ln>
+            <a:tailEnd type="triangle"/>
+          </a:ln>
+        </p:spPr>
+        <p:style>
+          <a:lnRef idx="1">
+            <a:schemeClr val="accent1"/>
+          </a:lnRef>
+          <a:fillRef idx="0">
+            <a:schemeClr val="accent1"/>
+          </a:fillRef>
+          <a:effectRef idx="0">
+            <a:schemeClr val="accent1"/>
+          </a:effectRef>
+          <a:fontRef idx="minor">
+            <a:schemeClr val="tx1"/>
+          </a:fontRef>
+        </p:style>
+      </p:cxnSp>
+      <p:cxnSp>
+        <p:nvCxnSpPr>
+          <p:cNvPr id="101" name="Connector: Elbow 100">
+            <a:extLst>
+              <a:ext uri="{FF2B5EF4-FFF2-40B4-BE49-F238E27FC236}">
+                <a16:creationId xmlns:a16="http://schemas.microsoft.com/office/drawing/2014/main" id="{B3B75856-403A-4275-8D25-969A82F5CCC0}"/>
+              </a:ext>
+            </a:extLst>
+          </p:cNvPr>
+          <p:cNvCxnSpPr>
+            <a:cxnSpLocks/>
+            <a:stCxn id="1034" idx="3"/>
+          </p:cNvCxnSpPr>
+          <p:nvPr/>
+        </p:nvCxnSpPr>
+        <p:spPr>
+          <a:xfrm flipV="1">
+            <a:off x="4572528" y="3783359"/>
+            <a:ext cx="1513657" cy="237498"/>
+          </a:xfrm>
+          <a:prstGeom prst="bentConnector3">
+            <a:avLst>
+              <a:gd name="adj1" fmla="val 50000"/>
+            </a:avLst>
+          </a:prstGeom>
+          <a:ln>
+            <a:tailEnd type="triangle"/>
+          </a:ln>
+        </p:spPr>
+        <p:style>
+          <a:lnRef idx="1">
+            <a:schemeClr val="accent1"/>
+          </a:lnRef>
+          <a:fillRef idx="0">
+            <a:schemeClr val="accent1"/>
+          </a:fillRef>
+          <a:effectRef idx="0">
+            <a:schemeClr val="accent1"/>
+          </a:effectRef>
+          <a:fontRef idx="minor">
+            <a:schemeClr val="tx1"/>
+          </a:fontRef>
+        </p:style>
+      </p:cxnSp>
+      <p:cxnSp>
+        <p:nvCxnSpPr>
+          <p:cNvPr id="109" name="Straight Arrow Connector 108">
+            <a:extLst>
+              <a:ext uri="{FF2B5EF4-FFF2-40B4-BE49-F238E27FC236}">
+                <a16:creationId xmlns:a16="http://schemas.microsoft.com/office/drawing/2014/main" id="{58FEBA7C-7356-4206-AA52-F9116A41C8D1}"/>
+              </a:ext>
+            </a:extLst>
+          </p:cNvPr>
+          <p:cNvCxnSpPr>
+            <a:cxnSpLocks/>
+          </p:cNvCxnSpPr>
+          <p:nvPr/>
+        </p:nvCxnSpPr>
+        <p:spPr>
+          <a:xfrm flipH="1">
+            <a:off x="2520890" y="3543238"/>
+            <a:ext cx="3530125" cy="0"/>
+          </a:xfrm>
+          <a:prstGeom prst="straightConnector1">
+            <a:avLst/>
+          </a:prstGeom>
+          <a:ln>
+            <a:tailEnd type="triangle"/>
+          </a:ln>
+        </p:spPr>
+        <p:style>
+          <a:lnRef idx="1">
+            <a:schemeClr val="accent1"/>
+          </a:lnRef>
+          <a:fillRef idx="0">
+            <a:schemeClr val="accent1"/>
+          </a:fillRef>
+          <a:effectRef idx="0">
+            <a:schemeClr val="accent1"/>
+          </a:effectRef>
+          <a:fontRef idx="minor">
+            <a:schemeClr val="tx1"/>
+          </a:fontRef>
+        </p:style>
+      </p:cxnSp>
+      <p:grpSp>
+        <p:nvGrpSpPr>
+          <p:cNvPr id="118" name="Group 117">
+            <a:extLst>
+              <a:ext uri="{FF2B5EF4-FFF2-40B4-BE49-F238E27FC236}">
+                <a16:creationId xmlns:a16="http://schemas.microsoft.com/office/drawing/2014/main" id="{5AD48EC0-E17F-40DA-B39F-FD73D4679917}"/>
+              </a:ext>
+            </a:extLst>
+          </p:cNvPr>
+          <p:cNvGrpSpPr/>
+          <p:nvPr/>
+        </p:nvGrpSpPr>
+        <p:grpSpPr>
+          <a:xfrm>
+            <a:off x="8746884" y="1512685"/>
+            <a:ext cx="1350050" cy="767878"/>
+            <a:chOff x="4042380" y="358243"/>
+            <a:chExt cx="1350050" cy="767878"/>
+          </a:xfrm>
+        </p:grpSpPr>
+        <p:pic>
+          <p:nvPicPr>
+            <p:cNvPr id="1044" name="Picture 20" descr="See the source image">
+              <a:extLst>
+                <a:ext uri="{FF2B5EF4-FFF2-40B4-BE49-F238E27FC236}">
+                  <a16:creationId xmlns:a16="http://schemas.microsoft.com/office/drawing/2014/main" id="{642512C5-E240-40AD-9E97-6A7B5AE4D95E}"/>
+                </a:ext>
+              </a:extLst>
+            </p:cNvPr>
+            <p:cNvPicPr>
+              <a:picLocks noChangeAspect="1" noChangeArrowheads="1"/>
+            </p:cNvPicPr>
+            <p:nvPr/>
+          </p:nvPicPr>
+          <p:blipFill rotWithShape="1">
+            <a:blip r:embed="rId8">
+              <a:extLst>
+                <a:ext uri="{28A0092B-C50C-407E-A947-70E740481C1C}">
+                  <a14:useLocalDpi xmlns:a14="http://schemas.microsoft.com/office/drawing/2010/main" val="0"/>
+                </a:ext>
+              </a:extLst>
+            </a:blip>
+            <a:srcRect l="6123" r="62635"/>
+            <a:stretch/>
+          </p:blipFill>
+          <p:spPr bwMode="auto">
+            <a:xfrm>
+              <a:off x="4441224" y="358243"/>
+              <a:ext cx="561472" cy="543437"/>
+            </a:xfrm>
+            <a:prstGeom prst="rect">
+              <a:avLst/>
+            </a:prstGeom>
+            <a:noFill/>
+            <a:extLst>
+              <a:ext uri="{909E8E84-426E-40DD-AFC4-6F175D3DCCD1}">
+                <a14:hiddenFill xmlns:a14="http://schemas.microsoft.com/office/drawing/2010/main">
+                  <a:solidFill>
+                    <a:srgbClr val="FFFFFF"/>
+                  </a:solidFill>
+                </a14:hiddenFill>
+              </a:ext>
+            </a:extLst>
+          </p:spPr>
+        </p:pic>
+        <p:sp>
+          <p:nvSpPr>
+            <p:cNvPr id="116" name="TextBox 115">
+              <a:extLst>
+                <a:ext uri="{FF2B5EF4-FFF2-40B4-BE49-F238E27FC236}">
+                  <a16:creationId xmlns:a16="http://schemas.microsoft.com/office/drawing/2014/main" id="{793721C3-602F-4139-B2D3-C05133142935}"/>
+                </a:ext>
+              </a:extLst>
+            </p:cNvPr>
+            <p:cNvSpPr txBox="1"/>
+            <p:nvPr/>
+          </p:nvSpPr>
+          <p:spPr>
+            <a:xfrm>
+              <a:off x="4042380" y="879900"/>
+              <a:ext cx="1350050" cy="246221"/>
+            </a:xfrm>
+            <a:prstGeom prst="rect">
+              <a:avLst/>
+            </a:prstGeom>
+            <a:noFill/>
+          </p:spPr>
+          <p:txBody>
+            <a:bodyPr wrap="none" rtlCol="0">
+              <a:spAutoFit/>
+            </a:bodyPr>
+            <a:lstStyle/>
+            <a:p>
+              <a:r>
+                <a:rPr lang="en-US" sz="1000" dirty="0"/>
+                <a:t>Azure Active Directory</a:t>
+              </a:r>
+            </a:p>
+          </p:txBody>
+        </p:sp>
+      </p:grpSp>
+      <p:cxnSp>
+        <p:nvCxnSpPr>
+          <p:cNvPr id="120" name="Connector: Elbow 119">
+            <a:extLst>
+              <a:ext uri="{FF2B5EF4-FFF2-40B4-BE49-F238E27FC236}">
+                <a16:creationId xmlns:a16="http://schemas.microsoft.com/office/drawing/2014/main" id="{BA30DD14-653D-4781-808D-170AE61C2995}"/>
+              </a:ext>
+            </a:extLst>
+          </p:cNvPr>
+          <p:cNvCxnSpPr>
+            <a:cxnSpLocks/>
+            <a:stCxn id="4" idx="2"/>
+          </p:cNvCxnSpPr>
+          <p:nvPr/>
+        </p:nvCxnSpPr>
+        <p:spPr>
+          <a:xfrm rot="16200000" flipH="1">
+            <a:off x="5339178" y="2413392"/>
+            <a:ext cx="1114317" cy="852019"/>
+          </a:xfrm>
+          <a:prstGeom prst="bentConnector3">
+            <a:avLst>
+              <a:gd name="adj1" fmla="val 50000"/>
+            </a:avLst>
+          </a:prstGeom>
+          <a:ln>
+            <a:tailEnd type="triangle"/>
+          </a:ln>
+        </p:spPr>
+        <p:style>
+          <a:lnRef idx="1">
+            <a:schemeClr val="accent1"/>
+          </a:lnRef>
+          <a:fillRef idx="0">
+            <a:schemeClr val="accent1"/>
+          </a:fillRef>
+          <a:effectRef idx="0">
+            <a:schemeClr val="accent1"/>
+          </a:effectRef>
+          <a:fontRef idx="minor">
+            <a:schemeClr val="tx1"/>
+          </a:fontRef>
+        </p:style>
+      </p:cxnSp>
+      <p:cxnSp>
+        <p:nvCxnSpPr>
+          <p:cNvPr id="123" name="Connector: Elbow 122">
+            <a:extLst>
+              <a:ext uri="{FF2B5EF4-FFF2-40B4-BE49-F238E27FC236}">
+                <a16:creationId xmlns:a16="http://schemas.microsoft.com/office/drawing/2014/main" id="{82AD2820-68B8-4E6E-920A-3707DBBDE40A}"/>
+              </a:ext>
+            </a:extLst>
+          </p:cNvPr>
+          <p:cNvCxnSpPr>
+            <a:cxnSpLocks/>
+          </p:cNvCxnSpPr>
+          <p:nvPr/>
+        </p:nvCxnSpPr>
+        <p:spPr>
+          <a:xfrm rot="5400000">
+            <a:off x="6519535" y="2421330"/>
+            <a:ext cx="1082964" cy="820034"/>
+          </a:xfrm>
+          <a:prstGeom prst="bentConnector3">
+            <a:avLst>
+              <a:gd name="adj1" fmla="val 50000"/>
+            </a:avLst>
+          </a:prstGeom>
+          <a:ln>
+            <a:tailEnd type="triangle"/>
+          </a:ln>
+        </p:spPr>
+        <p:style>
+          <a:lnRef idx="1">
+            <a:schemeClr val="accent1"/>
+          </a:lnRef>
+          <a:fillRef idx="0">
+            <a:schemeClr val="accent1"/>
+          </a:fillRef>
+          <a:effectRef idx="0">
+            <a:schemeClr val="accent1"/>
+          </a:effectRef>
+          <a:fontRef idx="minor">
+            <a:schemeClr val="tx1"/>
+          </a:fontRef>
+        </p:style>
+      </p:cxnSp>
+      <p:cxnSp>
+        <p:nvCxnSpPr>
+          <p:cNvPr id="1024" name="Connector: Elbow 1023">
+            <a:extLst>
+              <a:ext uri="{FF2B5EF4-FFF2-40B4-BE49-F238E27FC236}">
+                <a16:creationId xmlns:a16="http://schemas.microsoft.com/office/drawing/2014/main" id="{2762904E-E081-4E0C-8842-D4056B630364}"/>
+              </a:ext>
+            </a:extLst>
+          </p:cNvPr>
+          <p:cNvCxnSpPr>
+            <a:cxnSpLocks/>
+          </p:cNvCxnSpPr>
+          <p:nvPr/>
+        </p:nvCxnSpPr>
+        <p:spPr>
+          <a:xfrm rot="16200000" flipH="1">
+            <a:off x="7802036" y="2420064"/>
+            <a:ext cx="1069660" cy="820036"/>
+          </a:xfrm>
+          <a:prstGeom prst="bentConnector3">
+            <a:avLst>
+              <a:gd name="adj1" fmla="val 50000"/>
+            </a:avLst>
+          </a:prstGeom>
+          <a:ln>
+            <a:prstDash val="dash"/>
+            <a:tailEnd type="triangle"/>
+          </a:ln>
+        </p:spPr>
+        <p:style>
+          <a:lnRef idx="1">
+            <a:schemeClr val="accent1"/>
+          </a:lnRef>
+          <a:fillRef idx="0">
+            <a:schemeClr val="accent1"/>
+          </a:fillRef>
+          <a:effectRef idx="0">
+            <a:schemeClr val="accent1"/>
+          </a:effectRef>
+          <a:fontRef idx="minor">
+            <a:schemeClr val="tx1"/>
+          </a:fontRef>
+        </p:style>
+      </p:cxnSp>
+      <p:sp>
+        <p:nvSpPr>
+          <p:cNvPr id="5" name="TextBox 4">
+            <a:extLst>
+              <a:ext uri="{FF2B5EF4-FFF2-40B4-BE49-F238E27FC236}">
+                <a16:creationId xmlns:a16="http://schemas.microsoft.com/office/drawing/2014/main" id="{0254268D-6166-4529-B134-DA207A20F5DF}"/>
+              </a:ext>
+            </a:extLst>
+          </p:cNvPr>
+          <p:cNvSpPr txBox="1"/>
+          <p:nvPr/>
+        </p:nvSpPr>
+        <p:spPr>
+          <a:xfrm>
+            <a:off x="5442555" y="2331248"/>
+            <a:ext cx="717976" cy="400110"/>
+          </a:xfrm>
+          <a:prstGeom prst="rect">
+            <a:avLst/>
+          </a:prstGeom>
+          <a:noFill/>
+        </p:spPr>
+        <p:txBody>
+          <a:bodyPr wrap="square">
+            <a:spAutoFit/>
+          </a:bodyPr>
+          <a:lstStyle>
+            <a:defPPr>
+              <a:defRPr lang="en-US"/>
+            </a:defPPr>
+            <a:lvl1pPr algn="ctr">
+              <a:defRPr sz="1000"/>
+            </a:lvl1pPr>
+          </a:lstStyle>
+          <a:p>
+            <a:pPr algn="l"/>
+            <a:r>
+              <a:rPr lang="en-US" dirty="0"/>
+              <a:t>APP IMAGE</a:t>
+            </a:r>
+          </a:p>
+        </p:txBody>
+      </p:sp>
+      <p:cxnSp>
+        <p:nvCxnSpPr>
+          <p:cNvPr id="2" name="Connector: Elbow 1">
+            <a:extLst>
+              <a:ext uri="{FF2B5EF4-FFF2-40B4-BE49-F238E27FC236}">
+                <a16:creationId xmlns:a16="http://schemas.microsoft.com/office/drawing/2014/main" id="{9FABF8EA-A0B1-4B1E-AB68-3A9895C3F009}"/>
+              </a:ext>
+            </a:extLst>
+          </p:cNvPr>
+          <p:cNvCxnSpPr>
+            <a:cxnSpLocks/>
+            <a:stCxn id="7" idx="2"/>
+            <a:endCxn id="1036" idx="1"/>
+          </p:cNvCxnSpPr>
+          <p:nvPr/>
+        </p:nvCxnSpPr>
+        <p:spPr>
+          <a:xfrm rot="16200000" flipH="1">
+            <a:off x="7340720" y="3316249"/>
+            <a:ext cx="329717" cy="2020643"/>
+          </a:xfrm>
+          <a:prstGeom prst="bentConnector2">
+            <a:avLst/>
+          </a:prstGeom>
+          <a:ln>
+            <a:tailEnd type="triangle"/>
+          </a:ln>
+        </p:spPr>
+        <p:style>
+          <a:lnRef idx="1">
+            <a:schemeClr val="accent1"/>
+          </a:lnRef>
+          <a:fillRef idx="0">
+            <a:schemeClr val="accent1"/>
+          </a:fillRef>
+          <a:effectRef idx="0">
+            <a:schemeClr val="accent1"/>
+          </a:effectRef>
+          <a:fontRef idx="minor">
+            <a:schemeClr val="tx1"/>
+          </a:fontRef>
+        </p:style>
+      </p:cxnSp>
+      <p:grpSp>
+        <p:nvGrpSpPr>
+          <p:cNvPr id="40" name="Group 39">
+            <a:extLst>
+              <a:ext uri="{FF2B5EF4-FFF2-40B4-BE49-F238E27FC236}">
+                <a16:creationId xmlns:a16="http://schemas.microsoft.com/office/drawing/2014/main" id="{22CE497F-9CBA-4588-A3F3-812EAE5F16B5}"/>
+              </a:ext>
+            </a:extLst>
+          </p:cNvPr>
+          <p:cNvGrpSpPr/>
+          <p:nvPr/>
+        </p:nvGrpSpPr>
+        <p:grpSpPr>
+          <a:xfrm>
+            <a:off x="7197727" y="1525429"/>
+            <a:ext cx="1034257" cy="723885"/>
+            <a:chOff x="10465573" y="2088106"/>
+            <a:chExt cx="1034257" cy="723885"/>
+          </a:xfrm>
+        </p:grpSpPr>
+        <p:pic>
+          <p:nvPicPr>
+            <p:cNvPr id="37" name="Picture 36">
+              <a:extLst>
+                <a:ext uri="{FF2B5EF4-FFF2-40B4-BE49-F238E27FC236}">
+                  <a16:creationId xmlns:a16="http://schemas.microsoft.com/office/drawing/2014/main" id="{0FE0D012-38B4-4F64-826A-10B63FE206B9}"/>
+                </a:ext>
+              </a:extLst>
+            </p:cNvPr>
+            <p:cNvPicPr>
+              <a:picLocks noChangeAspect="1"/>
+            </p:cNvPicPr>
+            <p:nvPr/>
+          </p:nvPicPr>
+          <p:blipFill>
+            <a:blip r:embed="rId9"/>
+            <a:stretch>
+              <a:fillRect/>
+            </a:stretch>
+          </p:blipFill>
+          <p:spPr>
+            <a:xfrm>
+              <a:off x="10715989" y="2088106"/>
+              <a:ext cx="533427" cy="520727"/>
+            </a:xfrm>
+            <a:prstGeom prst="rect">
+              <a:avLst/>
+            </a:prstGeom>
+          </p:spPr>
+        </p:pic>
+        <p:sp>
+          <p:nvSpPr>
+            <p:cNvPr id="73" name="TextBox 72">
+              <a:extLst>
+                <a:ext uri="{FF2B5EF4-FFF2-40B4-BE49-F238E27FC236}">
+                  <a16:creationId xmlns:a16="http://schemas.microsoft.com/office/drawing/2014/main" id="{9123938A-CC83-4815-AAFE-2EEB2D9A0FED}"/>
+                </a:ext>
+              </a:extLst>
+            </p:cNvPr>
+            <p:cNvSpPr txBox="1"/>
+            <p:nvPr/>
+          </p:nvSpPr>
+          <p:spPr>
+            <a:xfrm>
+              <a:off x="10465573" y="2565770"/>
+              <a:ext cx="1034257" cy="246221"/>
+            </a:xfrm>
+            <a:prstGeom prst="rect">
+              <a:avLst/>
+            </a:prstGeom>
+            <a:solidFill>
+              <a:schemeClr val="bg1"/>
+            </a:solidFill>
+          </p:spPr>
+          <p:txBody>
+            <a:bodyPr wrap="none" rtlCol="0">
+              <a:spAutoFit/>
+            </a:bodyPr>
+            <a:lstStyle>
+              <a:defPPr>
+                <a:defRPr lang="en-US"/>
+              </a:defPPr>
+              <a:lvl1pPr>
+                <a:defRPr sz="1000"/>
+              </a:lvl1pPr>
+            </a:lstStyle>
+            <a:p>
+              <a:r>
+                <a:rPr lang="en-US" dirty="0"/>
+                <a:t>Service Principal</a:t>
+              </a:r>
+            </a:p>
+          </p:txBody>
+        </p:sp>
+      </p:grpSp>
+      <p:cxnSp>
+        <p:nvCxnSpPr>
+          <p:cNvPr id="43" name="Connector: Elbow 42">
+            <a:extLst>
+              <a:ext uri="{FF2B5EF4-FFF2-40B4-BE49-F238E27FC236}">
+                <a16:creationId xmlns:a16="http://schemas.microsoft.com/office/drawing/2014/main" id="{85812B80-F87B-4D13-85CE-4D773FA65B15}"/>
+              </a:ext>
+            </a:extLst>
+          </p:cNvPr>
+          <p:cNvCxnSpPr>
+            <a:cxnSpLocks/>
+            <a:stCxn id="37" idx="1"/>
+            <a:endCxn id="1030" idx="3"/>
+          </p:cNvCxnSpPr>
+          <p:nvPr/>
+        </p:nvCxnSpPr>
+        <p:spPr>
+          <a:xfrm rot="10800000">
+            <a:off x="5700247" y="1781251"/>
+            <a:ext cx="1747897" cy="4542"/>
+          </a:xfrm>
+          <a:prstGeom prst="bentConnector3">
+            <a:avLst>
+              <a:gd name="adj1" fmla="val 50000"/>
+            </a:avLst>
+          </a:prstGeom>
+          <a:ln>
+            <a:prstDash val="dash"/>
+            <a:tailEnd type="triangle"/>
+          </a:ln>
+        </p:spPr>
+        <p:style>
+          <a:lnRef idx="1">
+            <a:schemeClr val="accent1"/>
+          </a:lnRef>
+          <a:fillRef idx="0">
+            <a:schemeClr val="accent1"/>
+          </a:fillRef>
+          <a:effectRef idx="0">
+            <a:schemeClr val="accent1"/>
+          </a:effectRef>
+          <a:fontRef idx="minor">
+            <a:schemeClr val="tx1"/>
+          </a:fontRef>
+        </p:style>
+      </p:cxnSp>
+      <p:cxnSp>
+        <p:nvCxnSpPr>
+          <p:cNvPr id="46" name="Connector: Elbow 45">
+            <a:extLst>
+              <a:ext uri="{FF2B5EF4-FFF2-40B4-BE49-F238E27FC236}">
+                <a16:creationId xmlns:a16="http://schemas.microsoft.com/office/drawing/2014/main" id="{34DE0772-6EE8-4F55-B2A0-8AAAC8C2721F}"/>
+              </a:ext>
+            </a:extLst>
+          </p:cNvPr>
+          <p:cNvCxnSpPr>
+            <a:cxnSpLocks/>
+            <a:stCxn id="1044" idx="1"/>
+            <a:endCxn id="37" idx="3"/>
+          </p:cNvCxnSpPr>
+          <p:nvPr/>
+        </p:nvCxnSpPr>
+        <p:spPr>
+          <a:xfrm rot="10800000" flipV="1">
+            <a:off x="7981570" y="1784403"/>
+            <a:ext cx="1164158" cy="1389"/>
+          </a:xfrm>
+          <a:prstGeom prst="bentConnector3">
+            <a:avLst>
+              <a:gd name="adj1" fmla="val 50000"/>
+            </a:avLst>
+          </a:prstGeom>
+          <a:ln>
+            <a:tailEnd type="triangle"/>
+          </a:ln>
+        </p:spPr>
+        <p:style>
+          <a:lnRef idx="1">
+            <a:schemeClr val="accent1"/>
+          </a:lnRef>
+          <a:fillRef idx="0">
+            <a:schemeClr val="accent1"/>
+          </a:fillRef>
+          <a:effectRef idx="0">
+            <a:schemeClr val="accent1"/>
+          </a:effectRef>
+          <a:fontRef idx="minor">
+            <a:schemeClr val="tx1"/>
+          </a:fontRef>
+        </p:style>
+      </p:cxnSp>
+      <p:sp>
+        <p:nvSpPr>
+          <p:cNvPr id="49" name="TextBox 48">
+            <a:extLst>
+              <a:ext uri="{FF2B5EF4-FFF2-40B4-BE49-F238E27FC236}">
+                <a16:creationId xmlns:a16="http://schemas.microsoft.com/office/drawing/2014/main" id="{0787A1DF-D659-4A42-A7BD-C539F9891149}"/>
+              </a:ext>
+            </a:extLst>
+          </p:cNvPr>
+          <p:cNvSpPr txBox="1"/>
+          <p:nvPr/>
+        </p:nvSpPr>
+        <p:spPr>
+          <a:xfrm>
+            <a:off x="6338729" y="1562084"/>
+            <a:ext cx="782587" cy="246221"/>
+          </a:xfrm>
+          <a:prstGeom prst="rect">
+            <a:avLst/>
+          </a:prstGeom>
+          <a:noFill/>
+        </p:spPr>
+        <p:txBody>
+          <a:bodyPr wrap="none" rtlCol="0">
+            <a:spAutoFit/>
+          </a:bodyPr>
+          <a:lstStyle>
+            <a:defPPr>
+              <a:defRPr lang="en-US"/>
+            </a:defPPr>
+            <a:lvl1pPr>
+              <a:defRPr sz="1000"/>
+            </a:lvl1pPr>
+          </a:lstStyle>
+          <a:p>
+            <a:r>
+              <a:rPr lang="en-US" dirty="0" err="1"/>
+              <a:t>AcrPull</a:t>
+            </a:r>
+            <a:r>
+              <a:rPr lang="en-US" dirty="0"/>
+              <a:t> role</a:t>
+            </a:r>
+          </a:p>
+        </p:txBody>
+      </p:sp>
+      <p:sp>
+        <p:nvSpPr>
+          <p:cNvPr id="53" name="TextBox 52">
+            <a:extLst>
+              <a:ext uri="{FF2B5EF4-FFF2-40B4-BE49-F238E27FC236}">
+                <a16:creationId xmlns:a16="http://schemas.microsoft.com/office/drawing/2014/main" id="{79F0F370-A794-4566-B378-7C1AB72BE06C}"/>
+              </a:ext>
+            </a:extLst>
+          </p:cNvPr>
+          <p:cNvSpPr txBox="1"/>
+          <p:nvPr/>
+        </p:nvSpPr>
+        <p:spPr>
+          <a:xfrm>
+            <a:off x="8107112" y="2603513"/>
+            <a:ext cx="537327" cy="246221"/>
+          </a:xfrm>
+          <a:prstGeom prst="rect">
+            <a:avLst/>
+          </a:prstGeom>
+          <a:noFill/>
+        </p:spPr>
+        <p:txBody>
+          <a:bodyPr wrap="none" rtlCol="0">
+            <a:spAutoFit/>
+          </a:bodyPr>
+          <a:lstStyle>
+            <a:defPPr>
+              <a:defRPr lang="en-US"/>
+            </a:defPPr>
+            <a:lvl1pPr>
+              <a:defRPr sz="1000"/>
+            </a:lvl1pPr>
+          </a:lstStyle>
+          <a:p>
+            <a:r>
+              <a:rPr lang="en-US" dirty="0"/>
+              <a:t>?? role</a:t>
+            </a:r>
+          </a:p>
+        </p:txBody>
+      </p:sp>
+      <p:sp>
+        <p:nvSpPr>
+          <p:cNvPr id="24" name="TextBox 23">
+            <a:extLst>
+              <a:ext uri="{FF2B5EF4-FFF2-40B4-BE49-F238E27FC236}">
+                <a16:creationId xmlns:a16="http://schemas.microsoft.com/office/drawing/2014/main" id="{2A7E78FA-4CC1-4EB7-A5E2-BB950D3AC2F1}"/>
+              </a:ext>
+            </a:extLst>
+          </p:cNvPr>
+          <p:cNvSpPr txBox="1"/>
+          <p:nvPr/>
+        </p:nvSpPr>
+        <p:spPr>
+          <a:xfrm>
+            <a:off x="1461873" y="2888951"/>
+            <a:ext cx="1143848" cy="307777"/>
+          </a:xfrm>
+          <a:prstGeom prst="rect">
+            <a:avLst/>
+          </a:prstGeom>
+          <a:noFill/>
+        </p:spPr>
+        <p:txBody>
+          <a:bodyPr wrap="square">
+            <a:spAutoFit/>
+          </a:bodyPr>
+          <a:lstStyle/>
+          <a:p>
+            <a:r>
+              <a:rPr lang="en-US" sz="1400" dirty="0"/>
+              <a:t>deployAll.sh</a:t>
+            </a:r>
+          </a:p>
+        </p:txBody>
+      </p:sp>
+      <p:sp>
+        <p:nvSpPr>
+          <p:cNvPr id="72" name="TextBox 71">
+            <a:extLst>
+              <a:ext uri="{FF2B5EF4-FFF2-40B4-BE49-F238E27FC236}">
+                <a16:creationId xmlns:a16="http://schemas.microsoft.com/office/drawing/2014/main" id="{31B4D491-200F-4FAC-9929-76CD0E4C175F}"/>
+              </a:ext>
+            </a:extLst>
+          </p:cNvPr>
+          <p:cNvSpPr txBox="1"/>
+          <p:nvPr/>
+        </p:nvSpPr>
+        <p:spPr>
+          <a:xfrm>
+            <a:off x="4572528" y="1144584"/>
+            <a:ext cx="1667177" cy="276999"/>
+          </a:xfrm>
+          <a:prstGeom prst="rect">
+            <a:avLst/>
+          </a:prstGeom>
+          <a:noFill/>
+        </p:spPr>
+        <p:txBody>
+          <a:bodyPr wrap="square">
+            <a:spAutoFit/>
+          </a:bodyPr>
+          <a:lstStyle/>
+          <a:p>
+            <a:r>
+              <a:rPr lang="en-US" sz="1200" dirty="0">
+                <a:solidFill>
+                  <a:srgbClr val="FF0000"/>
+                </a:solidFill>
+              </a:rPr>
+              <a:t>PRE-REQUISITE</a:t>
+            </a:r>
+          </a:p>
+        </p:txBody>
+      </p:sp>
+    </p:spTree>
+    <p:extLst>
+      <p:ext uri="{BB962C8B-B14F-4D97-AF65-F5344CB8AC3E}">
+        <p14:creationId xmlns:p14="http://schemas.microsoft.com/office/powerpoint/2010/main" val="377857797"/>
+      </p:ext>
+    </p:extLst>
+  </p:cSld>
+  <p:clrMapOvr>
+    <a:masterClrMapping/>
+  </p:clrMapOvr>
+</p:sld>
+</file>
+
+<file path=ppt/slides/slide6.xml><?xml version="1.0" encoding="utf-8"?>
+<p:sld xmlns:a="http://schemas.openxmlformats.org/drawingml/2006/main" xmlns:r="http://schemas.openxmlformats.org/officeDocument/2006/relationships" xmlns:p="http://schemas.openxmlformats.org/presentationml/2006/main">
+  <p:cSld>
+    <p:spTree>
+      <p:nvGrpSpPr>
+        <p:cNvPr id="1" name=""/>
+        <p:cNvGrpSpPr/>
+        <p:nvPr/>
+      </p:nvGrpSpPr>
+      <p:grpSpPr>
+        <a:xfrm>
+          <a:off x="0" y="0"/>
+          <a:ext cx="0" cy="0"/>
+          <a:chOff x="0" y="0"/>
+          <a:chExt cx="0" cy="0"/>
+        </a:xfrm>
+      </p:grpSpPr>
+      <p:sp>
+        <p:nvSpPr>
+          <p:cNvPr id="32" name="Rectangle: Rounded Corners 31">
+            <a:extLst>
+              <a:ext uri="{FF2B5EF4-FFF2-40B4-BE49-F238E27FC236}">
+                <a16:creationId xmlns:a16="http://schemas.microsoft.com/office/drawing/2014/main" id="{278B6650-E555-466B-82DD-BFAA9EE21385}"/>
+              </a:ext>
+            </a:extLst>
+          </p:cNvPr>
+          <p:cNvSpPr/>
+          <p:nvPr/>
+        </p:nvSpPr>
+        <p:spPr>
+          <a:xfrm>
+            <a:off x="1784599" y="3648118"/>
+            <a:ext cx="8162580" cy="2563010"/>
+          </a:xfrm>
+          <a:prstGeom prst="roundRect">
+            <a:avLst>
+              <a:gd name="adj" fmla="val 4345"/>
+            </a:avLst>
+          </a:prstGeom>
+        </p:spPr>
+        <p:style>
+          <a:lnRef idx="2">
+            <a:schemeClr val="accent1"/>
+          </a:lnRef>
+          <a:fillRef idx="1">
+            <a:schemeClr val="lt1"/>
+          </a:fillRef>
+          <a:effectRef idx="0">
+            <a:schemeClr val="accent1"/>
+          </a:effectRef>
+          <a:fontRef idx="minor">
+            <a:schemeClr val="dk1"/>
+          </a:fontRef>
+        </p:style>
+        <p:txBody>
+          <a:bodyPr rtlCol="0" anchor="ctr"/>
+          <a:lstStyle/>
+          <a:p>
+            <a:pPr algn="ctr"/>
+            <a:endParaRPr lang="en-US"/>
+          </a:p>
+        </p:txBody>
+      </p:sp>
+      <p:sp>
+        <p:nvSpPr>
+          <p:cNvPr id="8" name="Rectangle 7">
+            <a:extLst>
+              <a:ext uri="{FF2B5EF4-FFF2-40B4-BE49-F238E27FC236}">
+                <a16:creationId xmlns:a16="http://schemas.microsoft.com/office/drawing/2014/main" id="{C3640122-F9F0-4651-B039-C234418BF22D}"/>
+              </a:ext>
+            </a:extLst>
+          </p:cNvPr>
+          <p:cNvSpPr/>
+          <p:nvPr/>
+        </p:nvSpPr>
+        <p:spPr>
+          <a:xfrm>
+            <a:off x="7030862" y="4040958"/>
+            <a:ext cx="2195476" cy="997844"/>
+          </a:xfrm>
+          <a:prstGeom prst="rect">
+            <a:avLst/>
+          </a:prstGeom>
+          <a:ln>
+            <a:prstDash val="sysDash"/>
+          </a:ln>
+        </p:spPr>
+        <p:style>
+          <a:lnRef idx="2">
+            <a:schemeClr val="accent1"/>
+          </a:lnRef>
+          <a:fillRef idx="1">
+            <a:schemeClr val="lt1"/>
+          </a:fillRef>
+          <a:effectRef idx="0">
+            <a:schemeClr val="accent1"/>
+          </a:effectRef>
+          <a:fontRef idx="minor">
+            <a:schemeClr val="dk1"/>
+          </a:fontRef>
+        </p:style>
+        <p:txBody>
+          <a:bodyPr rtlCol="0" anchor="ctr"/>
+          <a:lstStyle/>
+          <a:p>
+            <a:pPr algn="ctr"/>
+            <a:endParaRPr lang="en-US" dirty="0"/>
+          </a:p>
+        </p:txBody>
+      </p:sp>
+      <p:sp>
+        <p:nvSpPr>
+          <p:cNvPr id="50" name="Rectangle 49">
+            <a:extLst>
+              <a:ext uri="{FF2B5EF4-FFF2-40B4-BE49-F238E27FC236}">
+                <a16:creationId xmlns:a16="http://schemas.microsoft.com/office/drawing/2014/main" id="{8AEF91B3-317A-4AC7-9752-3F5D697AC46D}"/>
+              </a:ext>
+            </a:extLst>
+          </p:cNvPr>
+          <p:cNvSpPr/>
+          <p:nvPr/>
+        </p:nvSpPr>
+        <p:spPr>
+          <a:xfrm>
+            <a:off x="2568863" y="4047038"/>
+            <a:ext cx="4216859" cy="2052020"/>
+          </a:xfrm>
+          <a:prstGeom prst="rect">
+            <a:avLst/>
+          </a:prstGeom>
+          <a:ln>
+            <a:prstDash val="sysDash"/>
+          </a:ln>
+        </p:spPr>
+        <p:style>
+          <a:lnRef idx="2">
+            <a:schemeClr val="accent1"/>
+          </a:lnRef>
+          <a:fillRef idx="1">
+            <a:schemeClr val="lt1"/>
+          </a:fillRef>
+          <a:effectRef idx="0">
+            <a:schemeClr val="accent1"/>
+          </a:effectRef>
+          <a:fontRef idx="minor">
+            <a:schemeClr val="dk1"/>
+          </a:fontRef>
+        </p:style>
+        <p:txBody>
+          <a:bodyPr rtlCol="0" anchor="ctr"/>
+          <a:lstStyle/>
+          <a:p>
+            <a:pPr algn="ctr"/>
+            <a:endParaRPr lang="en-US" dirty="0"/>
+          </a:p>
+        </p:txBody>
+      </p:sp>
+      <p:cxnSp>
+        <p:nvCxnSpPr>
+          <p:cNvPr id="80" name="Straight Arrow Connector 79">
+            <a:extLst>
+              <a:ext uri="{FF2B5EF4-FFF2-40B4-BE49-F238E27FC236}">
+                <a16:creationId xmlns:a16="http://schemas.microsoft.com/office/drawing/2014/main" id="{0FA12451-5CF3-4ECF-B2F8-9BADEEE76E0C}"/>
+              </a:ext>
+            </a:extLst>
+          </p:cNvPr>
+          <p:cNvCxnSpPr>
+            <a:cxnSpLocks/>
+          </p:cNvCxnSpPr>
+          <p:nvPr/>
+        </p:nvCxnSpPr>
+        <p:spPr>
+          <a:xfrm flipV="1">
+            <a:off x="4622479" y="5671078"/>
+            <a:ext cx="2442349" cy="13506"/>
+          </a:xfrm>
+          <a:prstGeom prst="straightConnector1">
+            <a:avLst/>
+          </a:prstGeom>
+          <a:ln>
+            <a:headEnd type="triangle"/>
+            <a:tailEnd type="triangle"/>
+          </a:ln>
+        </p:spPr>
+        <p:style>
+          <a:lnRef idx="1">
+            <a:schemeClr val="accent1"/>
+          </a:lnRef>
+          <a:fillRef idx="0">
+            <a:schemeClr val="accent1"/>
+          </a:fillRef>
+          <a:effectRef idx="0">
+            <a:schemeClr val="accent1"/>
+          </a:effectRef>
+          <a:fontRef idx="minor">
+            <a:schemeClr val="tx1"/>
+          </a:fontRef>
+        </p:style>
+      </p:cxnSp>
+      <p:cxnSp>
+        <p:nvCxnSpPr>
+          <p:cNvPr id="89" name="Straight Arrow Connector 88">
+            <a:extLst>
+              <a:ext uri="{FF2B5EF4-FFF2-40B4-BE49-F238E27FC236}">
+                <a16:creationId xmlns:a16="http://schemas.microsoft.com/office/drawing/2014/main" id="{05E9D7D3-6FCB-4911-9430-8D214BDDF5E6}"/>
+              </a:ext>
+            </a:extLst>
+          </p:cNvPr>
+          <p:cNvCxnSpPr>
+            <a:cxnSpLocks/>
+          </p:cNvCxnSpPr>
+          <p:nvPr/>
+        </p:nvCxnSpPr>
+        <p:spPr>
+          <a:xfrm>
+            <a:off x="4620071" y="4681065"/>
+            <a:ext cx="2585800" cy="10036"/>
+          </a:xfrm>
+          <a:prstGeom prst="straightConnector1">
+            <a:avLst/>
+          </a:prstGeom>
+          <a:ln>
+            <a:headEnd type="triangle"/>
+            <a:tailEnd type="triangle"/>
+          </a:ln>
+        </p:spPr>
+        <p:style>
+          <a:lnRef idx="1">
+            <a:schemeClr val="accent1"/>
+          </a:lnRef>
+          <a:fillRef idx="0">
+            <a:schemeClr val="accent1"/>
+          </a:fillRef>
+          <a:effectRef idx="0">
+            <a:schemeClr val="accent1"/>
+          </a:effectRef>
+          <a:fontRef idx="minor">
+            <a:schemeClr val="tx1"/>
+          </a:fontRef>
+        </p:style>
+      </p:cxnSp>
+      <p:sp>
+        <p:nvSpPr>
+          <p:cNvPr id="102" name="TextBox 101">
+            <a:extLst>
+              <a:ext uri="{FF2B5EF4-FFF2-40B4-BE49-F238E27FC236}">
+                <a16:creationId xmlns:a16="http://schemas.microsoft.com/office/drawing/2014/main" id="{6AFAB64A-C9D6-413B-A8C5-37D668E936B1}"/>
+              </a:ext>
+            </a:extLst>
+          </p:cNvPr>
+          <p:cNvSpPr txBox="1"/>
+          <p:nvPr/>
+        </p:nvSpPr>
+        <p:spPr>
+          <a:xfrm>
+            <a:off x="7397643" y="5453507"/>
+            <a:ext cx="1834733" cy="276999"/>
+          </a:xfrm>
+          <a:prstGeom prst="rect">
+            <a:avLst/>
+          </a:prstGeom>
+          <a:noFill/>
+        </p:spPr>
+        <p:txBody>
+          <a:bodyPr wrap="square">
+            <a:spAutoFit/>
+          </a:bodyPr>
+          <a:lstStyle/>
+          <a:p>
+            <a:r>
+              <a:rPr lang="en-US" sz="1200" dirty="0"/>
+              <a:t>encrypted secrets store</a:t>
+            </a:r>
+          </a:p>
+        </p:txBody>
+      </p:sp>
+      <p:pic>
+        <p:nvPicPr>
+          <p:cNvPr id="1040" name="Picture 16" descr="See the source image">
+            <a:extLst>
+              <a:ext uri="{FF2B5EF4-FFF2-40B4-BE49-F238E27FC236}">
+                <a16:creationId xmlns:a16="http://schemas.microsoft.com/office/drawing/2014/main" id="{9AE115E1-77A8-47CC-AD9C-C8C64FF2EFB4}"/>
+              </a:ext>
+            </a:extLst>
+          </p:cNvPr>
+          <p:cNvPicPr>
+            <a:picLocks noChangeAspect="1" noChangeArrowheads="1"/>
+          </p:cNvPicPr>
+          <p:nvPr/>
+        </p:nvPicPr>
+        <p:blipFill>
+          <a:blip r:embed="rId2">
+            <a:extLst>
+              <a:ext uri="{28A0092B-C50C-407E-A947-70E740481C1C}">
+                <a14:useLocalDpi xmlns:a14="http://schemas.microsoft.com/office/drawing/2010/main" val="0"/>
+              </a:ext>
+            </a:extLst>
+          </a:blip>
+          <a:srcRect/>
+          <a:stretch>
+            <a:fillRect/>
+          </a:stretch>
+        </p:blipFill>
+        <p:spPr bwMode="auto">
+          <a:xfrm>
+            <a:off x="7064828" y="5479562"/>
+            <a:ext cx="339558" cy="360947"/>
+          </a:xfrm>
+          <a:prstGeom prst="rect">
+            <a:avLst/>
+          </a:prstGeom>
+          <a:noFill/>
+          <a:extLst>
+            <a:ext uri="{909E8E84-426E-40DD-AFC4-6F175D3DCCD1}">
+              <a14:hiddenFill xmlns:a14="http://schemas.microsoft.com/office/drawing/2010/main">
+                <a:solidFill>
+                  <a:srgbClr val="FFFFFF"/>
+                </a:solidFill>
+              </a14:hiddenFill>
+            </a:ext>
+          </a:extLst>
+        </p:spPr>
+      </p:pic>
+      <p:pic>
+        <p:nvPicPr>
+          <p:cNvPr id="18" name="Picture 2" descr="See related image detail">
+            <a:extLst>
+              <a:ext uri="{FF2B5EF4-FFF2-40B4-BE49-F238E27FC236}">
+                <a16:creationId xmlns:a16="http://schemas.microsoft.com/office/drawing/2014/main" id="{1C691ACB-EADE-4C97-B0B1-9807C68EA70E}"/>
+              </a:ext>
+            </a:extLst>
+          </p:cNvPr>
+          <p:cNvPicPr>
+            <a:picLocks noChangeAspect="1" noChangeArrowheads="1"/>
+          </p:cNvPicPr>
+          <p:nvPr/>
+        </p:nvPicPr>
+        <p:blipFill>
+          <a:blip r:embed="rId3">
+            <a:clrChange>
+              <a:clrFrom>
+                <a:srgbClr val="F6F6F6"/>
+              </a:clrFrom>
+              <a:clrTo>
+                <a:srgbClr val="F6F6F6">
+                  <a:alpha val="0"/>
+                </a:srgbClr>
+              </a:clrTo>
+            </a:clrChange>
+            <a:extLst>
+              <a:ext uri="{28A0092B-C50C-407E-A947-70E740481C1C}">
+                <a14:useLocalDpi xmlns:a14="http://schemas.microsoft.com/office/drawing/2010/main" val="0"/>
+              </a:ext>
+            </a:extLst>
+          </a:blip>
+          <a:srcRect/>
+          <a:stretch>
+            <a:fillRect/>
+          </a:stretch>
+        </p:blipFill>
+        <p:spPr bwMode="auto">
+          <a:xfrm>
+            <a:off x="7257785" y="4245568"/>
+            <a:ext cx="458245" cy="564461"/>
+          </a:xfrm>
+          <a:prstGeom prst="rect">
+            <a:avLst/>
+          </a:prstGeom>
+          <a:noFill/>
+          <a:extLst>
+            <a:ext uri="{909E8E84-426E-40DD-AFC4-6F175D3DCCD1}">
+              <a14:hiddenFill xmlns:a14="http://schemas.microsoft.com/office/drawing/2010/main">
+                <a:solidFill>
+                  <a:srgbClr val="FFFFFF"/>
+                </a:solidFill>
+              </a14:hiddenFill>
+            </a:ext>
+          </a:extLst>
+        </p:spPr>
+      </p:pic>
+      <p:sp>
+        <p:nvSpPr>
+          <p:cNvPr id="54" name="TextBox 53">
+            <a:extLst>
+              <a:ext uri="{FF2B5EF4-FFF2-40B4-BE49-F238E27FC236}">
+                <a16:creationId xmlns:a16="http://schemas.microsoft.com/office/drawing/2014/main" id="{54E692B2-A5E1-4DF6-9FF8-EFE62655F428}"/>
+              </a:ext>
+            </a:extLst>
+          </p:cNvPr>
+          <p:cNvSpPr txBox="1"/>
+          <p:nvPr/>
+        </p:nvSpPr>
+        <p:spPr>
+          <a:xfrm>
+            <a:off x="7397643" y="5641766"/>
+            <a:ext cx="2606132" cy="230832"/>
+          </a:xfrm>
+          <a:prstGeom prst="rect">
+            <a:avLst/>
+          </a:prstGeom>
+          <a:noFill/>
+        </p:spPr>
+        <p:txBody>
+          <a:bodyPr wrap="square">
+            <a:spAutoFit/>
+          </a:bodyPr>
+          <a:lstStyle/>
+          <a:p>
+            <a:r>
+              <a:rPr lang="en-US" sz="900" b="0" dirty="0">
+                <a:solidFill>
+                  <a:srgbClr val="CE9178"/>
+                </a:solidFill>
+                <a:effectLst/>
+                <a:latin typeface="Consolas" panose="020B0609020204030204" pitchFamily="49" charset="0"/>
+              </a:rPr>
+              <a:t>"/</a:t>
+            </a:r>
+            <a:r>
+              <a:rPr lang="en-US" sz="900" b="0" dirty="0" err="1">
+                <a:solidFill>
+                  <a:srgbClr val="CE9178"/>
+                </a:solidFill>
+                <a:effectLst/>
+                <a:latin typeface="Consolas" panose="020B0609020204030204" pitchFamily="49" charset="0"/>
+              </a:rPr>
+              <a:t>usr</a:t>
+            </a:r>
+            <a:r>
+              <a:rPr lang="en-US" sz="900" b="0" dirty="0">
+                <a:solidFill>
+                  <a:srgbClr val="CE9178"/>
+                </a:solidFill>
+                <a:effectLst/>
+                <a:latin typeface="Consolas" panose="020B0609020204030204" pitchFamily="49" charset="0"/>
+              </a:rPr>
+              <a:t>/local/cache/</a:t>
+            </a:r>
+            <a:r>
+              <a:rPr lang="en-US" sz="900" b="0" dirty="0" err="1">
+                <a:solidFill>
+                  <a:srgbClr val="CE9178"/>
+                </a:solidFill>
+                <a:effectLst/>
+                <a:latin typeface="Consolas" panose="020B0609020204030204" pitchFamily="49" charset="0"/>
+              </a:rPr>
+              <a:t>secrets.json</a:t>
+            </a:r>
+            <a:r>
+              <a:rPr lang="en-US" sz="900" b="0" dirty="0">
+                <a:solidFill>
+                  <a:srgbClr val="CE9178"/>
+                </a:solidFill>
+                <a:effectLst/>
+                <a:latin typeface="Consolas" panose="020B0609020204030204" pitchFamily="49" charset="0"/>
+              </a:rPr>
+              <a:t>"</a:t>
+            </a:r>
+            <a:endParaRPr lang="en-US" sz="900" b="0" dirty="0">
+              <a:solidFill>
+                <a:srgbClr val="D4D4D4"/>
+              </a:solidFill>
+              <a:effectLst/>
+              <a:latin typeface="Consolas" panose="020B0609020204030204" pitchFamily="49" charset="0"/>
+            </a:endParaRPr>
+          </a:p>
+        </p:txBody>
+      </p:sp>
+      <p:sp>
+        <p:nvSpPr>
+          <p:cNvPr id="26" name="Rectangle 25">
+            <a:extLst>
+              <a:ext uri="{FF2B5EF4-FFF2-40B4-BE49-F238E27FC236}">
+                <a16:creationId xmlns:a16="http://schemas.microsoft.com/office/drawing/2014/main" id="{C2696ED8-823C-4AC1-A0BB-1B2DF4BEF8D2}"/>
+              </a:ext>
+            </a:extLst>
+          </p:cNvPr>
+          <p:cNvSpPr/>
+          <p:nvPr/>
+        </p:nvSpPr>
+        <p:spPr>
+          <a:xfrm>
+            <a:off x="2781828" y="5444617"/>
+            <a:ext cx="1832810" cy="452921"/>
+          </a:xfrm>
+          <a:prstGeom prst="rect">
+            <a:avLst/>
+          </a:prstGeom>
+        </p:spPr>
+        <p:style>
+          <a:lnRef idx="2">
+            <a:schemeClr val="accent1"/>
+          </a:lnRef>
+          <a:fillRef idx="1">
+            <a:schemeClr val="lt1"/>
+          </a:fillRef>
+          <a:effectRef idx="0">
+            <a:schemeClr val="accent1"/>
+          </a:effectRef>
+          <a:fontRef idx="minor">
+            <a:schemeClr val="dk1"/>
+          </a:fontRef>
+        </p:style>
+        <p:txBody>
+          <a:bodyPr rtlCol="0" anchor="ctr"/>
+          <a:lstStyle/>
+          <a:p>
+            <a:pPr algn="ctr"/>
+            <a:r>
+              <a:rPr lang="en-US" sz="1100" dirty="0" err="1">
+                <a:solidFill>
+                  <a:srgbClr val="569CD6"/>
+                </a:solidFill>
+                <a:latin typeface="Cascadia Code" panose="020B0609020000020004" pitchFamily="49" charset="0"/>
+                <a:cs typeface="Cascadia Code" panose="020B0609020000020004" pitchFamily="49" charset="0"/>
+              </a:rPr>
+              <a:t>SecretManagerClient</a:t>
+            </a:r>
+            <a:endParaRPr lang="en-US" sz="1100" dirty="0">
+              <a:solidFill>
+                <a:srgbClr val="569CD6"/>
+              </a:solidFill>
+              <a:latin typeface="Cascadia Code" panose="020B0609020000020004" pitchFamily="49" charset="0"/>
+              <a:cs typeface="Cascadia Code" panose="020B0609020000020004" pitchFamily="49" charset="0"/>
+            </a:endParaRPr>
+          </a:p>
+        </p:txBody>
+      </p:sp>
+      <p:sp>
+        <p:nvSpPr>
+          <p:cNvPr id="38" name="Rectangle 37">
+            <a:extLst>
+              <a:ext uri="{FF2B5EF4-FFF2-40B4-BE49-F238E27FC236}">
+                <a16:creationId xmlns:a16="http://schemas.microsoft.com/office/drawing/2014/main" id="{3F41CE74-8BD1-4E0A-AFE9-FC7EE38B3BD7}"/>
+              </a:ext>
+            </a:extLst>
+          </p:cNvPr>
+          <p:cNvSpPr/>
+          <p:nvPr/>
+        </p:nvSpPr>
+        <p:spPr>
+          <a:xfrm>
+            <a:off x="2781828" y="4225158"/>
+            <a:ext cx="1832810" cy="588453"/>
+          </a:xfrm>
+          <a:prstGeom prst="rect">
+            <a:avLst/>
+          </a:prstGeom>
+        </p:spPr>
+        <p:style>
+          <a:lnRef idx="2">
+            <a:schemeClr val="accent1"/>
+          </a:lnRef>
+          <a:fillRef idx="1">
+            <a:schemeClr val="lt1"/>
+          </a:fillRef>
+          <a:effectRef idx="0">
+            <a:schemeClr val="accent1"/>
+          </a:effectRef>
+          <a:fontRef idx="minor">
+            <a:schemeClr val="dk1"/>
+          </a:fontRef>
+        </p:style>
+        <p:txBody>
+          <a:bodyPr rtlCol="0" anchor="ctr"/>
+          <a:lstStyle/>
+          <a:p>
+            <a:pPr algn="ctr"/>
+            <a:r>
+              <a:rPr lang="en-US" sz="1200" b="0" dirty="0" err="1">
+                <a:solidFill>
+                  <a:srgbClr val="569CD6"/>
+                </a:solidFill>
+                <a:effectLst/>
+                <a:latin typeface="Cascadia Code" panose="020B0609020000020004" pitchFamily="49" charset="0"/>
+                <a:cs typeface="Cascadia Code" panose="020B0609020000020004" pitchFamily="49" charset="0"/>
+              </a:rPr>
+              <a:t>InfluxDBClient</a:t>
+            </a:r>
+            <a:endParaRPr lang="en-US" sz="1200" dirty="0"/>
+          </a:p>
+        </p:txBody>
+      </p:sp>
+      <p:cxnSp>
+        <p:nvCxnSpPr>
+          <p:cNvPr id="41" name="Straight Arrow Connector 40">
+            <a:extLst>
+              <a:ext uri="{FF2B5EF4-FFF2-40B4-BE49-F238E27FC236}">
+                <a16:creationId xmlns:a16="http://schemas.microsoft.com/office/drawing/2014/main" id="{4A222ED1-049E-4F09-AC1F-C6375493776E}"/>
+              </a:ext>
+            </a:extLst>
+          </p:cNvPr>
+          <p:cNvCxnSpPr>
+            <a:cxnSpLocks/>
+          </p:cNvCxnSpPr>
+          <p:nvPr/>
+        </p:nvCxnSpPr>
+        <p:spPr>
+          <a:xfrm flipV="1">
+            <a:off x="2964302" y="4813611"/>
+            <a:ext cx="0" cy="631006"/>
+          </a:xfrm>
+          <a:prstGeom prst="straightConnector1">
+            <a:avLst/>
+          </a:prstGeom>
+          <a:ln>
+            <a:headEnd type="triangle"/>
+            <a:tailEnd type="triangle"/>
+          </a:ln>
+        </p:spPr>
+        <p:style>
+          <a:lnRef idx="1">
+            <a:schemeClr val="accent1"/>
+          </a:lnRef>
+          <a:fillRef idx="0">
+            <a:schemeClr val="accent1"/>
+          </a:fillRef>
+          <a:effectRef idx="0">
+            <a:schemeClr val="accent1"/>
+          </a:effectRef>
+          <a:fontRef idx="minor">
+            <a:schemeClr val="tx1"/>
+          </a:fontRef>
+        </p:style>
+      </p:cxnSp>
+      <p:sp>
+        <p:nvSpPr>
+          <p:cNvPr id="78" name="TextBox 77">
+            <a:extLst>
+              <a:ext uri="{FF2B5EF4-FFF2-40B4-BE49-F238E27FC236}">
+                <a16:creationId xmlns:a16="http://schemas.microsoft.com/office/drawing/2014/main" id="{3E0DBE02-3996-496A-829D-58141B527E06}"/>
+              </a:ext>
+            </a:extLst>
+          </p:cNvPr>
+          <p:cNvSpPr txBox="1"/>
+          <p:nvPr/>
+        </p:nvSpPr>
+        <p:spPr>
+          <a:xfrm>
+            <a:off x="2965662" y="4867113"/>
+            <a:ext cx="3563893" cy="507831"/>
+          </a:xfrm>
+          <a:prstGeom prst="rect">
+            <a:avLst/>
+          </a:prstGeom>
+          <a:noFill/>
+        </p:spPr>
+        <p:txBody>
+          <a:bodyPr wrap="square">
+            <a:spAutoFit/>
+          </a:bodyPr>
+          <a:lstStyle>
+            <a:defPPr>
+              <a:defRPr lang="en-US"/>
+            </a:defPPr>
+            <a:lvl1pPr>
+              <a:defRPr sz="900" b="0">
+                <a:solidFill>
+                  <a:srgbClr val="569CD6"/>
+                </a:solidFill>
+                <a:effectLst/>
+                <a:latin typeface="Cascadia Code" panose="020B0609020000020004" pitchFamily="49" charset="0"/>
+                <a:cs typeface="Cascadia Code" panose="020B0609020000020004" pitchFamily="49" charset="0"/>
+              </a:defRPr>
+            </a:lvl1pPr>
+          </a:lstStyle>
+          <a:p>
+            <a:r>
+              <a:rPr lang="en-US" dirty="0" err="1"/>
+              <a:t>dbPassword</a:t>
+            </a:r>
+            <a:r>
+              <a:rPr lang="en-US" dirty="0"/>
+              <a:t> = await </a:t>
+            </a:r>
+          </a:p>
+          <a:p>
+            <a:r>
+              <a:rPr lang="en-US" dirty="0" err="1"/>
+              <a:t>secretManagerClient.GetSecretValueAsync</a:t>
+            </a:r>
+            <a:r>
+              <a:rPr lang="en-US" dirty="0"/>
+              <a:t>(</a:t>
+            </a:r>
+            <a:br>
+              <a:rPr lang="en-US" dirty="0"/>
+            </a:br>
+            <a:r>
+              <a:rPr lang="en-US" dirty="0"/>
+              <a:t>“</a:t>
+            </a:r>
+            <a:r>
+              <a:rPr lang="en-US" dirty="0" err="1"/>
+              <a:t>InfluxDbPassword</a:t>
+            </a:r>
+            <a:r>
+              <a:rPr lang="en-US" dirty="0"/>
+              <a:t>“, …)</a:t>
+            </a:r>
+          </a:p>
+        </p:txBody>
+      </p:sp>
+      <p:sp>
+        <p:nvSpPr>
+          <p:cNvPr id="83" name="TextBox 82">
+            <a:extLst>
+              <a:ext uri="{FF2B5EF4-FFF2-40B4-BE49-F238E27FC236}">
+                <a16:creationId xmlns:a16="http://schemas.microsoft.com/office/drawing/2014/main" id="{E8ECB9F5-4306-4A18-BADC-850CE7D59900}"/>
+              </a:ext>
+            </a:extLst>
+          </p:cNvPr>
+          <p:cNvSpPr txBox="1"/>
+          <p:nvPr/>
+        </p:nvSpPr>
+        <p:spPr>
+          <a:xfrm>
+            <a:off x="4614638" y="4150900"/>
+            <a:ext cx="2416224" cy="507831"/>
+          </a:xfrm>
+          <a:prstGeom prst="rect">
+            <a:avLst/>
+          </a:prstGeom>
+          <a:noFill/>
+        </p:spPr>
+        <p:txBody>
+          <a:bodyPr wrap="square">
+            <a:spAutoFit/>
+          </a:bodyPr>
+          <a:lstStyle/>
+          <a:p>
+            <a:r>
+              <a:rPr lang="en-US" sz="900" b="0" dirty="0" err="1">
+                <a:solidFill>
+                  <a:srgbClr val="569CD6"/>
+                </a:solidFill>
+                <a:effectLst/>
+                <a:latin typeface="Cascadia Code" panose="020B0609020000020004" pitchFamily="49" charset="0"/>
+                <a:cs typeface="Cascadia Code" panose="020B0609020000020004" pitchFamily="49" charset="0"/>
+              </a:rPr>
+              <a:t>influxDBClient</a:t>
+            </a:r>
+            <a:r>
+              <a:rPr lang="en-US" sz="900" b="0" dirty="0">
+                <a:solidFill>
+                  <a:srgbClr val="569CD6"/>
+                </a:solidFill>
+                <a:effectLst/>
+                <a:latin typeface="Cascadia Code" panose="020B0609020000020004" pitchFamily="49" charset="0"/>
+                <a:cs typeface="Cascadia Code" panose="020B0609020000020004" pitchFamily="49" charset="0"/>
+              </a:rPr>
+              <a:t> = </a:t>
+            </a:r>
+            <a:r>
+              <a:rPr lang="en-US" sz="900" b="0" dirty="0" err="1">
+                <a:solidFill>
+                  <a:srgbClr val="569CD6"/>
+                </a:solidFill>
+                <a:effectLst/>
+                <a:latin typeface="Cascadia Code" panose="020B0609020000020004" pitchFamily="49" charset="0"/>
+                <a:cs typeface="Cascadia Code" panose="020B0609020000020004" pitchFamily="49" charset="0"/>
+              </a:rPr>
+              <a:t>InfluxDBClientFactory.Create</a:t>
+            </a:r>
+            <a:r>
+              <a:rPr lang="en-US" sz="900" b="0" dirty="0">
+                <a:solidFill>
+                  <a:srgbClr val="569CD6"/>
+                </a:solidFill>
+                <a:effectLst/>
+                <a:latin typeface="Cascadia Code" panose="020B0609020000020004" pitchFamily="49" charset="0"/>
+                <a:cs typeface="Cascadia Code" panose="020B0609020000020004" pitchFamily="49" charset="0"/>
+              </a:rPr>
+              <a:t>(</a:t>
+            </a:r>
+          </a:p>
+          <a:p>
+            <a:r>
+              <a:rPr lang="en-US" sz="900" b="0" dirty="0" err="1">
+                <a:solidFill>
+                  <a:srgbClr val="569CD6"/>
+                </a:solidFill>
+                <a:effectLst/>
+                <a:latin typeface="Cascadia Code" panose="020B0609020000020004" pitchFamily="49" charset="0"/>
+                <a:cs typeface="Cascadia Code" panose="020B0609020000020004" pitchFamily="49" charset="0"/>
+              </a:rPr>
+              <a:t>url</a:t>
+            </a:r>
+            <a:r>
+              <a:rPr lang="en-US" sz="900" b="0" dirty="0">
+                <a:solidFill>
+                  <a:srgbClr val="569CD6"/>
+                </a:solidFill>
+                <a:effectLst/>
+                <a:latin typeface="Cascadia Code" panose="020B0609020000020004" pitchFamily="49" charset="0"/>
+                <a:cs typeface="Cascadia Code" panose="020B0609020000020004" pitchFamily="49" charset="0"/>
+              </a:rPr>
+              <a:t>, username, </a:t>
+            </a:r>
+            <a:r>
+              <a:rPr lang="en-US" sz="900" b="0" dirty="0" err="1">
+                <a:solidFill>
+                  <a:srgbClr val="569CD6"/>
+                </a:solidFill>
+                <a:effectLst/>
+                <a:latin typeface="Cascadia Code" panose="020B0609020000020004" pitchFamily="49" charset="0"/>
+                <a:cs typeface="Cascadia Code" panose="020B0609020000020004" pitchFamily="49" charset="0"/>
+              </a:rPr>
+              <a:t>dbPassword</a:t>
+            </a:r>
+            <a:r>
+              <a:rPr lang="en-US" sz="900" b="0" dirty="0">
+                <a:solidFill>
+                  <a:srgbClr val="569CD6"/>
+                </a:solidFill>
+                <a:effectLst/>
+                <a:latin typeface="Cascadia Code" panose="020B0609020000020004" pitchFamily="49" charset="0"/>
+                <a:cs typeface="Cascadia Code" panose="020B0609020000020004" pitchFamily="49" charset="0"/>
+              </a:rPr>
+              <a:t>);</a:t>
+            </a:r>
+            <a:endParaRPr lang="en-US" sz="900" b="0" dirty="0">
+              <a:solidFill>
+                <a:srgbClr val="D4D4D4"/>
+              </a:solidFill>
+              <a:effectLst/>
+              <a:latin typeface="Cascadia Code" panose="020B0609020000020004" pitchFamily="49" charset="0"/>
+              <a:cs typeface="Cascadia Code" panose="020B0609020000020004" pitchFamily="49" charset="0"/>
+            </a:endParaRPr>
+          </a:p>
+        </p:txBody>
+      </p:sp>
+      <p:sp>
+        <p:nvSpPr>
+          <p:cNvPr id="92" name="TextBox 91">
+            <a:extLst>
+              <a:ext uri="{FF2B5EF4-FFF2-40B4-BE49-F238E27FC236}">
+                <a16:creationId xmlns:a16="http://schemas.microsoft.com/office/drawing/2014/main" id="{60581664-4C4F-41AC-8809-6029FD5C0470}"/>
+              </a:ext>
+            </a:extLst>
+          </p:cNvPr>
+          <p:cNvSpPr txBox="1"/>
+          <p:nvPr/>
+        </p:nvSpPr>
+        <p:spPr>
+          <a:xfrm>
+            <a:off x="2563000" y="3774538"/>
+            <a:ext cx="6097002" cy="307777"/>
+          </a:xfrm>
+          <a:prstGeom prst="rect">
+            <a:avLst/>
+          </a:prstGeom>
+          <a:noFill/>
+        </p:spPr>
+        <p:txBody>
+          <a:bodyPr wrap="square">
+            <a:spAutoFit/>
+          </a:bodyPr>
+          <a:lstStyle/>
+          <a:p>
+            <a:r>
+              <a:rPr lang="en-US" sz="1400" dirty="0"/>
+              <a:t>“</a:t>
+            </a:r>
+            <a:r>
+              <a:rPr lang="en-US" sz="1400" dirty="0" err="1"/>
+              <a:t>sampleApp</a:t>
+            </a:r>
+            <a:r>
+              <a:rPr lang="en-US" sz="1400" dirty="0"/>
+              <a:t>” module</a:t>
+            </a:r>
+          </a:p>
+        </p:txBody>
+      </p:sp>
+      <p:pic>
+        <p:nvPicPr>
+          <p:cNvPr id="3" name="Picture 2" descr="See the source image">
+            <a:extLst>
+              <a:ext uri="{FF2B5EF4-FFF2-40B4-BE49-F238E27FC236}">
+                <a16:creationId xmlns:a16="http://schemas.microsoft.com/office/drawing/2014/main" id="{AA859BBB-7220-4F45-915A-743FC1FEBFA7}"/>
+              </a:ext>
+            </a:extLst>
+          </p:cNvPr>
+          <p:cNvPicPr>
+            <a:picLocks noChangeAspect="1" noChangeArrowheads="1"/>
+          </p:cNvPicPr>
+          <p:nvPr/>
+        </p:nvPicPr>
+        <p:blipFill rotWithShape="1">
+          <a:blip r:embed="rId4">
+            <a:extLst>
+              <a:ext uri="{28A0092B-C50C-407E-A947-70E740481C1C}">
+                <a14:useLocalDpi xmlns:a14="http://schemas.microsoft.com/office/drawing/2010/main" val="0"/>
+              </a:ext>
+            </a:extLst>
+          </a:blip>
+          <a:srcRect l="10421" t="38880" r="8904" b="36363"/>
+          <a:stretch/>
+        </p:blipFill>
+        <p:spPr bwMode="auto">
+          <a:xfrm>
+            <a:off x="7732048" y="4345878"/>
+            <a:ext cx="1443582" cy="354394"/>
+          </a:xfrm>
+          <a:prstGeom prst="rect">
+            <a:avLst/>
+          </a:prstGeom>
+          <a:noFill/>
+          <a:extLst>
+            <a:ext uri="{909E8E84-426E-40DD-AFC4-6F175D3DCCD1}">
+              <a14:hiddenFill xmlns:a14="http://schemas.microsoft.com/office/drawing/2010/main">
+                <a:solidFill>
+                  <a:srgbClr val="FFFFFF"/>
+                </a:solidFill>
+              </a14:hiddenFill>
+            </a:ext>
+          </a:extLst>
+        </p:spPr>
+      </p:pic>
+      <p:sp>
+        <p:nvSpPr>
+          <p:cNvPr id="16" name="TextBox 15">
+            <a:extLst>
+              <a:ext uri="{FF2B5EF4-FFF2-40B4-BE49-F238E27FC236}">
+                <a16:creationId xmlns:a16="http://schemas.microsoft.com/office/drawing/2014/main" id="{150664F6-D638-4BBA-B82E-64EF9BCA251F}"/>
+              </a:ext>
+            </a:extLst>
+          </p:cNvPr>
+          <p:cNvSpPr txBox="1"/>
+          <p:nvPr/>
+        </p:nvSpPr>
+        <p:spPr>
+          <a:xfrm>
+            <a:off x="6914476" y="3758493"/>
+            <a:ext cx="1832810" cy="307777"/>
+          </a:xfrm>
+          <a:prstGeom prst="rect">
+            <a:avLst/>
+          </a:prstGeom>
+          <a:noFill/>
+        </p:spPr>
+        <p:txBody>
+          <a:bodyPr wrap="square">
+            <a:spAutoFit/>
+          </a:bodyPr>
+          <a:lstStyle/>
+          <a:p>
+            <a:r>
+              <a:rPr lang="en-US" sz="1400" dirty="0"/>
+              <a:t>“</a:t>
+            </a:r>
+            <a:r>
+              <a:rPr lang="en-US" sz="1400" dirty="0" err="1"/>
+              <a:t>influxdb</a:t>
+            </a:r>
+            <a:r>
+              <a:rPr lang="en-US" sz="1400" dirty="0"/>
+              <a:t>” module</a:t>
+            </a:r>
+          </a:p>
+        </p:txBody>
+      </p:sp>
+      <p:sp>
+        <p:nvSpPr>
+          <p:cNvPr id="20" name="TextBox 19">
+            <a:extLst>
+              <a:ext uri="{FF2B5EF4-FFF2-40B4-BE49-F238E27FC236}">
+                <a16:creationId xmlns:a16="http://schemas.microsoft.com/office/drawing/2014/main" id="{BE935596-3BEF-491F-B484-8B1B4CED8529}"/>
+              </a:ext>
+            </a:extLst>
+          </p:cNvPr>
+          <p:cNvSpPr txBox="1"/>
+          <p:nvPr/>
+        </p:nvSpPr>
+        <p:spPr>
+          <a:xfrm>
+            <a:off x="2359420" y="3376583"/>
+            <a:ext cx="4160286" cy="307777"/>
+          </a:xfrm>
+          <a:prstGeom prst="rect">
+            <a:avLst/>
+          </a:prstGeom>
+          <a:noFill/>
+        </p:spPr>
+        <p:txBody>
+          <a:bodyPr wrap="square">
+            <a:spAutoFit/>
+          </a:bodyPr>
+          <a:lstStyle/>
+          <a:p>
+            <a:r>
+              <a:rPr lang="en-US" sz="1400" dirty="0"/>
+              <a:t>“</a:t>
+            </a:r>
+            <a:r>
+              <a:rPr lang="en-US" sz="1400" dirty="0" err="1"/>
+              <a:t>deployment.influxdb.template.json</a:t>
+            </a:r>
+            <a:r>
+              <a:rPr lang="en-US" sz="1400" dirty="0"/>
+              <a:t>” edge solution</a:t>
+            </a:r>
+          </a:p>
+        </p:txBody>
+      </p:sp>
+    </p:spTree>
+    <p:extLst>
+      <p:ext uri="{BB962C8B-B14F-4D97-AF65-F5344CB8AC3E}">
+        <p14:creationId xmlns:p14="http://schemas.microsoft.com/office/powerpoint/2010/main" val="1287367562"/>
+      </p:ext>
+    </p:extLst>
+  </p:cSld>
+  <p:clrMapOvr>
+    <a:masterClrMapping/>
+  </p:clrMapOvr>
+</p:sld>
+</file>
+
 <file path=ppt/theme/theme1.xml><?xml version="1.0" encoding="utf-8"?>
 <a:theme xmlns:a="http://schemas.openxmlformats.org/drawingml/2006/main" name="Office Theme">
   <a:themeElements>

</xml_diff>

<commit_message>
updated e2e demo diagram
</commit_message>
<xml_diff>
--- a/docs/drawings.pptx
+++ b/docs/drawings.pptx
@@ -7282,10 +7282,10 @@
       </p:grpSpPr>
       <p:sp>
         <p:nvSpPr>
-          <p:cNvPr id="22" name="Rectangle: Rounded Corners 21">
-            <a:extLst>
-              <a:ext uri="{FF2B5EF4-FFF2-40B4-BE49-F238E27FC236}">
-                <a16:creationId xmlns:a16="http://schemas.microsoft.com/office/drawing/2014/main" id="{4C75B854-4144-4F0E-B1D8-706342EFDACF}"/>
+          <p:cNvPr id="13" name="Rectangle: Rounded Corners 12">
+            <a:extLst>
+              <a:ext uri="{FF2B5EF4-FFF2-40B4-BE49-F238E27FC236}">
+                <a16:creationId xmlns:a16="http://schemas.microsoft.com/office/drawing/2014/main" id="{1E687DD2-4605-4F84-853B-7A106D4D849C}"/>
               </a:ext>
             </a:extLst>
           </p:cNvPr>
@@ -7294,8 +7294,8 @@
         </p:nvSpPr>
         <p:spPr>
           <a:xfrm>
-            <a:off x="1798685" y="6315039"/>
-            <a:ext cx="8162580" cy="484542"/>
+            <a:off x="5944623" y="2033024"/>
+            <a:ext cx="1497029" cy="793079"/>
           </a:xfrm>
           <a:prstGeom prst="roundRect">
             <a:avLst>
@@ -7322,16 +7322,18 @@
           <a:lstStyle/>
           <a:p>
             <a:pPr algn="ctr"/>
-            <a:endParaRPr lang="en-US"/>
+            <a:endParaRPr lang="en-US">
+              <a:latin typeface="Arial Nova Cond" panose="020B0506020202020204" pitchFamily="34" charset="0"/>
+            </a:endParaRPr>
           </a:p>
         </p:txBody>
       </p:sp>
       <p:sp>
         <p:nvSpPr>
-          <p:cNvPr id="32" name="Rectangle: Rounded Corners 31">
-            <a:extLst>
-              <a:ext uri="{FF2B5EF4-FFF2-40B4-BE49-F238E27FC236}">
-                <a16:creationId xmlns:a16="http://schemas.microsoft.com/office/drawing/2014/main" id="{278B6650-E555-466B-82DD-BFAA9EE21385}"/>
+          <p:cNvPr id="22" name="Rectangle: Rounded Corners 21">
+            <a:extLst>
+              <a:ext uri="{FF2B5EF4-FFF2-40B4-BE49-F238E27FC236}">
+                <a16:creationId xmlns:a16="http://schemas.microsoft.com/office/drawing/2014/main" id="{4C75B854-4144-4F0E-B1D8-706342EFDACF}"/>
               </a:ext>
             </a:extLst>
           </p:cNvPr>
@@ -7340,14 +7342,15 @@
         </p:nvSpPr>
         <p:spPr>
           <a:xfrm>
-            <a:off x="1784599" y="3648118"/>
-            <a:ext cx="8162580" cy="2563010"/>
+            <a:off x="1798685" y="6297614"/>
+            <a:ext cx="8162580" cy="554063"/>
           </a:xfrm>
           <a:prstGeom prst="roundRect">
             <a:avLst>
               <a:gd name="adj" fmla="val 4345"/>
             </a:avLst>
           </a:prstGeom>
+          <a:ln w="19050"/>
         </p:spPr>
         <p:style>
           <a:lnRef idx="2">
@@ -7374,10 +7377,10 @@
       </p:sp>
       <p:sp>
         <p:nvSpPr>
-          <p:cNvPr id="8" name="Rectangle 7">
-            <a:extLst>
-              <a:ext uri="{FF2B5EF4-FFF2-40B4-BE49-F238E27FC236}">
-                <a16:creationId xmlns:a16="http://schemas.microsoft.com/office/drawing/2014/main" id="{C3640122-F9F0-4651-B039-C234418BF22D}"/>
+          <p:cNvPr id="32" name="Rectangle: Rounded Corners 31">
+            <a:extLst>
+              <a:ext uri="{FF2B5EF4-FFF2-40B4-BE49-F238E27FC236}">
+                <a16:creationId xmlns:a16="http://schemas.microsoft.com/office/drawing/2014/main" id="{278B6650-E555-466B-82DD-BFAA9EE21385}"/>
               </a:ext>
             </a:extLst>
           </p:cNvPr>
@@ -7386,15 +7389,15 @@
         </p:nvSpPr>
         <p:spPr>
           <a:xfrm>
-            <a:off x="7030862" y="4040958"/>
-            <a:ext cx="2195476" cy="997844"/>
-          </a:xfrm>
-          <a:prstGeom prst="rect">
-            <a:avLst/>
-          </a:prstGeom>
-          <a:ln>
-            <a:prstDash val="sysDash"/>
-          </a:ln>
+            <a:off x="1784599" y="3655082"/>
+            <a:ext cx="8162580" cy="2308041"/>
+          </a:xfrm>
+          <a:prstGeom prst="roundRect">
+            <a:avLst>
+              <a:gd name="adj" fmla="val 4345"/>
+            </a:avLst>
+          </a:prstGeom>
+          <a:ln w="19050"/>
         </p:spPr>
         <p:style>
           <a:lnRef idx="2">
@@ -7415,16 +7418,16 @@
           <a:lstStyle/>
           <a:p>
             <a:pPr algn="ctr"/>
-            <a:endParaRPr lang="en-US" dirty="0"/>
+            <a:endParaRPr lang="en-US"/>
           </a:p>
         </p:txBody>
       </p:sp>
       <p:sp>
         <p:nvSpPr>
-          <p:cNvPr id="50" name="Rectangle 49">
-            <a:extLst>
-              <a:ext uri="{FF2B5EF4-FFF2-40B4-BE49-F238E27FC236}">
-                <a16:creationId xmlns:a16="http://schemas.microsoft.com/office/drawing/2014/main" id="{8AEF91B3-317A-4AC7-9752-3F5D697AC46D}"/>
+          <p:cNvPr id="8" name="Rectangle 7">
+            <a:extLst>
+              <a:ext uri="{FF2B5EF4-FFF2-40B4-BE49-F238E27FC236}">
+                <a16:creationId xmlns:a16="http://schemas.microsoft.com/office/drawing/2014/main" id="{C3640122-F9F0-4651-B039-C234418BF22D}"/>
               </a:ext>
             </a:extLst>
           </p:cNvPr>
@@ -7433,14 +7436,14 @@
         </p:nvSpPr>
         <p:spPr>
           <a:xfrm>
-            <a:off x="2568863" y="4047038"/>
-            <a:ext cx="4216859" cy="2052020"/>
+            <a:off x="7030862" y="3956210"/>
+            <a:ext cx="1721853" cy="932195"/>
           </a:xfrm>
           <a:prstGeom prst="rect">
             <a:avLst/>
           </a:prstGeom>
           <a:ln>
-            <a:prstDash val="sysDash"/>
+            <a:prstDash val="solid"/>
           </a:ln>
         </p:spPr>
         <p:style>
@@ -7466,6 +7469,53 @@
           </a:p>
         </p:txBody>
       </p:sp>
+      <p:sp>
+        <p:nvSpPr>
+          <p:cNvPr id="50" name="Rectangle 49">
+            <a:extLst>
+              <a:ext uri="{FF2B5EF4-FFF2-40B4-BE49-F238E27FC236}">
+                <a16:creationId xmlns:a16="http://schemas.microsoft.com/office/drawing/2014/main" id="{8AEF91B3-317A-4AC7-9752-3F5D697AC46D}"/>
+              </a:ext>
+            </a:extLst>
+          </p:cNvPr>
+          <p:cNvSpPr/>
+          <p:nvPr/>
+        </p:nvSpPr>
+        <p:spPr>
+          <a:xfrm>
+            <a:off x="2568863" y="3956211"/>
+            <a:ext cx="4216859" cy="1888482"/>
+          </a:xfrm>
+          <a:prstGeom prst="rect">
+            <a:avLst/>
+          </a:prstGeom>
+          <a:ln>
+            <a:prstDash val="solid"/>
+          </a:ln>
+        </p:spPr>
+        <p:style>
+          <a:lnRef idx="2">
+            <a:schemeClr val="accent1"/>
+          </a:lnRef>
+          <a:fillRef idx="1">
+            <a:schemeClr val="lt1"/>
+          </a:fillRef>
+          <a:effectRef idx="0">
+            <a:schemeClr val="accent1"/>
+          </a:effectRef>
+          <a:fontRef idx="minor">
+            <a:schemeClr val="dk1"/>
+          </a:fontRef>
+        </p:style>
+        <p:txBody>
+          <a:bodyPr rtlCol="0" anchor="ctr"/>
+          <a:lstStyle/>
+          <a:p>
+            <a:pPr algn="ctr"/>
+            <a:endParaRPr lang="en-US" dirty="0"/>
+          </a:p>
+        </p:txBody>
+      </p:sp>
       <p:grpSp>
         <p:nvGrpSpPr>
           <p:cNvPr id="21" name="Group 20">
@@ -7480,10 +7530,10 @@
         </p:nvGrpSpPr>
         <p:grpSpPr>
           <a:xfrm>
-            <a:off x="4774895" y="139299"/>
-            <a:ext cx="1475084" cy="740601"/>
-            <a:chOff x="4304628" y="841206"/>
-            <a:chExt cx="1475084" cy="740601"/>
+            <a:off x="4071932" y="721507"/>
+            <a:ext cx="1629482" cy="479216"/>
+            <a:chOff x="3642607" y="841206"/>
+            <a:chExt cx="1629482" cy="479216"/>
           </a:xfrm>
         </p:grpSpPr>
         <p:pic>
@@ -7545,8 +7595,8 @@
           </p:nvSpPr>
           <p:spPr>
             <a:xfrm>
-              <a:off x="4304628" y="1335586"/>
-              <a:ext cx="1475084" cy="246221"/>
+              <a:off x="3642607" y="846808"/>
+              <a:ext cx="1128835" cy="400110"/>
             </a:xfrm>
             <a:prstGeom prst="rect">
               <a:avLst/>
@@ -7559,106 +7609,23 @@
             </a:bodyPr>
             <a:lstStyle/>
             <a:p>
+              <a:pPr algn="r"/>
               <a:r>
-                <a:rPr lang="en-US" sz="1000" dirty="0"/>
-                <a:t>Azure Container Registry</a:t>
+                <a:rPr lang="en-US" sz="1000" dirty="0">
+                  <a:latin typeface="Arial Nova Cond" panose="020B0506020202020204" pitchFamily="34" charset="0"/>
+                </a:rPr>
+                <a:t>Azure </a:t>
               </a:r>
-            </a:p>
-          </p:txBody>
-        </p:sp>
-      </p:grpSp>
-      <p:grpSp>
-        <p:nvGrpSpPr>
-          <p:cNvPr id="19" name="Group 18">
-            <a:extLst>
-              <a:ext uri="{FF2B5EF4-FFF2-40B4-BE49-F238E27FC236}">
-                <a16:creationId xmlns:a16="http://schemas.microsoft.com/office/drawing/2014/main" id="{98ACBFC6-029D-47F1-A1D0-1ED06685DC36}"/>
-              </a:ext>
-            </a:extLst>
-          </p:cNvPr>
-          <p:cNvGrpSpPr/>
-          <p:nvPr/>
-        </p:nvGrpSpPr>
-        <p:grpSpPr>
-          <a:xfrm>
-            <a:off x="5879975" y="1953581"/>
-            <a:ext cx="1314784" cy="805788"/>
-            <a:chOff x="6235002" y="769945"/>
-            <a:chExt cx="1314784" cy="805788"/>
-          </a:xfrm>
-        </p:grpSpPr>
-        <p:pic>
-          <p:nvPicPr>
-            <p:cNvPr id="6" name="Picture 5">
-              <a:extLst>
-                <a:ext uri="{FF2B5EF4-FFF2-40B4-BE49-F238E27FC236}">
-                  <a16:creationId xmlns:a16="http://schemas.microsoft.com/office/drawing/2014/main" id="{1DE2DFB2-1CA0-409B-8C30-6233579847E5}"/>
-                </a:ext>
-              </a:extLst>
-            </p:cNvPr>
-            <p:cNvPicPr>
-              <a:picLocks noChangeAspect="1"/>
-            </p:cNvPicPr>
-            <p:nvPr/>
-          </p:nvPicPr>
-          <p:blipFill>
-            <a:blip r:embed="rId3">
-              <a:clrChange>
-                <a:clrFrom>
-                  <a:srgbClr val="FFFFFF"/>
-                </a:clrFrom>
-                <a:clrTo>
-                  <a:srgbClr val="FFFFFF">
-                    <a:alpha val="0"/>
-                  </a:srgbClr>
-                </a:clrTo>
-              </a:clrChange>
-            </a:blip>
-            <a:stretch>
-              <a:fillRect/>
-            </a:stretch>
-          </p:blipFill>
-          <p:spPr>
-            <a:xfrm>
-              <a:off x="6545093" y="769945"/>
-              <a:ext cx="659280" cy="612189"/>
-            </a:xfrm>
-            <a:prstGeom prst="rect">
-              <a:avLst/>
-            </a:prstGeom>
-          </p:spPr>
-        </p:pic>
-        <p:sp>
-          <p:nvSpPr>
-            <p:cNvPr id="7" name="TextBox 6">
-              <a:extLst>
-                <a:ext uri="{FF2B5EF4-FFF2-40B4-BE49-F238E27FC236}">
-                  <a16:creationId xmlns:a16="http://schemas.microsoft.com/office/drawing/2014/main" id="{D5527EA6-243A-406D-BFD9-0A9E374D205A}"/>
-                </a:ext>
-              </a:extLst>
-            </p:cNvPr>
-            <p:cNvSpPr txBox="1"/>
-            <p:nvPr/>
-          </p:nvSpPr>
-          <p:spPr>
-            <a:xfrm>
-              <a:off x="6235002" y="1329512"/>
-              <a:ext cx="1314784" cy="246221"/>
-            </a:xfrm>
-            <a:prstGeom prst="rect">
-              <a:avLst/>
-            </a:prstGeom>
-            <a:noFill/>
-          </p:spPr>
-          <p:txBody>
-            <a:bodyPr wrap="none" rtlCol="0">
-              <a:spAutoFit/>
-            </a:bodyPr>
-            <a:lstStyle/>
-            <a:p>
+              <a:br>
+                <a:rPr lang="en-US" sz="1000" dirty="0">
+                  <a:latin typeface="Arial Nova Cond" panose="020B0506020202020204" pitchFamily="34" charset="0"/>
+                </a:rPr>
+              </a:br>
               <a:r>
-                <a:rPr lang="en-US" sz="1000" dirty="0"/>
-                <a:t>Azure Container Apps</a:t>
+                <a:rPr lang="en-US" sz="1000" dirty="0">
+                  <a:latin typeface="Arial Nova Cond" panose="020B0506020202020204" pitchFamily="34" charset="0"/>
+                </a:rPr>
+                <a:t>Container Registry</a:t>
               </a:r>
             </a:p>
           </p:txBody>
@@ -7699,7 +7666,7 @@
             <p:nvPr/>
           </p:nvPicPr>
           <p:blipFill>
-            <a:blip r:embed="rId4">
+            <a:blip r:embed="rId3">
               <a:clrChange>
                 <a:clrFrom>
                   <a:srgbClr val="FDFDFD"/>
@@ -7770,7 +7737,9 @@
             <a:lstStyle/>
             <a:p>
               <a:r>
-                <a:rPr lang="en-US" sz="1000" dirty="0"/>
+                <a:rPr lang="en-US" sz="1000" dirty="0">
+                  <a:latin typeface="Arial Nova Cond" panose="020B0506020202020204" pitchFamily="34" charset="0"/>
+                </a:rPr>
                 <a:t>Azure IoT Hub</a:t>
               </a:r>
             </a:p>
@@ -7791,10 +7760,10 @@
         </p:nvGrpSpPr>
         <p:grpSpPr>
           <a:xfrm>
-            <a:off x="8193318" y="2874078"/>
-            <a:ext cx="1191352" cy="671562"/>
-            <a:chOff x="9368201" y="863086"/>
-            <a:chExt cx="1191352" cy="671562"/>
+            <a:off x="8806705" y="2804067"/>
+            <a:ext cx="1265913" cy="445047"/>
+            <a:chOff x="9732893" y="848054"/>
+            <a:chExt cx="1265913" cy="445047"/>
           </a:xfrm>
         </p:grpSpPr>
         <p:pic>
@@ -7812,7 +7781,7 @@
             <p:nvPr/>
           </p:nvPicPr>
           <p:blipFill>
-            <a:blip r:embed="rId5">
+            <a:blip r:embed="rId4">
               <a:extLst>
                 <a:ext uri="{28A0092B-C50C-407E-A947-70E740481C1C}">
                   <a14:useLocalDpi xmlns:a14="http://schemas.microsoft.com/office/drawing/2010/main" val="0"/>
@@ -7858,8 +7827,8 @@
           </p:nvSpPr>
           <p:spPr>
             <a:xfrm>
-              <a:off x="9368201" y="1288427"/>
-              <a:ext cx="1191352" cy="246221"/>
+              <a:off x="10131261" y="848054"/>
+              <a:ext cx="867545" cy="400110"/>
             </a:xfrm>
             <a:prstGeom prst="rect">
               <a:avLst/>
@@ -7880,8 +7849,21 @@
             </a:lstStyle>
             <a:p>
               <a:r>
-                <a:rPr lang="en-US" dirty="0"/>
-                <a:t>Azure Log Analytics</a:t>
+                <a:rPr lang="en-US" dirty="0">
+                  <a:latin typeface="Arial Nova Cond" panose="020B0506020202020204" pitchFamily="34" charset="0"/>
+                </a:rPr>
+                <a:t>Azure </a:t>
+              </a:r>
+              <a:br>
+                <a:rPr lang="en-US" dirty="0">
+                  <a:latin typeface="Arial Nova Cond" panose="020B0506020202020204" pitchFamily="34" charset="0"/>
+                </a:rPr>
+              </a:br>
+              <a:r>
+                <a:rPr lang="en-US" dirty="0">
+                  <a:latin typeface="Arial Nova Cond" panose="020B0506020202020204" pitchFamily="34" charset="0"/>
+                </a:rPr>
+                <a:t>Log Analytics</a:t>
               </a:r>
             </a:p>
           </p:txBody>
@@ -7901,7 +7883,7 @@
         </p:nvGrpSpPr>
         <p:grpSpPr>
           <a:xfrm>
-            <a:off x="3792195" y="2326023"/>
+            <a:off x="3541979" y="2318729"/>
             <a:ext cx="1059906" cy="805254"/>
             <a:chOff x="10587444" y="764507"/>
             <a:chExt cx="1059906" cy="805254"/>
@@ -7913,6 +7895,121 @@
               <a:extLst>
                 <a:ext uri="{FF2B5EF4-FFF2-40B4-BE49-F238E27FC236}">
                   <a16:creationId xmlns:a16="http://schemas.microsoft.com/office/drawing/2014/main" id="{BB75325C-BE80-4716-B3AB-888FDA93A36B}"/>
+                </a:ext>
+              </a:extLst>
+            </p:cNvPr>
+            <p:cNvPicPr>
+              <a:picLocks noChangeAspect="1" noChangeArrowheads="1"/>
+            </p:cNvPicPr>
+            <p:nvPr/>
+          </p:nvPicPr>
+          <p:blipFill>
+            <a:blip r:embed="rId5">
+              <a:clrChange>
+                <a:clrFrom>
+                  <a:srgbClr val="FDFDFD"/>
+                </a:clrFrom>
+                <a:clrTo>
+                  <a:srgbClr val="FDFDFD">
+                    <a:alpha val="0"/>
+                  </a:srgbClr>
+                </a:clrTo>
+              </a:clrChange>
+              <a:extLst>
+                <a:ext uri="{28A0092B-C50C-407E-A947-70E740481C1C}">
+                  <a14:useLocalDpi xmlns:a14="http://schemas.microsoft.com/office/drawing/2010/main" val="0"/>
+                </a:ext>
+              </a:extLst>
+            </a:blip>
+            <a:srcRect/>
+            <a:stretch>
+              <a:fillRect/>
+            </a:stretch>
+          </p:blipFill>
+          <p:spPr bwMode="auto">
+            <a:xfrm>
+              <a:off x="10824907" y="764507"/>
+              <a:ext cx="584980" cy="584980"/>
+            </a:xfrm>
+            <a:prstGeom prst="rect">
+              <a:avLst/>
+            </a:prstGeom>
+            <a:noFill/>
+            <a:extLst>
+              <a:ext uri="{909E8E84-426E-40DD-AFC4-6F175D3DCCD1}">
+                <a14:hiddenFill xmlns:a14="http://schemas.microsoft.com/office/drawing/2010/main">
+                  <a:solidFill>
+                    <a:srgbClr val="FFFFFF"/>
+                  </a:solidFill>
+                </a14:hiddenFill>
+              </a:ext>
+            </a:extLst>
+          </p:spPr>
+        </p:pic>
+        <p:sp>
+          <p:nvSpPr>
+            <p:cNvPr id="12" name="TextBox 11">
+              <a:extLst>
+                <a:ext uri="{FF2B5EF4-FFF2-40B4-BE49-F238E27FC236}">
+                  <a16:creationId xmlns:a16="http://schemas.microsoft.com/office/drawing/2014/main" id="{42ACD0CC-6F04-4067-8439-7BB4106B3467}"/>
+                </a:ext>
+              </a:extLst>
+            </p:cNvPr>
+            <p:cNvSpPr txBox="1"/>
+            <p:nvPr/>
+          </p:nvSpPr>
+          <p:spPr>
+            <a:xfrm>
+              <a:off x="10587444" y="1323540"/>
+              <a:ext cx="1059906" cy="246221"/>
+            </a:xfrm>
+            <a:prstGeom prst="rect">
+              <a:avLst/>
+            </a:prstGeom>
+            <a:noFill/>
+          </p:spPr>
+          <p:txBody>
+            <a:bodyPr wrap="none" rtlCol="0">
+              <a:spAutoFit/>
+            </a:bodyPr>
+            <a:lstStyle/>
+            <a:p>
+              <a:r>
+                <a:rPr lang="en-US" sz="1000" dirty="0">
+                  <a:latin typeface="Arial Nova Cond" panose="020B0506020202020204" pitchFamily="34" charset="0"/>
+                </a:rPr>
+                <a:t>Azure Event Grid</a:t>
+              </a:r>
+            </a:p>
+          </p:txBody>
+        </p:sp>
+      </p:grpSp>
+      <p:grpSp>
+        <p:nvGrpSpPr>
+          <p:cNvPr id="23" name="Group 22">
+            <a:extLst>
+              <a:ext uri="{FF2B5EF4-FFF2-40B4-BE49-F238E27FC236}">
+                <a16:creationId xmlns:a16="http://schemas.microsoft.com/office/drawing/2014/main" id="{E4D241D0-F5D6-4665-9CD5-6C50C04D2831}"/>
+              </a:ext>
+            </a:extLst>
+          </p:cNvPr>
+          <p:cNvGrpSpPr/>
+          <p:nvPr/>
+        </p:nvGrpSpPr>
+        <p:grpSpPr>
+          <a:xfrm>
+            <a:off x="8850547" y="2165853"/>
+            <a:ext cx="1028669" cy="472114"/>
+            <a:chOff x="3373522" y="834058"/>
+            <a:chExt cx="1028669" cy="472114"/>
+          </a:xfrm>
+        </p:grpSpPr>
+        <p:pic>
+          <p:nvPicPr>
+            <p:cNvPr id="1028" name="Picture 4" descr="See related image detail">
+              <a:extLst>
+                <a:ext uri="{FF2B5EF4-FFF2-40B4-BE49-F238E27FC236}">
+                  <a16:creationId xmlns:a16="http://schemas.microsoft.com/office/drawing/2014/main" id="{650EC945-E073-4979-BA21-343CE6D70BB9}"/>
                 </a:ext>
               </a:extLst>
             </p:cNvPr>
@@ -7946,119 +8043,6 @@
           </p:blipFill>
           <p:spPr bwMode="auto">
             <a:xfrm>
-              <a:off x="10824907" y="764507"/>
-              <a:ext cx="584980" cy="584980"/>
-            </a:xfrm>
-            <a:prstGeom prst="rect">
-              <a:avLst/>
-            </a:prstGeom>
-            <a:noFill/>
-            <a:extLst>
-              <a:ext uri="{909E8E84-426E-40DD-AFC4-6F175D3DCCD1}">
-                <a14:hiddenFill xmlns:a14="http://schemas.microsoft.com/office/drawing/2010/main">
-                  <a:solidFill>
-                    <a:srgbClr val="FFFFFF"/>
-                  </a:solidFill>
-                </a14:hiddenFill>
-              </a:ext>
-            </a:extLst>
-          </p:spPr>
-        </p:pic>
-        <p:sp>
-          <p:nvSpPr>
-            <p:cNvPr id="12" name="TextBox 11">
-              <a:extLst>
-                <a:ext uri="{FF2B5EF4-FFF2-40B4-BE49-F238E27FC236}">
-                  <a16:creationId xmlns:a16="http://schemas.microsoft.com/office/drawing/2014/main" id="{42ACD0CC-6F04-4067-8439-7BB4106B3467}"/>
-                </a:ext>
-              </a:extLst>
-            </p:cNvPr>
-            <p:cNvSpPr txBox="1"/>
-            <p:nvPr/>
-          </p:nvSpPr>
-          <p:spPr>
-            <a:xfrm>
-              <a:off x="10587444" y="1323540"/>
-              <a:ext cx="1059906" cy="246221"/>
-            </a:xfrm>
-            <a:prstGeom prst="rect">
-              <a:avLst/>
-            </a:prstGeom>
-            <a:noFill/>
-          </p:spPr>
-          <p:txBody>
-            <a:bodyPr wrap="none" rtlCol="0">
-              <a:spAutoFit/>
-            </a:bodyPr>
-            <a:lstStyle/>
-            <a:p>
-              <a:r>
-                <a:rPr lang="en-US" sz="1000" dirty="0"/>
-                <a:t>Azure Event Grid</a:t>
-              </a:r>
-            </a:p>
-          </p:txBody>
-        </p:sp>
-      </p:grpSp>
-      <p:grpSp>
-        <p:nvGrpSpPr>
-          <p:cNvPr id="23" name="Group 22">
-            <a:extLst>
-              <a:ext uri="{FF2B5EF4-FFF2-40B4-BE49-F238E27FC236}">
-                <a16:creationId xmlns:a16="http://schemas.microsoft.com/office/drawing/2014/main" id="{E4D241D0-F5D6-4665-9CD5-6C50C04D2831}"/>
-              </a:ext>
-            </a:extLst>
-          </p:cNvPr>
-          <p:cNvGrpSpPr/>
-          <p:nvPr/>
-        </p:nvGrpSpPr>
-        <p:grpSpPr>
-          <a:xfrm>
-            <a:off x="8318586" y="2022848"/>
-            <a:ext cx="976549" cy="736521"/>
-            <a:chOff x="3100254" y="834058"/>
-            <a:chExt cx="976549" cy="736521"/>
-          </a:xfrm>
-        </p:grpSpPr>
-        <p:pic>
-          <p:nvPicPr>
-            <p:cNvPr id="1028" name="Picture 4" descr="See related image detail">
-              <a:extLst>
-                <a:ext uri="{FF2B5EF4-FFF2-40B4-BE49-F238E27FC236}">
-                  <a16:creationId xmlns:a16="http://schemas.microsoft.com/office/drawing/2014/main" id="{650EC945-E073-4979-BA21-343CE6D70BB9}"/>
-                </a:ext>
-              </a:extLst>
-            </p:cNvPr>
-            <p:cNvPicPr>
-              <a:picLocks noChangeAspect="1" noChangeArrowheads="1"/>
-            </p:cNvPicPr>
-            <p:nvPr/>
-          </p:nvPicPr>
-          <p:blipFill>
-            <a:blip r:embed="rId7">
-              <a:clrChange>
-                <a:clrFrom>
-                  <a:srgbClr val="FDFDFD"/>
-                </a:clrFrom>
-                <a:clrTo>
-                  <a:srgbClr val="FDFDFD">
-                    <a:alpha val="0"/>
-                  </a:srgbClr>
-                </a:clrTo>
-              </a:clrChange>
-              <a:extLst>
-                <a:ext uri="{28A0092B-C50C-407E-A947-70E740481C1C}">
-                  <a14:useLocalDpi xmlns:a14="http://schemas.microsoft.com/office/drawing/2010/main" val="0"/>
-                </a:ext>
-              </a:extLst>
-            </a:blip>
-            <a:srcRect/>
-            <a:stretch>
-              <a:fillRect/>
-            </a:stretch>
-          </p:blipFill>
-          <p:spPr bwMode="auto">
-            <a:xfrm>
               <a:off x="3373522" y="834058"/>
               <a:ext cx="430015" cy="472114"/>
             </a:xfrm>
@@ -8091,8 +8075,8 @@
           </p:nvSpPr>
           <p:spPr>
             <a:xfrm>
-              <a:off x="3100254" y="1324358"/>
-              <a:ext cx="976549" cy="246221"/>
+              <a:off x="3771890" y="858449"/>
+              <a:ext cx="630301" cy="400110"/>
             </a:xfrm>
             <a:prstGeom prst="rect">
               <a:avLst/>
@@ -8106,14 +8090,25 @@
             <a:lstStyle/>
             <a:p>
               <a:r>
-                <a:rPr lang="en-US" sz="1000" dirty="0"/>
+                <a:rPr lang="en-US" sz="1000" dirty="0">
+                  <a:latin typeface="Arial Nova Cond" panose="020B0506020202020204" pitchFamily="34" charset="0"/>
+                </a:rPr>
                 <a:t>Azure </a:t>
               </a:r>
+              <a:br>
+                <a:rPr lang="en-US" sz="1000" dirty="0">
+                  <a:latin typeface="Arial Nova Cond" panose="020B0506020202020204" pitchFamily="34" charset="0"/>
+                </a:rPr>
+              </a:br>
               <a:r>
-                <a:rPr lang="en-US" sz="1000" dirty="0" err="1"/>
+                <a:rPr lang="en-US" sz="1000" dirty="0" err="1">
+                  <a:latin typeface="Arial Nova Cond" panose="020B0506020202020204" pitchFamily="34" charset="0"/>
+                </a:rPr>
                 <a:t>KeyVault</a:t>
               </a:r>
-              <a:endParaRPr lang="en-US" sz="1000" dirty="0"/>
+              <a:endParaRPr lang="en-US" sz="1000" dirty="0">
+                <a:latin typeface="Arial Nova Cond" panose="020B0506020202020204" pitchFamily="34" charset="0"/>
+              </a:endParaRPr>
             </a:p>
           </p:txBody>
         </p:sp>
@@ -8128,15 +8123,16 @@
             </a:extLst>
           </p:cNvPr>
           <p:cNvCxnSpPr>
-            <a:stCxn id="6" idx="3"/>
+            <a:cxnSpLocks/>
+            <a:stCxn id="72" idx="3"/>
             <a:endCxn id="1028" idx="1"/>
           </p:cNvCxnSpPr>
           <p:nvPr/>
         </p:nvCxnSpPr>
         <p:spPr>
           <a:xfrm flipV="1">
-            <a:off x="6849346" y="2258905"/>
-            <a:ext cx="1742508" cy="771"/>
+            <a:off x="7441652" y="2401910"/>
+            <a:ext cx="1408895" cy="3658"/>
           </a:xfrm>
           <a:prstGeom prst="straightConnector1">
             <a:avLst/>
@@ -8175,7 +8171,7 @@
         </p:nvSpPr>
         <p:spPr>
           <a:xfrm>
-            <a:off x="7193117" y="3059101"/>
+            <a:off x="7916640" y="3040185"/>
             <a:ext cx="1224769" cy="246221"/>
           </a:xfrm>
           <a:prstGeom prst="rect">
@@ -8190,8 +8186,10 @@
           <a:lstStyle/>
           <a:p>
             <a:r>
-              <a:rPr lang="en-US" sz="1000" dirty="0"/>
-              <a:t>AUDIT TRAIL</a:t>
+              <a:rPr lang="en-US" sz="1000" dirty="0">
+                <a:latin typeface="Arial Nova Cond" panose="020B0506020202020204" pitchFamily="34" charset="0"/>
+              </a:rPr>
+              <a:t>AUDIT LOGS</a:t>
             </a:r>
           </a:p>
         </p:txBody>
@@ -8210,8 +8208,8 @@
         </p:nvSpPr>
         <p:spPr>
           <a:xfrm>
-            <a:off x="6971581" y="2037353"/>
-            <a:ext cx="1224769" cy="246221"/>
+            <a:off x="7986229" y="2199276"/>
+            <a:ext cx="964788" cy="246221"/>
           </a:xfrm>
           <a:prstGeom prst="rect">
             <a:avLst/>
@@ -8233,7 +8231,9 @@
           <a:p>
             <a:pPr algn="ctr"/>
             <a:r>
-              <a:rPr lang="en-US" dirty="0"/>
+              <a:rPr lang="en-US" dirty="0">
+                <a:latin typeface="Arial Nova Cond" panose="020B0506020202020204" pitchFamily="34" charset="0"/>
+              </a:rPr>
               <a:t>SECRETS</a:t>
             </a:r>
           </a:p>
@@ -8256,7 +8256,7 @@
         </p:nvCxnSpPr>
         <p:spPr>
           <a:xfrm>
-            <a:off x="2563000" y="2372292"/>
+            <a:off x="2312784" y="2364998"/>
             <a:ext cx="1466658" cy="246221"/>
           </a:xfrm>
           <a:prstGeom prst="bentConnector3">
@@ -8299,7 +8299,7 @@
         </p:nvCxnSpPr>
         <p:spPr>
           <a:xfrm flipV="1">
-            <a:off x="4622479" y="5671078"/>
+            <a:off x="4622479" y="5520682"/>
             <a:ext cx="2442349" cy="13506"/>
           </a:xfrm>
           <a:prstGeom prst="straightConnector1">
@@ -8341,7 +8341,7 @@
         </p:nvCxnSpPr>
         <p:spPr>
           <a:xfrm>
-            <a:off x="4620071" y="4681065"/>
+            <a:off x="4620071" y="4530669"/>
             <a:ext cx="2585800" cy="10036"/>
           </a:xfrm>
           <a:prstGeom prst="straightConnector1">
@@ -8381,7 +8381,7 @@
         </p:nvSpPr>
         <p:spPr>
           <a:xfrm>
-            <a:off x="7397643" y="5453507"/>
+            <a:off x="7397643" y="5303111"/>
             <a:ext cx="1834733" cy="276999"/>
           </a:xfrm>
           <a:prstGeom prst="rect">
@@ -8396,7 +8396,9 @@
           <a:lstStyle/>
           <a:p>
             <a:r>
-              <a:rPr lang="en-US" sz="1200" dirty="0"/>
+              <a:rPr lang="en-US" sz="1200" dirty="0">
+                <a:latin typeface="Arial Nova Cond" panose="020B0506020202020204" pitchFamily="34" charset="0"/>
+              </a:rPr>
               <a:t>encrypted secrets store</a:t>
             </a:r>
           </a:p>
@@ -8417,7 +8419,7 @@
           <p:nvPr/>
         </p:nvPicPr>
         <p:blipFill>
-          <a:blip r:embed="rId8">
+          <a:blip r:embed="rId7">
             <a:extLst>
               <a:ext uri="{28A0092B-C50C-407E-A947-70E740481C1C}">
                 <a14:useLocalDpi xmlns:a14="http://schemas.microsoft.com/office/drawing/2010/main" val="0"/>
@@ -8431,7 +8433,7 @@
         </p:blipFill>
         <p:spPr bwMode="auto">
           <a:xfrm>
-            <a:off x="7064828" y="5479562"/>
+            <a:off x="7064828" y="5329166"/>
             <a:ext cx="339558" cy="360947"/>
           </a:xfrm>
           <a:prstGeom prst="rect">
@@ -8461,13 +8463,14 @@
           <p:cNvCxnSpPr>
             <a:cxnSpLocks/>
             <a:stCxn id="1034" idx="3"/>
+            <a:endCxn id="13" idx="1"/>
           </p:cNvCxnSpPr>
           <p:nvPr/>
         </p:nvCxnSpPr>
         <p:spPr>
           <a:xfrm flipV="1">
-            <a:off x="4614638" y="2381015"/>
-            <a:ext cx="1513657" cy="237498"/>
+            <a:off x="4364422" y="2429564"/>
+            <a:ext cx="1580201" cy="181655"/>
           </a:xfrm>
           <a:prstGeom prst="bentConnector3">
             <a:avLst>
@@ -8510,7 +8513,7 @@
         <p:spPr>
           <a:xfrm flipH="1">
             <a:off x="2563000" y="2140894"/>
-            <a:ext cx="3530125" cy="0"/>
+            <a:ext cx="3359715" cy="0"/>
           </a:xfrm>
           <a:prstGeom prst="straightConnector1">
             <a:avLst/>
@@ -8548,10 +8551,10 @@
         </p:nvGrpSpPr>
         <p:grpSpPr>
           <a:xfrm>
-            <a:off x="8788994" y="110341"/>
-            <a:ext cx="1350050" cy="767878"/>
-            <a:chOff x="4042380" y="358243"/>
-            <a:chExt cx="1350050" cy="767878"/>
+            <a:off x="8072563" y="644396"/>
+            <a:ext cx="1458136" cy="543437"/>
+            <a:chOff x="4441224" y="358243"/>
+            <a:chExt cx="1458136" cy="543437"/>
           </a:xfrm>
         </p:grpSpPr>
         <p:pic>
@@ -8569,7 +8572,7 @@
             <p:nvPr/>
           </p:nvPicPr>
           <p:blipFill rotWithShape="1">
-            <a:blip r:embed="rId9">
+            <a:blip r:embed="rId8">
               <a:extLst>
                 <a:ext uri="{28A0092B-C50C-407E-A947-70E740481C1C}">
                   <a14:useLocalDpi xmlns:a14="http://schemas.microsoft.com/office/drawing/2010/main" val="0"/>
@@ -8613,8 +8616,8 @@
           </p:nvSpPr>
           <p:spPr>
             <a:xfrm>
-              <a:off x="4042380" y="879900"/>
-              <a:ext cx="1350050" cy="246221"/>
+              <a:off x="4901971" y="445933"/>
+              <a:ext cx="997389" cy="400110"/>
             </a:xfrm>
             <a:prstGeom prst="rect">
               <a:avLst/>
@@ -8628,8 +8631,21 @@
             <a:lstStyle/>
             <a:p>
               <a:r>
-                <a:rPr lang="en-US" sz="1000" dirty="0"/>
-                <a:t>Azure Active Directory</a:t>
+                <a:rPr lang="en-US" sz="1000" dirty="0">
+                  <a:latin typeface="Arial Nova Cond" panose="020B0506020202020204" pitchFamily="34" charset="0"/>
+                </a:rPr>
+                <a:t>Azure </a:t>
+              </a:r>
+              <a:br>
+                <a:rPr lang="en-US" sz="1000" dirty="0">
+                  <a:latin typeface="Arial Nova Cond" panose="020B0506020202020204" pitchFamily="34" charset="0"/>
+                </a:rPr>
+              </a:br>
+              <a:r>
+                <a:rPr lang="en-US" sz="1000" dirty="0">
+                  <a:latin typeface="Arial Nova Cond" panose="020B0506020202020204" pitchFamily="34" charset="0"/>
+                </a:rPr>
+                <a:t>Active Directory</a:t>
               </a:r>
             </a:p>
           </p:txBody>
@@ -8646,14 +8662,14 @@
           </p:cNvPr>
           <p:cNvCxnSpPr>
             <a:cxnSpLocks/>
-            <a:stCxn id="4" idx="2"/>
+            <a:stCxn id="1030" idx="2"/>
           </p:cNvCxnSpPr>
           <p:nvPr/>
         </p:nvCxnSpPr>
         <p:spPr>
           <a:xfrm rot="16200000" flipH="1">
-            <a:off x="5381288" y="1011048"/>
-            <a:ext cx="1114317" cy="852019"/>
+            <a:off x="5421525" y="1204572"/>
+            <a:ext cx="820623" cy="812923"/>
           </a:xfrm>
           <a:prstGeom prst="bentConnector3">
             <a:avLst>
@@ -8661,93 +8677,6 @@
             </a:avLst>
           </a:prstGeom>
           <a:ln>
-            <a:tailEnd type="triangle"/>
-          </a:ln>
-        </p:spPr>
-        <p:style>
-          <a:lnRef idx="1">
-            <a:schemeClr val="accent1"/>
-          </a:lnRef>
-          <a:fillRef idx="0">
-            <a:schemeClr val="accent1"/>
-          </a:fillRef>
-          <a:effectRef idx="0">
-            <a:schemeClr val="accent1"/>
-          </a:effectRef>
-          <a:fontRef idx="minor">
-            <a:schemeClr val="tx1"/>
-          </a:fontRef>
-        </p:style>
-      </p:cxnSp>
-      <p:cxnSp>
-        <p:nvCxnSpPr>
-          <p:cNvPr id="123" name="Connector: Elbow 122">
-            <a:extLst>
-              <a:ext uri="{FF2B5EF4-FFF2-40B4-BE49-F238E27FC236}">
-                <a16:creationId xmlns:a16="http://schemas.microsoft.com/office/drawing/2014/main" id="{82AD2820-68B8-4E6E-920A-3707DBBDE40A}"/>
-              </a:ext>
-            </a:extLst>
-          </p:cNvPr>
-          <p:cNvCxnSpPr>
-            <a:cxnSpLocks/>
-          </p:cNvCxnSpPr>
-          <p:nvPr/>
-        </p:nvCxnSpPr>
-        <p:spPr>
-          <a:xfrm rot="5400000">
-            <a:off x="6561645" y="1018986"/>
-            <a:ext cx="1082964" cy="820034"/>
-          </a:xfrm>
-          <a:prstGeom prst="bentConnector3">
-            <a:avLst>
-              <a:gd name="adj1" fmla="val 50000"/>
-            </a:avLst>
-          </a:prstGeom>
-          <a:ln>
-            <a:tailEnd type="triangle"/>
-          </a:ln>
-        </p:spPr>
-        <p:style>
-          <a:lnRef idx="1">
-            <a:schemeClr val="accent1"/>
-          </a:lnRef>
-          <a:fillRef idx="0">
-            <a:schemeClr val="accent1"/>
-          </a:fillRef>
-          <a:effectRef idx="0">
-            <a:schemeClr val="accent1"/>
-          </a:effectRef>
-          <a:fontRef idx="minor">
-            <a:schemeClr val="tx1"/>
-          </a:fontRef>
-        </p:style>
-      </p:cxnSp>
-      <p:cxnSp>
-        <p:nvCxnSpPr>
-          <p:cNvPr id="1024" name="Connector: Elbow 1023">
-            <a:extLst>
-              <a:ext uri="{FF2B5EF4-FFF2-40B4-BE49-F238E27FC236}">
-                <a16:creationId xmlns:a16="http://schemas.microsoft.com/office/drawing/2014/main" id="{2762904E-E081-4E0C-8842-D4056B630364}"/>
-              </a:ext>
-            </a:extLst>
-          </p:cNvPr>
-          <p:cNvCxnSpPr>
-            <a:cxnSpLocks/>
-          </p:cNvCxnSpPr>
-          <p:nvPr/>
-        </p:nvCxnSpPr>
-        <p:spPr>
-          <a:xfrm rot="16200000" flipH="1">
-            <a:off x="7844146" y="1017720"/>
-            <a:ext cx="1069660" cy="820036"/>
-          </a:xfrm>
-          <a:prstGeom prst="bentConnector3">
-            <a:avLst>
-              <a:gd name="adj1" fmla="val 50000"/>
-            </a:avLst>
-          </a:prstGeom>
-          <a:ln>
-            <a:prstDash val="dash"/>
             <a:tailEnd type="triangle"/>
           </a:ln>
         </p:spPr>
@@ -8780,8 +8709,8 @@
         </p:nvSpPr>
         <p:spPr>
           <a:xfrm>
-            <a:off x="5484665" y="928904"/>
-            <a:ext cx="717976" cy="400110"/>
+            <a:off x="4564937" y="1274528"/>
+            <a:ext cx="901482" cy="400110"/>
           </a:xfrm>
           <a:prstGeom prst="rect">
             <a:avLst/>
@@ -8801,71 +8730,16 @@
             </a:lvl1pPr>
           </a:lstStyle>
           <a:p>
-            <a:pPr algn="l"/>
-            <a:r>
-              <a:rPr lang="en-US" dirty="0"/>
-              <a:t>APP IMAGE</a:t>
+            <a:pPr algn="r"/>
+            <a:r>
+              <a:rPr lang="en-US" dirty="0">
+                <a:latin typeface="Arial Nova Cond" panose="020B0506020202020204" pitchFamily="34" charset="0"/>
+              </a:rPr>
+              <a:t>APP IMAGE PULL</a:t>
             </a:r>
           </a:p>
         </p:txBody>
       </p:sp>
-      <p:pic>
-        <p:nvPicPr>
-          <p:cNvPr id="18" name="Picture 2" descr="See related image detail">
-            <a:extLst>
-              <a:ext uri="{FF2B5EF4-FFF2-40B4-BE49-F238E27FC236}">
-                <a16:creationId xmlns:a16="http://schemas.microsoft.com/office/drawing/2014/main" id="{1C691ACB-EADE-4C97-B0B1-9807C68EA70E}"/>
-              </a:ext>
-            </a:extLst>
-          </p:cNvPr>
-          <p:cNvPicPr>
-            <a:picLocks noChangeAspect="1" noChangeArrowheads="1"/>
-          </p:cNvPicPr>
-          <p:nvPr/>
-        </p:nvPicPr>
-        <p:blipFill>
-          <a:blip r:embed="rId10">
-            <a:clrChange>
-              <a:clrFrom>
-                <a:srgbClr val="F6F6F6"/>
-              </a:clrFrom>
-              <a:clrTo>
-                <a:srgbClr val="F6F6F6">
-                  <a:alpha val="0"/>
-                </a:srgbClr>
-              </a:clrTo>
-            </a:clrChange>
-            <a:extLst>
-              <a:ext uri="{28A0092B-C50C-407E-A947-70E740481C1C}">
-                <a14:useLocalDpi xmlns:a14="http://schemas.microsoft.com/office/drawing/2010/main" val="0"/>
-              </a:ext>
-            </a:extLst>
-          </a:blip>
-          <a:srcRect/>
-          <a:stretch>
-            <a:fillRect/>
-          </a:stretch>
-        </p:blipFill>
-        <p:spPr bwMode="auto">
-          <a:xfrm>
-            <a:off x="7257785" y="4245568"/>
-            <a:ext cx="458245" cy="564461"/>
-          </a:xfrm>
-          <a:prstGeom prst="rect">
-            <a:avLst/>
-          </a:prstGeom>
-          <a:noFill/>
-          <a:extLst>
-            <a:ext uri="{909E8E84-426E-40DD-AFC4-6F175D3DCCD1}">
-              <a14:hiddenFill xmlns:a14="http://schemas.microsoft.com/office/drawing/2010/main">
-                <a:solidFill>
-                  <a:srgbClr val="FFFFFF"/>
-                </a:solidFill>
-              </a14:hiddenFill>
-            </a:ext>
-          </a:extLst>
-        </p:spPr>
-      </p:pic>
       <p:sp>
         <p:nvSpPr>
           <p:cNvPr id="54" name="TextBox 53">
@@ -8880,7 +8754,7 @@
         </p:nvSpPr>
         <p:spPr>
           <a:xfrm>
-            <a:off x="7397643" y="5641766"/>
+            <a:off x="7397643" y="5491370"/>
             <a:ext cx="2606132" cy="230832"/>
           </a:xfrm>
           <a:prstGeom prst="rect">
@@ -8968,12 +8842,15 @@
         </p:nvSpPr>
         <p:spPr>
           <a:xfrm>
-            <a:off x="2781828" y="5444617"/>
+            <a:off x="2781828" y="5294221"/>
             <a:ext cx="1832810" cy="452921"/>
           </a:xfrm>
           <a:prstGeom prst="rect">
             <a:avLst/>
           </a:prstGeom>
+          <a:ln>
+            <a:prstDash val="sysDash"/>
+          </a:ln>
         </p:spPr>
         <p:style>
           <a:lnRef idx="2">
@@ -8995,7 +8872,7 @@
           <a:p>
             <a:pPr algn="ctr"/>
             <a:r>
-              <a:rPr lang="en-US" sz="1100" dirty="0" err="1">
+              <a:rPr lang="en-US" sz="1000" dirty="0" err="1">
                 <a:solidFill>
                   <a:srgbClr val="569CD6"/>
                 </a:solidFill>
@@ -9032,8 +8909,8 @@
         </p:nvCxnSpPr>
         <p:spPr>
           <a:xfrm rot="16200000" flipH="1">
-            <a:off x="1070078" y="3959327"/>
-            <a:ext cx="2886495" cy="537006"/>
+            <a:off x="1145276" y="3884129"/>
+            <a:ext cx="2736099" cy="537006"/>
           </a:xfrm>
           <a:prstGeom prst="bentConnector2">
             <a:avLst/>
@@ -9073,8 +8950,8 @@
         </p:nvCxnSpPr>
         <p:spPr>
           <a:xfrm flipV="1">
-            <a:off x="2964302" y="5872598"/>
-            <a:ext cx="0" cy="534732"/>
+            <a:off x="2964302" y="5747142"/>
+            <a:ext cx="0" cy="660188"/>
           </a:xfrm>
           <a:prstGeom prst="straightConnector1">
             <a:avLst/>
@@ -9113,12 +8990,15 @@
         </p:nvSpPr>
         <p:spPr>
           <a:xfrm>
-            <a:off x="2781828" y="4225158"/>
+            <a:off x="2781828" y="4074762"/>
             <a:ext cx="1832810" cy="588453"/>
           </a:xfrm>
           <a:prstGeom prst="rect">
             <a:avLst/>
           </a:prstGeom>
+          <a:ln>
+            <a:prstDash val="sysDash"/>
+          </a:ln>
         </p:spPr>
         <p:style>
           <a:lnRef idx="2">
@@ -9140,7 +9020,7 @@
           <a:p>
             <a:pPr algn="ctr"/>
             <a:r>
-              <a:rPr lang="en-US" sz="1200" b="0" dirty="0" err="1">
+              <a:rPr lang="en-US" sz="1000" b="0" dirty="0" err="1">
                 <a:solidFill>
                   <a:srgbClr val="569CD6"/>
                 </a:solidFill>
@@ -9170,7 +9050,7 @@
         </p:nvCxnSpPr>
         <p:spPr>
           <a:xfrm flipV="1">
-            <a:off x="2964302" y="4813611"/>
+            <a:off x="2964302" y="4663215"/>
             <a:ext cx="0" cy="631006"/>
           </a:xfrm>
           <a:prstGeom prst="straightConnector1">
@@ -9210,8 +9090,8 @@
         </p:nvSpPr>
         <p:spPr>
           <a:xfrm>
-            <a:off x="2965662" y="4867113"/>
-            <a:ext cx="3563893" cy="507831"/>
+            <a:off x="2965662" y="4716717"/>
+            <a:ext cx="3817954" cy="461665"/>
           </a:xfrm>
           <a:prstGeom prst="rect">
             <a:avLst/>
@@ -9239,36 +9119,36 @@
           </a:lstStyle>
           <a:p>
             <a:r>
-              <a:rPr lang="en-US" dirty="0" err="1"/>
+              <a:rPr lang="en-US" sz="800" dirty="0" err="1"/>
               <a:t>dbPassword</a:t>
             </a:r>
             <a:r>
-              <a:rPr lang="en-US" dirty="0"/>
+              <a:rPr lang="en-US" sz="800" dirty="0"/>
               <a:t> = await </a:t>
             </a:r>
           </a:p>
           <a:p>
             <a:r>
-              <a:rPr lang="en-US" dirty="0" err="1"/>
+              <a:rPr lang="en-US" sz="800" dirty="0" err="1"/>
               <a:t>secretManagerClient.GetSecretValueAsync</a:t>
             </a:r>
             <a:r>
-              <a:rPr lang="en-US" dirty="0"/>
+              <a:rPr lang="en-US" sz="800" dirty="0"/>
               <a:t>(</a:t>
             </a:r>
             <a:br>
-              <a:rPr lang="en-US" dirty="0"/>
+              <a:rPr lang="en-US" sz="800" dirty="0"/>
             </a:br>
             <a:r>
-              <a:rPr lang="en-US" dirty="0"/>
+              <a:rPr lang="en-US" sz="800" dirty="0"/>
               <a:t>“</a:t>
             </a:r>
             <a:r>
-              <a:rPr lang="en-US" dirty="0" err="1"/>
+              <a:rPr lang="en-US" sz="800" dirty="0" err="1"/>
               <a:t>InfluxDbPassword</a:t>
             </a:r>
             <a:r>
-              <a:rPr lang="en-US" dirty="0"/>
+              <a:rPr lang="en-US" sz="800" dirty="0"/>
               <a:t>“, …)</a:t>
             </a:r>
           </a:p>
@@ -9288,8 +9168,8 @@
         </p:nvSpPr>
         <p:spPr>
           <a:xfrm>
-            <a:off x="4614638" y="4150900"/>
-            <a:ext cx="2416224" cy="507831"/>
+            <a:off x="4614638" y="4000504"/>
+            <a:ext cx="2416224" cy="461665"/>
           </a:xfrm>
           <a:prstGeom prst="rect">
             <a:avLst/>
@@ -9303,7 +9183,7 @@
           <a:lstStyle/>
           <a:p>
             <a:r>
-              <a:rPr lang="en-US" sz="900" b="0" dirty="0" err="1">
+              <a:rPr lang="en-US" sz="800" b="0" dirty="0" err="1">
                 <a:solidFill>
                   <a:srgbClr val="569CD6"/>
                 </a:solidFill>
@@ -9314,7 +9194,7 @@
               <a:t>influxDBClient</a:t>
             </a:r>
             <a:r>
-              <a:rPr lang="en-US" sz="900" b="0" dirty="0">
+              <a:rPr lang="en-US" sz="800" b="0" dirty="0">
                 <a:solidFill>
                   <a:srgbClr val="569CD6"/>
                 </a:solidFill>
@@ -9325,7 +9205,7 @@
               <a:t> = </a:t>
             </a:r>
             <a:r>
-              <a:rPr lang="en-US" sz="900" b="0" dirty="0" err="1">
+              <a:rPr lang="en-US" sz="800" b="0" dirty="0" err="1">
                 <a:solidFill>
                   <a:srgbClr val="569CD6"/>
                 </a:solidFill>
@@ -9336,7 +9216,7 @@
               <a:t>InfluxDBClientFactory.Create</a:t>
             </a:r>
             <a:r>
-              <a:rPr lang="en-US" sz="900" b="0" dirty="0">
+              <a:rPr lang="en-US" sz="800" b="0" dirty="0">
                 <a:solidFill>
                   <a:srgbClr val="569CD6"/>
                 </a:solidFill>
@@ -9349,7 +9229,7 @@
           </a:p>
           <a:p>
             <a:r>
-              <a:rPr lang="en-US" sz="900" b="0" dirty="0" err="1">
+              <a:rPr lang="en-US" sz="800" b="0" dirty="0" err="1">
                 <a:solidFill>
                   <a:srgbClr val="569CD6"/>
                 </a:solidFill>
@@ -9360,7 +9240,7 @@
               <a:t>url</a:t>
             </a:r>
             <a:r>
-              <a:rPr lang="en-US" sz="900" b="0" dirty="0">
+              <a:rPr lang="en-US" sz="800" b="0" dirty="0">
                 <a:solidFill>
                   <a:srgbClr val="569CD6"/>
                 </a:solidFill>
@@ -9371,7 +9251,7 @@
               <a:t>, username, </a:t>
             </a:r>
             <a:r>
-              <a:rPr lang="en-US" sz="900" b="0" dirty="0" err="1">
+              <a:rPr lang="en-US" sz="800" b="0" dirty="0" err="1">
                 <a:solidFill>
                   <a:srgbClr val="569CD6"/>
                 </a:solidFill>
@@ -9382,7 +9262,7 @@
               <a:t>dbPassword</a:t>
             </a:r>
             <a:r>
-              <a:rPr lang="en-US" sz="900" b="0" dirty="0">
+              <a:rPr lang="en-US" sz="800" b="0" dirty="0">
                 <a:solidFill>
                   <a:srgbClr val="569CD6"/>
                 </a:solidFill>
@@ -9392,7 +9272,7 @@
               </a:rPr>
               <a:t>);</a:t>
             </a:r>
-            <a:endParaRPr lang="en-US" sz="900" b="0" dirty="0">
+            <a:endParaRPr lang="en-US" sz="800" b="0" dirty="0">
               <a:solidFill>
                 <a:srgbClr val="D4D4D4"/>
               </a:solidFill>
@@ -9417,8 +9297,8 @@
         </p:nvSpPr>
         <p:spPr>
           <a:xfrm>
-            <a:off x="2563000" y="3774538"/>
-            <a:ext cx="6097002" cy="307777"/>
+            <a:off x="2513325" y="3713612"/>
+            <a:ext cx="6097002" cy="261610"/>
           </a:xfrm>
           <a:prstGeom prst="rect">
             <a:avLst/>
@@ -9432,15 +9312,21 @@
           <a:lstStyle/>
           <a:p>
             <a:r>
-              <a:rPr lang="en-US" sz="1400" dirty="0"/>
+              <a:rPr lang="en-US" sz="1100" dirty="0">
+                <a:latin typeface="Arial Nova Cond" panose="020B0506020202020204" pitchFamily="34" charset="0"/>
+              </a:rPr>
               <a:t>“</a:t>
             </a:r>
             <a:r>
-              <a:rPr lang="en-US" sz="1400" dirty="0" err="1"/>
+              <a:rPr lang="en-US" sz="1100" dirty="0" err="1">
+                <a:latin typeface="Arial Nova Cond" panose="020B0506020202020204" pitchFamily="34" charset="0"/>
+              </a:rPr>
               <a:t>sampleApp</a:t>
             </a:r>
             <a:r>
-              <a:rPr lang="en-US" sz="1400" dirty="0"/>
+              <a:rPr lang="en-US" sz="1100" dirty="0">
+                <a:latin typeface="Arial Nova Cond" panose="020B0506020202020204" pitchFamily="34" charset="0"/>
+              </a:rPr>
               <a:t>” module</a:t>
             </a:r>
           </a:p>
@@ -9457,18 +9343,19 @@
           </p:cNvPr>
           <p:cNvCxnSpPr>
             <a:cxnSpLocks/>
-            <a:stCxn id="7" idx="2"/>
             <a:endCxn id="1036" idx="1"/>
           </p:cNvCxnSpPr>
           <p:nvPr/>
         </p:nvCxnSpPr>
         <p:spPr>
-          <a:xfrm rot="16200000" flipH="1">
-            <a:off x="7382830" y="1913905"/>
-            <a:ext cx="329717" cy="2020643"/>
-          </a:xfrm>
-          <a:prstGeom prst="bentConnector2">
-            <a:avLst/>
+          <a:xfrm>
+            <a:off x="7463560" y="2572738"/>
+            <a:ext cx="1343145" cy="461369"/>
+          </a:xfrm>
+          <a:prstGeom prst="bentConnector3">
+            <a:avLst>
+              <a:gd name="adj1" fmla="val 50000"/>
+            </a:avLst>
           </a:prstGeom>
           <a:ln>
             <a:tailEnd type="triangle"/>
@@ -9503,12 +9390,57 @@
         </p:nvGrpSpPr>
         <p:grpSpPr>
           <a:xfrm>
-            <a:off x="7239837" y="123085"/>
-            <a:ext cx="1034257" cy="723885"/>
-            <a:chOff x="10465573" y="2088106"/>
-            <a:chExt cx="1034257" cy="723885"/>
+            <a:off x="6351808" y="1831836"/>
+            <a:ext cx="1304851" cy="309058"/>
+            <a:chOff x="9891239" y="2672994"/>
+            <a:chExt cx="1304851" cy="309058"/>
           </a:xfrm>
         </p:grpSpPr>
+        <p:sp>
+          <p:nvSpPr>
+            <p:cNvPr id="73" name="TextBox 72">
+              <a:extLst>
+                <a:ext uri="{FF2B5EF4-FFF2-40B4-BE49-F238E27FC236}">
+                  <a16:creationId xmlns:a16="http://schemas.microsoft.com/office/drawing/2014/main" id="{9123938A-CC83-4815-AAFE-2EEB2D9A0FED}"/>
+                </a:ext>
+              </a:extLst>
+            </p:cNvPr>
+            <p:cNvSpPr txBox="1"/>
+            <p:nvPr/>
+          </p:nvSpPr>
+          <p:spPr>
+            <a:xfrm>
+              <a:off x="9891239" y="2683553"/>
+              <a:ext cx="1032994" cy="215444"/>
+            </a:xfrm>
+            <a:prstGeom prst="rect">
+              <a:avLst/>
+            </a:prstGeom>
+            <a:noFill/>
+          </p:spPr>
+          <p:txBody>
+            <a:bodyPr wrap="square" rtlCol="0">
+              <a:spAutoFit/>
+            </a:bodyPr>
+            <a:lstStyle>
+              <a:defPPr>
+                <a:defRPr lang="en-US"/>
+              </a:defPPr>
+              <a:lvl1pPr>
+                <a:defRPr sz="1000"/>
+              </a:lvl1pPr>
+            </a:lstStyle>
+            <a:p>
+              <a:pPr algn="r"/>
+              <a:r>
+                <a:rPr lang="en-US" sz="800" dirty="0">
+                  <a:latin typeface="Arial Nova Cond" panose="020B0506020202020204" pitchFamily="34" charset="0"/>
+                </a:rPr>
+                <a:t>Service Principal</a:t>
+              </a:r>
+            </a:p>
+          </p:txBody>
+        </p:sp>
         <p:pic>
           <p:nvPicPr>
             <p:cNvPr id="37" name="Picture 36">
@@ -9523,66 +9455,21 @@
             </p:cNvPicPr>
             <p:nvPr/>
           </p:nvPicPr>
-          <p:blipFill>
-            <a:blip r:embed="rId11"/>
-            <a:stretch>
-              <a:fillRect/>
-            </a:stretch>
+          <p:blipFill rotWithShape="1">
+            <a:blip r:embed="rId9"/>
+            <a:srcRect b="7712"/>
+            <a:stretch/>
           </p:blipFill>
           <p:spPr>
             <a:xfrm>
-              <a:off x="10715989" y="2088106"/>
-              <a:ext cx="533427" cy="520727"/>
+              <a:off x="10853037" y="2672994"/>
+              <a:ext cx="343053" cy="309058"/>
             </a:xfrm>
             <a:prstGeom prst="rect">
               <a:avLst/>
             </a:prstGeom>
           </p:spPr>
         </p:pic>
-        <p:sp>
-          <p:nvSpPr>
-            <p:cNvPr id="73" name="TextBox 72">
-              <a:extLst>
-                <a:ext uri="{FF2B5EF4-FFF2-40B4-BE49-F238E27FC236}">
-                  <a16:creationId xmlns:a16="http://schemas.microsoft.com/office/drawing/2014/main" id="{9123938A-CC83-4815-AAFE-2EEB2D9A0FED}"/>
-                </a:ext>
-              </a:extLst>
-            </p:cNvPr>
-            <p:cNvSpPr txBox="1"/>
-            <p:nvPr/>
-          </p:nvSpPr>
-          <p:spPr>
-            <a:xfrm>
-              <a:off x="10465573" y="2565770"/>
-              <a:ext cx="1034257" cy="246221"/>
-            </a:xfrm>
-            <a:prstGeom prst="rect">
-              <a:avLst/>
-            </a:prstGeom>
-            <a:solidFill>
-              <a:schemeClr val="bg1"/>
-            </a:solidFill>
-          </p:spPr>
-          <p:txBody>
-            <a:bodyPr wrap="none" rtlCol="0">
-              <a:spAutoFit/>
-            </a:bodyPr>
-            <a:lstStyle>
-              <a:defPPr>
-                <a:defRPr lang="en-US"/>
-              </a:defPPr>
-              <a:lvl1pPr>
-                <a:defRPr sz="1000"/>
-              </a:lvl1pPr>
-            </a:lstStyle>
-            <a:p>
-              <a:r>
-                <a:rPr lang="en-US" dirty="0"/>
-                <a:t>Service Principal</a:t>
-              </a:r>
-            </a:p>
-          </p:txBody>
-        </p:sp>
       </p:grpSp>
       <p:cxnSp>
         <p:nvCxnSpPr>
@@ -9595,80 +9482,34 @@
           </p:cNvPr>
           <p:cNvCxnSpPr>
             <a:cxnSpLocks/>
-            <a:stCxn id="37" idx="1"/>
+            <a:stCxn id="37" idx="0"/>
             <a:endCxn id="1030" idx="3"/>
           </p:cNvCxnSpPr>
           <p:nvPr/>
         </p:nvCxnSpPr>
         <p:spPr>
-          <a:xfrm rot="10800000">
-            <a:off x="5742357" y="378907"/>
-            <a:ext cx="1747897" cy="4542"/>
-          </a:xfrm>
-          <a:prstGeom prst="bentConnector3">
-            <a:avLst>
-              <a:gd name="adj1" fmla="val 50000"/>
-            </a:avLst>
-          </a:prstGeom>
-          <a:ln>
-            <a:prstDash val="dash"/>
+          <a:xfrm rot="16200000" flipV="1">
+            <a:off x="6157914" y="504616"/>
+            <a:ext cx="870721" cy="1783719"/>
+          </a:xfrm>
+          <a:prstGeom prst="bentConnector2">
+            <a:avLst/>
+          </a:prstGeom>
+          <a:ln w="9525">
+            <a:prstDash val="lgDashDot"/>
+            <a:headEnd type="triangle"/>
             <a:tailEnd type="triangle"/>
           </a:ln>
         </p:spPr>
         <p:style>
           <a:lnRef idx="1">
-            <a:schemeClr val="accent1"/>
+            <a:schemeClr val="accent6"/>
           </a:lnRef>
           <a:fillRef idx="0">
-            <a:schemeClr val="accent1"/>
+            <a:schemeClr val="accent6"/>
           </a:fillRef>
           <a:effectRef idx="0">
-            <a:schemeClr val="accent1"/>
-          </a:effectRef>
-          <a:fontRef idx="minor">
-            <a:schemeClr val="tx1"/>
-          </a:fontRef>
-        </p:style>
-      </p:cxnSp>
-      <p:cxnSp>
-        <p:nvCxnSpPr>
-          <p:cNvPr id="46" name="Connector: Elbow 45">
-            <a:extLst>
-              <a:ext uri="{FF2B5EF4-FFF2-40B4-BE49-F238E27FC236}">
-                <a16:creationId xmlns:a16="http://schemas.microsoft.com/office/drawing/2014/main" id="{34DE0772-6EE8-4F55-B2A0-8AAAC8C2721F}"/>
-              </a:ext>
-            </a:extLst>
-          </p:cNvPr>
-          <p:cNvCxnSpPr>
-            <a:cxnSpLocks/>
-            <a:stCxn id="1044" idx="1"/>
-            <a:endCxn id="37" idx="3"/>
-          </p:cNvCxnSpPr>
-          <p:nvPr/>
-        </p:nvCxnSpPr>
-        <p:spPr>
-          <a:xfrm rot="10800000" flipV="1">
-            <a:off x="8023680" y="382059"/>
-            <a:ext cx="1164158" cy="1389"/>
-          </a:xfrm>
-          <a:prstGeom prst="bentConnector3">
-            <a:avLst>
-              <a:gd name="adj1" fmla="val 50000"/>
-            </a:avLst>
-          </a:prstGeom>
-          <a:ln>
-            <a:tailEnd type="triangle"/>
-          </a:ln>
-        </p:spPr>
-        <p:style>
-          <a:lnRef idx="1">
-            <a:schemeClr val="accent1"/>
-          </a:lnRef>
-          <a:fillRef idx="0">
-            <a:schemeClr val="accent1"/>
-          </a:fillRef>
-          <a:effectRef idx="0">
-            <a:schemeClr val="accent1"/>
+            <a:schemeClr val="accent6"/>
           </a:effectRef>
           <a:fontRef idx="minor">
             <a:schemeClr val="tx1"/>
@@ -9689,7 +9530,7 @@
         </p:nvSpPr>
         <p:spPr>
           <a:xfrm>
-            <a:off x="6380839" y="159740"/>
+            <a:off x="6156261" y="729048"/>
             <a:ext cx="782587" cy="246221"/>
           </a:xfrm>
           <a:prstGeom prst="rect">
@@ -9711,22 +9552,123 @@
           </a:lstStyle>
           <a:p>
             <a:r>
+              <a:rPr lang="en-US" dirty="0" err="1">
+                <a:latin typeface="Arial Nova Cond" panose="020B0506020202020204" pitchFamily="34" charset="0"/>
+              </a:rPr>
+              <a:t>AcrPull</a:t>
+            </a:r>
+            <a:r>
+              <a:rPr lang="en-US" dirty="0">
+                <a:latin typeface="Arial Nova Cond" panose="020B0506020202020204" pitchFamily="34" charset="0"/>
+              </a:rPr>
+              <a:t> role</a:t>
+            </a:r>
+          </a:p>
+        </p:txBody>
+      </p:sp>
+      <p:pic>
+        <p:nvPicPr>
+          <p:cNvPr id="3" name="Picture 2" descr="See the source image">
+            <a:extLst>
+              <a:ext uri="{FF2B5EF4-FFF2-40B4-BE49-F238E27FC236}">
+                <a16:creationId xmlns:a16="http://schemas.microsoft.com/office/drawing/2014/main" id="{AA859BBB-7220-4F45-915A-743FC1FEBFA7}"/>
+              </a:ext>
+            </a:extLst>
+          </p:cNvPr>
+          <p:cNvPicPr>
+            <a:picLocks noChangeAspect="1" noChangeArrowheads="1"/>
+          </p:cNvPicPr>
+          <p:nvPr/>
+        </p:nvPicPr>
+        <p:blipFill rotWithShape="1">
+          <a:blip r:embed="rId10">
+            <a:extLst>
+              <a:ext uri="{28A0092B-C50C-407E-A947-70E740481C1C}">
+                <a14:useLocalDpi xmlns:a14="http://schemas.microsoft.com/office/drawing/2010/main" val="0"/>
+              </a:ext>
+            </a:extLst>
+          </a:blip>
+          <a:srcRect l="10421" t="38880" r="8904" b="36363"/>
+          <a:stretch/>
+        </p:blipFill>
+        <p:spPr bwMode="auto">
+          <a:xfrm>
+            <a:off x="7241524" y="4368988"/>
+            <a:ext cx="1443582" cy="354394"/>
+          </a:xfrm>
+          <a:prstGeom prst="rect">
+            <a:avLst/>
+          </a:prstGeom>
+          <a:noFill/>
+          <a:extLst>
+            <a:ext uri="{909E8E84-426E-40DD-AFC4-6F175D3DCCD1}">
+              <a14:hiddenFill xmlns:a14="http://schemas.microsoft.com/office/drawing/2010/main">
+                <a:solidFill>
+                  <a:srgbClr val="FFFFFF"/>
+                </a:solidFill>
+              </a14:hiddenFill>
+            </a:ext>
+          </a:extLst>
+        </p:spPr>
+      </p:pic>
+      <p:sp>
+        <p:nvSpPr>
+          <p:cNvPr id="16" name="TextBox 15">
+            <a:extLst>
+              <a:ext uri="{FF2B5EF4-FFF2-40B4-BE49-F238E27FC236}">
+                <a16:creationId xmlns:a16="http://schemas.microsoft.com/office/drawing/2014/main" id="{150664F6-D638-4BBA-B82E-64EF9BCA251F}"/>
+              </a:ext>
+            </a:extLst>
+          </p:cNvPr>
+          <p:cNvSpPr txBox="1"/>
+          <p:nvPr/>
+        </p:nvSpPr>
+        <p:spPr>
+          <a:xfrm>
+            <a:off x="6968821" y="3710506"/>
+            <a:ext cx="1832810" cy="261610"/>
+          </a:xfrm>
+          <a:prstGeom prst="rect">
+            <a:avLst/>
+          </a:prstGeom>
+          <a:noFill/>
+        </p:spPr>
+        <p:txBody>
+          <a:bodyPr wrap="square">
+            <a:spAutoFit/>
+          </a:bodyPr>
+          <a:lstStyle>
+            <a:defPPr>
+              <a:defRPr lang="en-US"/>
+            </a:defPPr>
+            <a:lvl1pPr>
+              <a:defRPr sz="1100">
+                <a:latin typeface="Arial Nova Cond" panose="020B0506020202020204" pitchFamily="34" charset="0"/>
+              </a:defRPr>
+            </a:lvl1pPr>
+          </a:lstStyle>
+          <a:p>
+            <a:r>
+              <a:rPr lang="en-US" dirty="0"/>
+              <a:t>“</a:t>
+            </a:r>
+            <a:r>
               <a:rPr lang="en-US" dirty="0" err="1"/>
-              <a:t>AcrPull</a:t>
+              <a:t>influxdb</a:t>
             </a:r>
             <a:r>
               <a:rPr lang="en-US" dirty="0"/>
-              <a:t> role</a:t>
+              <a:t>” module</a:t>
             </a:r>
           </a:p>
         </p:txBody>
       </p:sp>
       <p:sp>
         <p:nvSpPr>
-          <p:cNvPr id="53" name="TextBox 52">
-            <a:extLst>
-              <a:ext uri="{FF2B5EF4-FFF2-40B4-BE49-F238E27FC236}">
-                <a16:creationId xmlns:a16="http://schemas.microsoft.com/office/drawing/2014/main" id="{79F0F370-A794-4566-B378-7C1AB72BE06C}"/>
+          <p:cNvPr id="20" name="TextBox 19">
+            <a:extLst>
+              <a:ext uri="{FF2B5EF4-FFF2-40B4-BE49-F238E27FC236}">
+                <a16:creationId xmlns:a16="http://schemas.microsoft.com/office/drawing/2014/main" id="{BE935596-3BEF-491F-B484-8B1B4CED8529}"/>
               </a:ext>
             </a:extLst>
           </p:cNvPr>
@@ -9735,8 +9677,376 @@
         </p:nvSpPr>
         <p:spPr>
           <a:xfrm>
-            <a:off x="8149222" y="1201169"/>
-            <a:ext cx="537327" cy="246221"/>
+            <a:off x="2220553" y="3402556"/>
+            <a:ext cx="4160286" cy="261610"/>
+          </a:xfrm>
+          <a:prstGeom prst="rect">
+            <a:avLst/>
+          </a:prstGeom>
+          <a:noFill/>
+        </p:spPr>
+        <p:txBody>
+          <a:bodyPr wrap="square">
+            <a:spAutoFit/>
+          </a:bodyPr>
+          <a:lstStyle/>
+          <a:p>
+            <a:r>
+              <a:rPr lang="en-US" sz="1100" dirty="0">
+                <a:latin typeface="Arial Nova Cond" panose="020B0506020202020204" pitchFamily="34" charset="0"/>
+              </a:rPr>
+              <a:t>“</a:t>
+            </a:r>
+            <a:r>
+              <a:rPr lang="en-US" sz="1100" dirty="0" err="1">
+                <a:latin typeface="Arial Nova Cond" panose="020B0506020202020204" pitchFamily="34" charset="0"/>
+              </a:rPr>
+              <a:t>deployment.influxdb.template.json</a:t>
+            </a:r>
+            <a:r>
+              <a:rPr lang="en-US" sz="1100" dirty="0">
+                <a:latin typeface="Arial Nova Cond" panose="020B0506020202020204" pitchFamily="34" charset="0"/>
+              </a:rPr>
+              <a:t>” edge solution</a:t>
+            </a:r>
+          </a:p>
+        </p:txBody>
+      </p:sp>
+      <p:pic>
+        <p:nvPicPr>
+          <p:cNvPr id="1026" name="Picture 2" descr="See the source image">
+            <a:extLst>
+              <a:ext uri="{FF2B5EF4-FFF2-40B4-BE49-F238E27FC236}">
+                <a16:creationId xmlns:a16="http://schemas.microsoft.com/office/drawing/2014/main" id="{D877793F-3423-4985-A4F8-20C4FDCAAC98}"/>
+              </a:ext>
+            </a:extLst>
+          </p:cNvPr>
+          <p:cNvPicPr>
+            <a:picLocks noChangeAspect="1" noChangeArrowheads="1"/>
+          </p:cNvPicPr>
+          <p:nvPr/>
+        </p:nvPicPr>
+        <p:blipFill rotWithShape="1">
+          <a:blip r:embed="rId11">
+            <a:extLst>
+              <a:ext uri="{28A0092B-C50C-407E-A947-70E740481C1C}">
+                <a14:useLocalDpi xmlns:a14="http://schemas.microsoft.com/office/drawing/2010/main" val="0"/>
+              </a:ext>
+            </a:extLst>
+          </a:blip>
+          <a:srcRect l="23418" t="10038" r="25450" b="10287"/>
+          <a:stretch/>
+        </p:blipFill>
+        <p:spPr bwMode="auto">
+          <a:xfrm>
+            <a:off x="7822946" y="6367208"/>
+            <a:ext cx="377684" cy="400194"/>
+          </a:xfrm>
+          <a:prstGeom prst="rect">
+            <a:avLst/>
+          </a:prstGeom>
+          <a:noFill/>
+          <a:extLst>
+            <a:ext uri="{909E8E84-426E-40DD-AFC4-6F175D3DCCD1}">
+              <a14:hiddenFill xmlns:a14="http://schemas.microsoft.com/office/drawing/2010/main">
+                <a:solidFill>
+                  <a:srgbClr val="FFFFFF"/>
+                </a:solidFill>
+              </a14:hiddenFill>
+            </a:ext>
+          </a:extLst>
+        </p:spPr>
+      </p:pic>
+      <p:sp>
+        <p:nvSpPr>
+          <p:cNvPr id="9" name="TextBox 8">
+            <a:extLst>
+              <a:ext uri="{FF2B5EF4-FFF2-40B4-BE49-F238E27FC236}">
+                <a16:creationId xmlns:a16="http://schemas.microsoft.com/office/drawing/2014/main" id="{7651D2E4-69F0-4A99-8563-0C5DC63588D4}"/>
+              </a:ext>
+            </a:extLst>
+          </p:cNvPr>
+          <p:cNvSpPr txBox="1"/>
+          <p:nvPr/>
+        </p:nvSpPr>
+        <p:spPr>
+          <a:xfrm>
+            <a:off x="8218185" y="6352427"/>
+            <a:ext cx="1109663" cy="461665"/>
+          </a:xfrm>
+          <a:prstGeom prst="rect">
+            <a:avLst/>
+          </a:prstGeom>
+          <a:noFill/>
+        </p:spPr>
+        <p:txBody>
+          <a:bodyPr wrap="square" rtlCol="0">
+            <a:spAutoFit/>
+          </a:bodyPr>
+          <a:lstStyle/>
+          <a:p>
+            <a:r>
+              <a:rPr lang="en-US" sz="1200" dirty="0">
+                <a:latin typeface="Arial Nova Cond" panose="020B0506020202020204" pitchFamily="34" charset="0"/>
+              </a:rPr>
+              <a:t>Azure IoT Edge RUNTIME</a:t>
+            </a:r>
+          </a:p>
+        </p:txBody>
+      </p:sp>
+      <p:sp>
+        <p:nvSpPr>
+          <p:cNvPr id="93" name="Rectangle 92">
+            <a:extLst>
+              <a:ext uri="{FF2B5EF4-FFF2-40B4-BE49-F238E27FC236}">
+                <a16:creationId xmlns:a16="http://schemas.microsoft.com/office/drawing/2014/main" id="{1400136E-BEBB-486F-82D4-515152FAFBB4}"/>
+              </a:ext>
+            </a:extLst>
+          </p:cNvPr>
+          <p:cNvSpPr/>
+          <p:nvPr/>
+        </p:nvSpPr>
+        <p:spPr>
+          <a:xfrm>
+            <a:off x="2780386" y="6407330"/>
+            <a:ext cx="1832810" cy="319950"/>
+          </a:xfrm>
+          <a:prstGeom prst="rect">
+            <a:avLst/>
+          </a:prstGeom>
+        </p:spPr>
+        <p:style>
+          <a:lnRef idx="2">
+            <a:schemeClr val="accent1"/>
+          </a:lnRef>
+          <a:fillRef idx="1">
+            <a:schemeClr val="lt1"/>
+          </a:fillRef>
+          <a:effectRef idx="0">
+            <a:schemeClr val="accent1"/>
+          </a:effectRef>
+          <a:fontRef idx="minor">
+            <a:schemeClr val="dk1"/>
+          </a:fontRef>
+        </p:style>
+        <p:txBody>
+          <a:bodyPr rtlCol="0" anchor="ctr"/>
+          <a:lstStyle/>
+          <a:p>
+            <a:pPr algn="ctr"/>
+            <a:r>
+              <a:rPr lang="en-US" sz="1200" dirty="0" err="1">
+                <a:latin typeface="Arial Nova Cond" panose="020B0506020202020204" pitchFamily="34" charset="0"/>
+              </a:rPr>
+              <a:t>CryptoProvider</a:t>
+            </a:r>
+            <a:endParaRPr lang="en-US" sz="1200" dirty="0">
+              <a:latin typeface="Arial Nova Cond" panose="020B0506020202020204" pitchFamily="34" charset="0"/>
+            </a:endParaRPr>
+          </a:p>
+        </p:txBody>
+      </p:sp>
+      <p:grpSp>
+        <p:nvGrpSpPr>
+          <p:cNvPr id="67" name="Group 66">
+            <a:extLst>
+              <a:ext uri="{FF2B5EF4-FFF2-40B4-BE49-F238E27FC236}">
+                <a16:creationId xmlns:a16="http://schemas.microsoft.com/office/drawing/2014/main" id="{B54AD928-993B-494D-967D-A7B0BA2DEB1D}"/>
+              </a:ext>
+            </a:extLst>
+          </p:cNvPr>
+          <p:cNvGrpSpPr/>
+          <p:nvPr/>
+        </p:nvGrpSpPr>
+        <p:grpSpPr>
+          <a:xfrm>
+            <a:off x="5588099" y="2456576"/>
+            <a:ext cx="2068560" cy="612189"/>
+            <a:chOff x="6629364" y="753871"/>
+            <a:chExt cx="2068560" cy="612189"/>
+          </a:xfrm>
+        </p:grpSpPr>
+        <p:pic>
+          <p:nvPicPr>
+            <p:cNvPr id="68" name="Picture 67">
+              <a:extLst>
+                <a:ext uri="{FF2B5EF4-FFF2-40B4-BE49-F238E27FC236}">
+                  <a16:creationId xmlns:a16="http://schemas.microsoft.com/office/drawing/2014/main" id="{0144E38D-537F-4D85-B89A-AF08EBD37A2A}"/>
+                </a:ext>
+              </a:extLst>
+            </p:cNvPr>
+            <p:cNvPicPr>
+              <a:picLocks noChangeAspect="1"/>
+            </p:cNvPicPr>
+            <p:nvPr/>
+          </p:nvPicPr>
+          <p:blipFill>
+            <a:blip r:embed="rId12">
+              <a:clrChange>
+                <a:clrFrom>
+                  <a:srgbClr val="FFFFFF"/>
+                </a:clrFrom>
+                <a:clrTo>
+                  <a:srgbClr val="FFFFFF">
+                    <a:alpha val="0"/>
+                  </a:srgbClr>
+                </a:clrTo>
+              </a:clrChange>
+            </a:blip>
+            <a:stretch>
+              <a:fillRect/>
+            </a:stretch>
+          </p:blipFill>
+          <p:spPr>
+            <a:xfrm>
+              <a:off x="6629364" y="753871"/>
+              <a:ext cx="659280" cy="612189"/>
+            </a:xfrm>
+            <a:prstGeom prst="rect">
+              <a:avLst/>
+            </a:prstGeom>
+          </p:spPr>
+        </p:pic>
+        <p:sp>
+          <p:nvSpPr>
+            <p:cNvPr id="69" name="TextBox 68">
+              <a:extLst>
+                <a:ext uri="{FF2B5EF4-FFF2-40B4-BE49-F238E27FC236}">
+                  <a16:creationId xmlns:a16="http://schemas.microsoft.com/office/drawing/2014/main" id="{0B4C5FC4-B034-45C3-8083-21E419B9FA1B}"/>
+                </a:ext>
+              </a:extLst>
+            </p:cNvPr>
+            <p:cNvSpPr txBox="1"/>
+            <p:nvPr/>
+          </p:nvSpPr>
+          <p:spPr>
+            <a:xfrm>
+              <a:off x="7081362" y="1084529"/>
+              <a:ext cx="1616562" cy="246221"/>
+            </a:xfrm>
+            <a:prstGeom prst="rect">
+              <a:avLst/>
+            </a:prstGeom>
+            <a:noFill/>
+          </p:spPr>
+          <p:txBody>
+            <a:bodyPr wrap="square" rtlCol="0">
+              <a:spAutoFit/>
+            </a:bodyPr>
+            <a:lstStyle/>
+            <a:p>
+              <a:r>
+                <a:rPr lang="en-US" sz="1000" dirty="0">
+                  <a:latin typeface="Arial Nova Cond" panose="020B0506020202020204" pitchFamily="34" charset="0"/>
+                </a:rPr>
+                <a:t>Azure Container Apps</a:t>
+              </a:r>
+            </a:p>
+          </p:txBody>
+        </p:sp>
+      </p:grpSp>
+      <p:sp>
+        <p:nvSpPr>
+          <p:cNvPr id="72" name="TextBox 71">
+            <a:extLst>
+              <a:ext uri="{FF2B5EF4-FFF2-40B4-BE49-F238E27FC236}">
+                <a16:creationId xmlns:a16="http://schemas.microsoft.com/office/drawing/2014/main" id="{5B4098B0-34C3-4339-A20B-46D9DF20065A}"/>
+              </a:ext>
+            </a:extLst>
+          </p:cNvPr>
+          <p:cNvSpPr txBox="1"/>
+          <p:nvPr/>
+        </p:nvSpPr>
+        <p:spPr>
+          <a:xfrm>
+            <a:off x="5951914" y="2267068"/>
+            <a:ext cx="1489738" cy="276999"/>
+          </a:xfrm>
+          <a:prstGeom prst="rect">
+            <a:avLst/>
+          </a:prstGeom>
+          <a:noFill/>
+        </p:spPr>
+        <p:txBody>
+          <a:bodyPr wrap="square">
+            <a:spAutoFit/>
+          </a:bodyPr>
+          <a:lstStyle/>
+          <a:p>
+            <a:pPr algn="ctr"/>
+            <a:r>
+              <a:rPr lang="en-US" sz="1200" dirty="0" err="1">
+                <a:latin typeface="Arial Nova Cond" panose="020B0506020202020204" pitchFamily="34" charset="0"/>
+              </a:rPr>
+              <a:t>SecretDeliveryApp</a:t>
+            </a:r>
+            <a:endParaRPr lang="en-US" sz="1200" dirty="0">
+              <a:latin typeface="Arial Nova Cond" panose="020B0506020202020204" pitchFamily="34" charset="0"/>
+            </a:endParaRPr>
+          </a:p>
+        </p:txBody>
+      </p:sp>
+      <p:cxnSp>
+        <p:nvCxnSpPr>
+          <p:cNvPr id="74" name="Connector: Elbow 73">
+            <a:extLst>
+              <a:ext uri="{FF2B5EF4-FFF2-40B4-BE49-F238E27FC236}">
+                <a16:creationId xmlns:a16="http://schemas.microsoft.com/office/drawing/2014/main" id="{3FCC4A0C-A699-403A-B571-D7C26546D649}"/>
+              </a:ext>
+            </a:extLst>
+          </p:cNvPr>
+          <p:cNvCxnSpPr>
+            <a:cxnSpLocks/>
+            <a:stCxn id="37" idx="3"/>
+            <a:endCxn id="1028" idx="0"/>
+          </p:cNvCxnSpPr>
+          <p:nvPr/>
+        </p:nvCxnSpPr>
+        <p:spPr>
+          <a:xfrm>
+            <a:off x="7656659" y="1986365"/>
+            <a:ext cx="1408896" cy="179488"/>
+          </a:xfrm>
+          <a:prstGeom prst="bentConnector2">
+            <a:avLst/>
+          </a:prstGeom>
+          <a:ln w="9525">
+            <a:prstDash val="lgDashDot"/>
+            <a:headEnd type="triangle"/>
+            <a:tailEnd type="triangle"/>
+          </a:ln>
+        </p:spPr>
+        <p:style>
+          <a:lnRef idx="1">
+            <a:schemeClr val="accent6"/>
+          </a:lnRef>
+          <a:fillRef idx="0">
+            <a:schemeClr val="accent6"/>
+          </a:fillRef>
+          <a:effectRef idx="0">
+            <a:schemeClr val="accent6"/>
+          </a:effectRef>
+          <a:fontRef idx="minor">
+            <a:schemeClr val="tx1"/>
+          </a:fontRef>
+        </p:style>
+      </p:cxnSp>
+      <p:sp>
+        <p:nvSpPr>
+          <p:cNvPr id="82" name="TextBox 81">
+            <a:extLst>
+              <a:ext uri="{FF2B5EF4-FFF2-40B4-BE49-F238E27FC236}">
+                <a16:creationId xmlns:a16="http://schemas.microsoft.com/office/drawing/2014/main" id="{24D51C3F-C7E9-4AA4-B71E-51AC03D7EF0A}"/>
+              </a:ext>
+            </a:extLst>
+          </p:cNvPr>
+          <p:cNvSpPr txBox="1"/>
+          <p:nvPr/>
+        </p:nvSpPr>
+        <p:spPr>
+          <a:xfrm>
+            <a:off x="8200630" y="1771225"/>
+            <a:ext cx="380232" cy="246221"/>
           </a:xfrm>
           <a:prstGeom prst="rect">
             <a:avLst/>
@@ -9757,271 +10067,55 @@
           </a:lstStyle>
           <a:p>
             <a:r>
-              <a:rPr lang="en-US" dirty="0"/>
-              <a:t>?? role</a:t>
+              <a:rPr lang="en-US" dirty="0">
+                <a:latin typeface="Arial Nova Cond" panose="020B0506020202020204" pitchFamily="34" charset="0"/>
+              </a:rPr>
+              <a:t>role</a:t>
             </a:r>
           </a:p>
         </p:txBody>
       </p:sp>
-      <p:pic>
-        <p:nvPicPr>
-          <p:cNvPr id="3" name="Picture 2" descr="See the source image">
-            <a:extLst>
-              <a:ext uri="{FF2B5EF4-FFF2-40B4-BE49-F238E27FC236}">
-                <a16:creationId xmlns:a16="http://schemas.microsoft.com/office/drawing/2014/main" id="{AA859BBB-7220-4F45-915A-743FC1FEBFA7}"/>
-              </a:ext>
-            </a:extLst>
-          </p:cNvPr>
-          <p:cNvPicPr>
-            <a:picLocks noChangeAspect="1" noChangeArrowheads="1"/>
-          </p:cNvPicPr>
-          <p:nvPr/>
-        </p:nvPicPr>
-        <p:blipFill rotWithShape="1">
-          <a:blip r:embed="rId12">
-            <a:extLst>
-              <a:ext uri="{28A0092B-C50C-407E-A947-70E740481C1C}">
-                <a14:useLocalDpi xmlns:a14="http://schemas.microsoft.com/office/drawing/2010/main" val="0"/>
-              </a:ext>
-            </a:extLst>
-          </a:blip>
-          <a:srcRect l="10421" t="38880" r="8904" b="36363"/>
-          <a:stretch/>
-        </p:blipFill>
-        <p:spPr bwMode="auto">
-          <a:xfrm>
-            <a:off x="7732048" y="4345878"/>
-            <a:ext cx="1443582" cy="354394"/>
-          </a:xfrm>
-          <a:prstGeom prst="rect">
+      <p:cxnSp>
+        <p:nvCxnSpPr>
+          <p:cNvPr id="1033" name="Straight Arrow Connector 1032">
+            <a:extLst>
+              <a:ext uri="{FF2B5EF4-FFF2-40B4-BE49-F238E27FC236}">
+                <a16:creationId xmlns:a16="http://schemas.microsoft.com/office/drawing/2014/main" id="{B50947AE-8B6B-4779-BFBA-4A9845D4B9D8}"/>
+              </a:ext>
+            </a:extLst>
+          </p:cNvPr>
+          <p:cNvCxnSpPr/>
+          <p:nvPr/>
+        </p:nvCxnSpPr>
+        <p:spPr>
+          <a:xfrm flipH="1">
+            <a:off x="7597942" y="1127219"/>
+            <a:ext cx="602688" cy="704617"/>
+          </a:xfrm>
+          <a:prstGeom prst="straightConnector1">
             <a:avLst/>
           </a:prstGeom>
-          <a:noFill/>
-          <a:extLst>
-            <a:ext uri="{909E8E84-426E-40DD-AFC4-6F175D3DCCD1}">
-              <a14:hiddenFill xmlns:a14="http://schemas.microsoft.com/office/drawing/2010/main">
-                <a:solidFill>
-                  <a:srgbClr val="FFFFFF"/>
-                </a:solidFill>
-              </a14:hiddenFill>
-            </a:ext>
-          </a:extLst>
-        </p:spPr>
-      </p:pic>
-      <p:sp>
-        <p:nvSpPr>
-          <p:cNvPr id="16" name="TextBox 15">
-            <a:extLst>
-              <a:ext uri="{FF2B5EF4-FFF2-40B4-BE49-F238E27FC236}">
-                <a16:creationId xmlns:a16="http://schemas.microsoft.com/office/drawing/2014/main" id="{150664F6-D638-4BBA-B82E-64EF9BCA251F}"/>
-              </a:ext>
-            </a:extLst>
-          </p:cNvPr>
-          <p:cNvSpPr txBox="1"/>
-          <p:nvPr/>
-        </p:nvSpPr>
-        <p:spPr>
-          <a:xfrm>
-            <a:off x="6914476" y="3758493"/>
-            <a:ext cx="1832810" cy="307777"/>
-          </a:xfrm>
-          <a:prstGeom prst="rect">
-            <a:avLst/>
-          </a:prstGeom>
-          <a:noFill/>
-        </p:spPr>
-        <p:txBody>
-          <a:bodyPr wrap="square">
-            <a:spAutoFit/>
-          </a:bodyPr>
-          <a:lstStyle/>
-          <a:p>
-            <a:r>
-              <a:rPr lang="en-US" sz="1400" dirty="0"/>
-              <a:t>“</a:t>
-            </a:r>
-            <a:r>
-              <a:rPr lang="en-US" sz="1400" dirty="0" err="1"/>
-              <a:t>influxdb</a:t>
-            </a:r>
-            <a:r>
-              <a:rPr lang="en-US" sz="1400" dirty="0"/>
-              <a:t>” module</a:t>
-            </a:r>
-          </a:p>
-        </p:txBody>
-      </p:sp>
-      <p:sp>
-        <p:nvSpPr>
-          <p:cNvPr id="20" name="TextBox 19">
-            <a:extLst>
-              <a:ext uri="{FF2B5EF4-FFF2-40B4-BE49-F238E27FC236}">
-                <a16:creationId xmlns:a16="http://schemas.microsoft.com/office/drawing/2014/main" id="{BE935596-3BEF-491F-B484-8B1B4CED8529}"/>
-              </a:ext>
-            </a:extLst>
-          </p:cNvPr>
-          <p:cNvSpPr txBox="1"/>
-          <p:nvPr/>
-        </p:nvSpPr>
-        <p:spPr>
-          <a:xfrm>
-            <a:off x="2359420" y="3376583"/>
-            <a:ext cx="4160286" cy="307777"/>
-          </a:xfrm>
-          <a:prstGeom prst="rect">
-            <a:avLst/>
-          </a:prstGeom>
-          <a:noFill/>
-        </p:spPr>
-        <p:txBody>
-          <a:bodyPr wrap="square">
-            <a:spAutoFit/>
-          </a:bodyPr>
-          <a:lstStyle/>
-          <a:p>
-            <a:r>
-              <a:rPr lang="en-US" sz="1400" dirty="0"/>
-              <a:t>“</a:t>
-            </a:r>
-            <a:r>
-              <a:rPr lang="en-US" sz="1400" dirty="0" err="1"/>
-              <a:t>deployment.influxdb.template.json</a:t>
-            </a:r>
-            <a:r>
-              <a:rPr lang="en-US" sz="1400" dirty="0"/>
-              <a:t>” edge solution</a:t>
-            </a:r>
-          </a:p>
-        </p:txBody>
-      </p:sp>
-      <p:pic>
-        <p:nvPicPr>
-          <p:cNvPr id="1026" name="Picture 2" descr="See the source image">
-            <a:extLst>
-              <a:ext uri="{FF2B5EF4-FFF2-40B4-BE49-F238E27FC236}">
-                <a16:creationId xmlns:a16="http://schemas.microsoft.com/office/drawing/2014/main" id="{D877793F-3423-4985-A4F8-20C4FDCAAC98}"/>
-              </a:ext>
-            </a:extLst>
-          </p:cNvPr>
-          <p:cNvPicPr>
-            <a:picLocks noChangeAspect="1" noChangeArrowheads="1"/>
-          </p:cNvPicPr>
-          <p:nvPr/>
-        </p:nvPicPr>
-        <p:blipFill rotWithShape="1">
-          <a:blip r:embed="rId13">
-            <a:extLst>
-              <a:ext uri="{28A0092B-C50C-407E-A947-70E740481C1C}">
-                <a14:useLocalDpi xmlns:a14="http://schemas.microsoft.com/office/drawing/2010/main" val="0"/>
-              </a:ext>
-            </a:extLst>
-          </a:blip>
-          <a:srcRect l="23418" t="10038" r="25450" b="10287"/>
-          <a:stretch/>
-        </p:blipFill>
-        <p:spPr bwMode="auto">
-          <a:xfrm>
-            <a:off x="7822946" y="6367208"/>
-            <a:ext cx="377684" cy="400194"/>
-          </a:xfrm>
-          <a:prstGeom prst="rect">
-            <a:avLst/>
-          </a:prstGeom>
-          <a:noFill/>
-          <a:extLst>
-            <a:ext uri="{909E8E84-426E-40DD-AFC4-6F175D3DCCD1}">
-              <a14:hiddenFill xmlns:a14="http://schemas.microsoft.com/office/drawing/2010/main">
-                <a:solidFill>
-                  <a:srgbClr val="FFFFFF"/>
-                </a:solidFill>
-              </a14:hiddenFill>
-            </a:ext>
-          </a:extLst>
-        </p:spPr>
-      </p:pic>
-      <p:sp>
-        <p:nvSpPr>
-          <p:cNvPr id="9" name="TextBox 8">
-            <a:extLst>
-              <a:ext uri="{FF2B5EF4-FFF2-40B4-BE49-F238E27FC236}">
-                <a16:creationId xmlns:a16="http://schemas.microsoft.com/office/drawing/2014/main" id="{7651D2E4-69F0-4A99-8563-0C5DC63588D4}"/>
-              </a:ext>
-            </a:extLst>
-          </p:cNvPr>
-          <p:cNvSpPr txBox="1"/>
-          <p:nvPr/>
-        </p:nvSpPr>
-        <p:spPr>
-          <a:xfrm>
-            <a:off x="8218185" y="6352427"/>
-            <a:ext cx="1109663" cy="461665"/>
-          </a:xfrm>
-          <a:prstGeom prst="rect">
-            <a:avLst/>
-          </a:prstGeom>
-          <a:noFill/>
-        </p:spPr>
-        <p:txBody>
-          <a:bodyPr wrap="square" rtlCol="0">
-            <a:spAutoFit/>
-          </a:bodyPr>
-          <a:lstStyle/>
-          <a:p>
-            <a:r>
-              <a:rPr lang="en-US" sz="1200" dirty="0"/>
-              <a:t>Azure IoT Edge RUNTIME</a:t>
-            </a:r>
-          </a:p>
-        </p:txBody>
-      </p:sp>
-      <p:sp>
-        <p:nvSpPr>
-          <p:cNvPr id="93" name="Rectangle 92">
-            <a:extLst>
-              <a:ext uri="{FF2B5EF4-FFF2-40B4-BE49-F238E27FC236}">
-                <a16:creationId xmlns:a16="http://schemas.microsoft.com/office/drawing/2014/main" id="{1400136E-BEBB-486F-82D4-515152FAFBB4}"/>
-              </a:ext>
-            </a:extLst>
-          </p:cNvPr>
-          <p:cNvSpPr/>
-          <p:nvPr/>
-        </p:nvSpPr>
-        <p:spPr>
-          <a:xfrm>
-            <a:off x="2780386" y="6407330"/>
-            <a:ext cx="1832810" cy="319950"/>
-          </a:xfrm>
-          <a:prstGeom prst="rect">
-            <a:avLst/>
-          </a:prstGeom>
+          <a:ln w="9525">
+            <a:prstDash val="lgDashDot"/>
+            <a:headEnd type="triangle"/>
+            <a:tailEnd type="triangle"/>
+          </a:ln>
         </p:spPr>
         <p:style>
-          <a:lnRef idx="2">
-            <a:schemeClr val="accent1"/>
+          <a:lnRef idx="1">
+            <a:schemeClr val="accent6"/>
           </a:lnRef>
-          <a:fillRef idx="1">
-            <a:schemeClr val="lt1"/>
+          <a:fillRef idx="0">
+            <a:schemeClr val="accent6"/>
           </a:fillRef>
           <a:effectRef idx="0">
-            <a:schemeClr val="accent1"/>
+            <a:schemeClr val="accent6"/>
           </a:effectRef>
           <a:fontRef idx="minor">
-            <a:schemeClr val="dk1"/>
+            <a:schemeClr val="tx1"/>
           </a:fontRef>
         </p:style>
-        <p:txBody>
-          <a:bodyPr rtlCol="0" anchor="ctr"/>
-          <a:lstStyle/>
-          <a:p>
-            <a:pPr algn="ctr"/>
-            <a:r>
-              <a:rPr lang="en-US" sz="1200" dirty="0" err="1"/>
-              <a:t>CryptoProvider</a:t>
-            </a:r>
-            <a:endParaRPr lang="en-US" sz="1200" dirty="0"/>
-          </a:p>
-        </p:txBody>
-      </p:sp>
+      </p:cxnSp>
     </p:spTree>
     <p:extLst>
       <p:ext uri="{BB962C8B-B14F-4D97-AF65-F5344CB8AC3E}">

</xml_diff>